<commit_message>
Basic hash function implementation
</commit_message>
<xml_diff>
--- a/ds&a.pptx
+++ b/ds&a.pptx
@@ -18765,6 +18765,322 @@
           </a:p>
         </p:txBody>
       </p:sp>
+      <p:pic>
+        <p:nvPicPr>
+          <p:cNvPr id="6" name="Рисунок 5"/>
+          <p:cNvPicPr>
+            <a:picLocks noChangeAspect="1"/>
+          </p:cNvPicPr>
+          <p:nvPr/>
+        </p:nvPicPr>
+        <p:blipFill>
+          <a:blip r:embed="rId2">
+            <a:extLst>
+              <a:ext uri="{28A0092B-C50C-407E-A947-70E740481C1C}">
+                <a14:useLocalDpi xmlns:a14="http://schemas.microsoft.com/office/drawing/2010/main" val="0"/>
+              </a:ext>
+            </a:extLst>
+          </a:blip>
+          <a:stretch>
+            <a:fillRect/>
+          </a:stretch>
+        </p:blipFill>
+        <p:spPr>
+          <a:xfrm>
+            <a:off x="660400" y="2900251"/>
+            <a:ext cx="4410691" cy="1590897"/>
+          </a:xfrm>
+          <a:prstGeom prst="rect">
+            <a:avLst/>
+          </a:prstGeom>
+        </p:spPr>
+      </p:pic>
+      <p:sp>
+        <p:nvSpPr>
+          <p:cNvPr id="7" name="TextBox 6"/>
+          <p:cNvSpPr txBox="1"/>
+          <p:nvPr/>
+        </p:nvSpPr>
+        <p:spPr>
+          <a:xfrm>
+            <a:off x="5194300" y="2900251"/>
+            <a:ext cx="6235700" cy="1200329"/>
+          </a:xfrm>
+          <a:prstGeom prst="rect">
+            <a:avLst/>
+          </a:prstGeom>
+          <a:noFill/>
+        </p:spPr>
+        <p:txBody>
+          <a:bodyPr wrap="square" rtlCol="0">
+            <a:spAutoFit/>
+          </a:bodyPr>
+          <a:lstStyle/>
+          <a:p>
+            <a:r>
+              <a:rPr lang="en-US" dirty="0" smtClean="0"/>
+              <a:t>Problems</a:t>
+            </a:r>
+          </a:p>
+          <a:p>
+            <a:pPr marL="342900" indent="-342900">
+              <a:buFont typeface="+mj-lt"/>
+              <a:buAutoNum type="arabicPeriod"/>
+            </a:pPr>
+            <a:r>
+              <a:rPr lang="en-US" dirty="0" smtClean="0"/>
+              <a:t>This work only with strings( we don’t worry about it )</a:t>
+            </a:r>
+          </a:p>
+          <a:p>
+            <a:pPr marL="342900" indent="-342900">
+              <a:buFont typeface="+mj-lt"/>
+              <a:buAutoNum type="arabicPeriod"/>
+            </a:pPr>
+            <a:r>
+              <a:rPr lang="en-US" dirty="0" smtClean="0"/>
+              <a:t>Not constant time – linear in key length</a:t>
+            </a:r>
+          </a:p>
+          <a:p>
+            <a:pPr marL="342900" indent="-342900">
+              <a:buFont typeface="+mj-lt"/>
+              <a:buAutoNum type="arabicPeriod"/>
+            </a:pPr>
+            <a:r>
+              <a:rPr lang="en-US" dirty="0" smtClean="0"/>
+              <a:t>Collisions </a:t>
+            </a:r>
+            <a:endParaRPr lang="ru-RU" dirty="0"/>
+          </a:p>
+        </p:txBody>
+      </p:sp>
+      <p:sp>
+        <p:nvSpPr>
+          <p:cNvPr id="8" name="Прямоугольник 7"/>
+          <p:cNvSpPr/>
+          <p:nvPr/>
+        </p:nvSpPr>
+        <p:spPr>
+          <a:xfrm>
+            <a:off x="660400" y="4641670"/>
+            <a:ext cx="3721100" cy="1938992"/>
+          </a:xfrm>
+          <a:prstGeom prst="rect">
+            <a:avLst/>
+          </a:prstGeom>
+        </p:spPr>
+        <p:txBody>
+          <a:bodyPr wrap="square">
+            <a:spAutoFit/>
+          </a:bodyPr>
+          <a:lstStyle/>
+          <a:p>
+            <a:r>
+              <a:rPr lang="en-US" sz="1200" dirty="0">
+                <a:solidFill>
+                  <a:srgbClr val="1D1C1D"/>
+                </a:solidFill>
+                <a:latin typeface="Slack-Lato"/>
+              </a:rPr>
+              <a:t>Prime numbers? </a:t>
+            </a:r>
+            <a:r>
+              <a:rPr lang="en-US" sz="1200" dirty="0" err="1">
+                <a:solidFill>
+                  <a:srgbClr val="1D1C1D"/>
+                </a:solidFill>
+                <a:latin typeface="Slack-Lato"/>
+              </a:rPr>
+              <a:t>wut</a:t>
+            </a:r>
+            <a:r>
+              <a:rPr lang="en-US" sz="1200" dirty="0">
+                <a:solidFill>
+                  <a:srgbClr val="1D1C1D"/>
+                </a:solidFill>
+                <a:latin typeface="Slack-Lato"/>
+              </a:rPr>
+              <a:t>.</a:t>
+            </a:r>
+            <a:r>
+              <a:rPr lang="en-US" sz="1200" dirty="0"/>
+              <a:t/>
+            </a:r>
+            <a:br>
+              <a:rPr lang="en-US" sz="1200" dirty="0"/>
+            </a:br>
+            <a:r>
+              <a:rPr lang="en-US" sz="1200" dirty="0">
+                <a:solidFill>
+                  <a:srgbClr val="1D1C1D"/>
+                </a:solidFill>
+                <a:latin typeface="Slack-Lato"/>
+              </a:rPr>
+              <a:t>The prime number in the hash is helpful in</a:t>
+            </a:r>
+            <a:r>
+              <a:rPr lang="en-US" sz="1200" dirty="0"/>
+              <a:t/>
+            </a:r>
+            <a:br>
+              <a:rPr lang="en-US" sz="1200" dirty="0"/>
+            </a:br>
+            <a:r>
+              <a:rPr lang="en-US" sz="1200" dirty="0">
+                <a:solidFill>
+                  <a:srgbClr val="1D1C1D"/>
+                </a:solidFill>
+                <a:latin typeface="Slack-Lato"/>
+              </a:rPr>
+              <a:t>spreading out the keys more uniformly.</a:t>
+            </a:r>
+            <a:r>
+              <a:rPr lang="en-US" sz="1200" dirty="0"/>
+              <a:t/>
+            </a:r>
+            <a:br>
+              <a:rPr lang="en-US" sz="1200" dirty="0"/>
+            </a:br>
+            <a:r>
+              <a:rPr lang="en-US" sz="1200" dirty="0">
+                <a:solidFill>
+                  <a:srgbClr val="1D1C1D"/>
+                </a:solidFill>
+                <a:latin typeface="Slack-Lato"/>
+              </a:rPr>
+              <a:t>It's also helpful if the array that you're</a:t>
+            </a:r>
+            <a:r>
+              <a:rPr lang="en-US" sz="1200" dirty="0"/>
+              <a:t/>
+            </a:r>
+            <a:br>
+              <a:rPr lang="en-US" sz="1200" dirty="0"/>
+            </a:br>
+            <a:r>
+              <a:rPr lang="en-US" sz="1200" dirty="0">
+                <a:solidFill>
+                  <a:srgbClr val="1D1C1D"/>
+                </a:solidFill>
+                <a:latin typeface="Slack-Lato"/>
+              </a:rPr>
+              <a:t>putting values into has a prime length.</a:t>
+            </a:r>
+            <a:r>
+              <a:rPr lang="en-US" sz="1200" dirty="0"/>
+              <a:t/>
+            </a:r>
+            <a:br>
+              <a:rPr lang="en-US" sz="1200" dirty="0"/>
+            </a:br>
+            <a:r>
+              <a:rPr lang="en-US" sz="1200" dirty="0">
+                <a:solidFill>
+                  <a:srgbClr val="1D1C1D"/>
+                </a:solidFill>
+                <a:latin typeface="Slack-Lato"/>
+              </a:rPr>
+              <a:t>You don't need to know why. (Math is complicated!)</a:t>
+            </a:r>
+            <a:r>
+              <a:rPr lang="en-US" sz="1200" dirty="0"/>
+              <a:t/>
+            </a:r>
+            <a:br>
+              <a:rPr lang="en-US" sz="1200" dirty="0"/>
+            </a:br>
+            <a:r>
+              <a:rPr lang="en-US" sz="1200" dirty="0">
+                <a:solidFill>
+                  <a:srgbClr val="1D1C1D"/>
+                </a:solidFill>
+                <a:latin typeface="Slack-Lato"/>
+              </a:rPr>
+              <a:t>But here are some links if you're curious.</a:t>
+            </a:r>
+            <a:r>
+              <a:rPr lang="en-US" sz="1200" dirty="0"/>
+              <a:t/>
+            </a:r>
+            <a:br>
+              <a:rPr lang="en-US" sz="1200" dirty="0"/>
+            </a:br>
+            <a:r>
+              <a:rPr lang="en-US" sz="1200" dirty="0">
+                <a:solidFill>
+                  <a:srgbClr val="1D1C1D"/>
+                </a:solidFill>
+                <a:latin typeface="Slack-Lato"/>
+              </a:rPr>
+              <a:t>Why do hash functions use prime numbers?</a:t>
+            </a:r>
+            <a:r>
+              <a:rPr lang="en-US" sz="1200" dirty="0"/>
+              <a:t/>
+            </a:r>
+            <a:br>
+              <a:rPr lang="en-US" sz="1200" dirty="0"/>
+            </a:br>
+            <a:r>
+              <a:rPr lang="en-US" sz="1200" dirty="0">
+                <a:solidFill>
+                  <a:srgbClr val="1D1C1D"/>
+                </a:solidFill>
+                <a:latin typeface="Slack-Lato"/>
+              </a:rPr>
+              <a:t>Does making array size a prime number</a:t>
+            </a:r>
+            <a:r>
+              <a:rPr lang="en-US" sz="1200" dirty="0"/>
+              <a:t/>
+            </a:r>
+            <a:br>
+              <a:rPr lang="en-US" sz="1200" dirty="0"/>
+            </a:br>
+            <a:r>
+              <a:rPr lang="en-US" sz="1200" dirty="0">
+                <a:solidFill>
+                  <a:srgbClr val="1D1C1D"/>
+                </a:solidFill>
+                <a:latin typeface="Slack-Lato"/>
+              </a:rPr>
+              <a:t>help in hash table implementation?</a:t>
+            </a:r>
+            <a:endParaRPr lang="ru-RU" sz="1200" dirty="0"/>
+          </a:p>
+        </p:txBody>
+      </p:sp>
+      <p:sp>
+        <p:nvSpPr>
+          <p:cNvPr id="9" name="TextBox 8"/>
+          <p:cNvSpPr txBox="1"/>
+          <p:nvPr/>
+        </p:nvSpPr>
+        <p:spPr>
+          <a:xfrm>
+            <a:off x="5397500" y="4641670"/>
+            <a:ext cx="4356100" cy="646331"/>
+          </a:xfrm>
+          <a:prstGeom prst="rect">
+            <a:avLst/>
+          </a:prstGeom>
+          <a:noFill/>
+        </p:spPr>
+        <p:txBody>
+          <a:bodyPr wrap="square" rtlCol="0">
+            <a:spAutoFit/>
+          </a:bodyPr>
+          <a:lstStyle/>
+          <a:p>
+            <a:r>
+              <a:rPr lang="en-US" dirty="0" smtClean="0"/>
+              <a:t>Not need to now why, but just set prime number in hash function and array size</a:t>
+            </a:r>
+            <a:endParaRPr lang="ru-RU" dirty="0"/>
+          </a:p>
+        </p:txBody>
+      </p:sp>
     </p:spTree>
     <p:extLst>
       <p:ext uri="{BB962C8B-B14F-4D97-AF65-F5344CB8AC3E}">

</xml_diff>

<commit_message>
Hash tables - get,values,keyes solution
</commit_message>
<xml_diff>
--- a/ds&a.pptx
+++ b/ds&a.pptx
@@ -32,9 +32,9 @@
     <p:sldId id="277" r:id="rId23"/>
     <p:sldId id="264" r:id="rId24"/>
     <p:sldId id="289" r:id="rId25"/>
-    <p:sldId id="267" r:id="rId26"/>
-    <p:sldId id="280" r:id="rId27"/>
-    <p:sldId id="268" r:id="rId28"/>
+    <p:sldId id="290" r:id="rId26"/>
+    <p:sldId id="267" r:id="rId27"/>
+    <p:sldId id="280" r:id="rId28"/>
   </p:sldIdLst>
   <p:sldSz cx="12192000" cy="6858000"/>
   <p:notesSz cx="6858000" cy="9144000"/>
@@ -223,7 +223,7 @@
           <a:p>
             <a:fld id="{6B64E2F3-015A-4D3D-AFF5-69B902AF5482}" type="datetimeFigureOut">
               <a:rPr lang="en-US" smtClean="0"/>
-              <a:t>5/2/2021</a:t>
+              <a:t>5/3/2021</a:t>
             </a:fld>
             <a:endParaRPr lang="en-US"/>
           </a:p>
@@ -2006,7 +2006,7 @@
           <a:p>
             <a:fld id="{81D8DF1A-961C-4A2B-937E-DACBE9C8BAD8}" type="datetimeFigureOut">
               <a:rPr lang="en-US" smtClean="0"/>
-              <a:t>5/2/2021</a:t>
+              <a:t>5/3/2021</a:t>
             </a:fld>
             <a:endParaRPr lang="en-US"/>
           </a:p>
@@ -12469,6 +12469,9 @@
             <a:chOff x="938891" y="4319400"/>
             <a:chExt cx="442075" cy="442050"/>
           </a:xfrm>
+          <a:solidFill>
+            <a:schemeClr val="accent4"/>
+          </a:solidFill>
         </p:grpSpPr>
         <p:sp>
           <p:nvSpPr>
@@ -13056,10 +13059,10 @@
                 </a:path>
               </a:pathLst>
             </a:custGeom>
-            <a:noFill/>
+            <a:grpFill/>
             <a:ln w="9525" cap="rnd" cmpd="sng">
               <a:solidFill>
-                <a:schemeClr val="dk1"/>
+                <a:schemeClr val="accent4"/>
               </a:solidFill>
               <a:prstDash val="solid"/>
               <a:round/>
@@ -13205,10 +13208,10 @@
                 </a:path>
               </a:pathLst>
             </a:custGeom>
-            <a:noFill/>
+            <a:grpFill/>
             <a:ln w="9525" cap="rnd" cmpd="sng">
               <a:solidFill>
-                <a:schemeClr val="dk1"/>
+                <a:schemeClr val="accent4"/>
               </a:solidFill>
               <a:prstDash val="solid"/>
               <a:round/>
@@ -13360,10 +13363,10 @@
                 </a:path>
               </a:pathLst>
             </a:custGeom>
-            <a:noFill/>
+            <a:grpFill/>
             <a:ln w="9525" cap="rnd" cmpd="sng">
               <a:solidFill>
-                <a:schemeClr val="dk1"/>
+                <a:schemeClr val="accent4"/>
               </a:solidFill>
               <a:prstDash val="solid"/>
               <a:round/>
@@ -13515,10 +13518,10 @@
                 </a:path>
               </a:pathLst>
             </a:custGeom>
-            <a:noFill/>
+            <a:grpFill/>
             <a:ln w="9525" cap="rnd" cmpd="sng">
               <a:solidFill>
-                <a:schemeClr val="dk1"/>
+                <a:schemeClr val="accent4"/>
               </a:solidFill>
               <a:prstDash val="solid"/>
               <a:round/>
@@ -18420,11 +18423,7 @@
             </a:pPr>
             <a:r>
               <a:rPr lang="en-US" sz="1100" dirty="0" smtClean="0"/>
-              <a:t>What is a </a:t>
-            </a:r>
-            <a:r>
-              <a:rPr lang="en-US" sz="1100" dirty="0" smtClean="0"/>
-              <a:t>hash tables?</a:t>
+              <a:t>What is a hash tables?</a:t>
             </a:r>
           </a:p>
           <a:p>
@@ -18864,7 +18863,7 @@
         <p:spPr>
           <a:xfrm>
             <a:off x="660400" y="4641670"/>
-            <a:ext cx="3721100" cy="1938992"/>
+            <a:ext cx="3721100" cy="2308324"/>
           </a:xfrm>
           <a:prstGeom prst="rect">
             <a:avLst/>
@@ -19045,7 +19044,24 @@
                 </a:solidFill>
                 <a:latin typeface="Slack-Lato"/>
               </a:rPr>
-              <a:t>help in hash table implementation?</a:t>
+              <a:t>help in hash table implementation</a:t>
+            </a:r>
+            <a:r>
+              <a:rPr lang="en-US" sz="1200" dirty="0" smtClean="0">
+                <a:solidFill>
+                  <a:srgbClr val="1D1C1D"/>
+                </a:solidFill>
+                <a:latin typeface="Slack-Lato"/>
+              </a:rPr>
+              <a:t>?</a:t>
+            </a:r>
+          </a:p>
+          <a:p>
+            <a:r>
+              <a:rPr lang="en-US" sz="1200" dirty="0" smtClean="0">
+                <a:hlinkClick r:id="rId3"/>
+              </a:rPr>
+              <a:t>Does-making-array-size-a-prime-number-help-in-hash-table-implementation</a:t>
             </a:r>
             <a:endParaRPr lang="ru-RU" sz="1200" dirty="0"/>
           </a:p>
@@ -19113,7 +19129,7 @@
       </p:grpSpPr>
       <p:sp>
         <p:nvSpPr>
-          <p:cNvPr id="2" name="Title 1"/>
+          <p:cNvPr id="3" name="Заголовок 2"/>
           <p:cNvSpPr>
             <a:spLocks noGrp="1"/>
           </p:cNvSpPr>
@@ -19121,67 +19137,405 @@
             <p:ph type="title"/>
           </p:nvPr>
         </p:nvSpPr>
-        <p:spPr/>
+        <p:spPr>
+          <a:xfrm>
+            <a:off x="0" y="0"/>
+            <a:ext cx="9610000" cy="844400"/>
+          </a:xfrm>
+        </p:spPr>
         <p:txBody>
           <a:bodyPr/>
           <a:lstStyle/>
           <a:p>
             <a:r>
-              <a:rPr lang="en-US" b="1" dirty="0"/>
-              <a:t>Graphs</a:t>
-            </a:r>
-            <a:endParaRPr lang="en-US" dirty="0"/>
+              <a:rPr lang="en-US" dirty="0" smtClean="0"/>
+              <a:t>Dealing </a:t>
+            </a:r>
+            <a:r>
+              <a:rPr lang="en-US" dirty="0"/>
+              <a:t>with collision</a:t>
+            </a:r>
+            <a:endParaRPr lang="ru-RU" dirty="0"/>
           </a:p>
         </p:txBody>
       </p:sp>
       <p:sp>
         <p:nvSpPr>
-          <p:cNvPr id="3" name="Content Placeholder 2"/>
-          <p:cNvSpPr>
-            <a:spLocks noGrp="1"/>
-          </p:cNvSpPr>
-          <p:nvPr>
-            <p:ph idx="1"/>
-          </p:nvPr>
+          <p:cNvPr id="4" name="TextBox 3"/>
+          <p:cNvSpPr txBox="1"/>
+          <p:nvPr/>
         </p:nvSpPr>
-        <p:spPr/>
+        <p:spPr>
+          <a:xfrm>
+            <a:off x="257577" y="953037"/>
+            <a:ext cx="6053071" cy="3693319"/>
+          </a:xfrm>
+          <a:prstGeom prst="rect">
+            <a:avLst/>
+          </a:prstGeom>
+          <a:noFill/>
+        </p:spPr>
         <p:txBody>
-          <a:bodyPr/>
+          <a:bodyPr wrap="square" rtlCol="0">
+            <a:spAutoFit/>
+          </a:bodyPr>
           <a:lstStyle/>
           <a:p>
             <a:r>
-              <a:rPr lang="ru-RU" dirty="0"/>
-              <a:t>Задача о семи </a:t>
-            </a:r>
-            <a:r>
-              <a:rPr lang="ru-RU" dirty="0" smtClean="0"/>
-              <a:t>мостах</a:t>
-            </a:r>
+              <a:rPr lang="en-US" dirty="0" smtClean="0"/>
+              <a:t>Even with a large array and a great hash function, collisions are inevitable</a:t>
+            </a:r>
+          </a:p>
+          <a:p>
+            <a:endParaRPr lang="en-US" dirty="0"/>
+          </a:p>
+          <a:p>
+            <a:r>
+              <a:rPr lang="en-US" dirty="0" smtClean="0"/>
+              <a:t>Two strategy, for handle collisions</a:t>
+            </a:r>
+          </a:p>
+          <a:p>
+            <a:pPr marL="285750" indent="-285750">
+              <a:buFont typeface="Arial" panose="020B0604020202020204" pitchFamily="34" charset="0"/>
+              <a:buChar char="•"/>
+            </a:pPr>
+            <a:r>
+              <a:rPr lang="en-US" dirty="0" smtClean="0"/>
+              <a:t>Separate chaining</a:t>
+            </a:r>
+          </a:p>
+          <a:p>
+            <a:pPr marL="285750" indent="-285750">
+              <a:buFont typeface="Arial" panose="020B0604020202020204" pitchFamily="34" charset="0"/>
+              <a:buChar char="•"/>
+            </a:pPr>
+            <a:r>
+              <a:rPr lang="en-US" dirty="0" smtClean="0"/>
+              <a:t>Linear probing</a:t>
+            </a:r>
+          </a:p>
+          <a:p>
+            <a:pPr marL="285750" indent="-285750">
+              <a:buFont typeface="Arial" panose="020B0604020202020204" pitchFamily="34" charset="0"/>
+              <a:buChar char="•"/>
+            </a:pPr>
+            <a:endParaRPr lang="en-US" dirty="0"/>
+          </a:p>
+          <a:p>
+            <a:r>
+              <a:rPr lang="en-US" dirty="0" smtClean="0"/>
+              <a:t>Separate chaining – </a:t>
+            </a:r>
+            <a:r>
+              <a:rPr lang="en-US" dirty="0"/>
+              <a:t>w</a:t>
+            </a:r>
+            <a:r>
+              <a:rPr lang="en-US" dirty="0" smtClean="0"/>
+              <a:t>e store multiply key-values in same index</a:t>
+            </a:r>
+          </a:p>
+          <a:p>
             <a:endParaRPr lang="en-US" dirty="0" smtClean="0"/>
           </a:p>
           <a:p>
-            <a:endParaRPr lang="en-US" dirty="0"/>
-          </a:p>
-          <a:p>
             <a:r>
               <a:rPr lang="en-US" dirty="0" smtClean="0"/>
-              <a:t>Dracula for </a:t>
-            </a:r>
-            <a:r>
-              <a:rPr lang="en-US" smtClean="0"/>
-              <a:t>graph visualization</a:t>
+              <a:t>Linear probing – search through the array to find the next empty slot, unlike separate chaining, we store only one key-value at one index</a:t>
             </a:r>
             <a:endParaRPr lang="ru-RU" dirty="0"/>
           </a:p>
-          <a:p>
-            <a:endParaRPr lang="en-US" dirty="0"/>
+        </p:txBody>
+      </p:sp>
+      <p:sp>
+        <p:nvSpPr>
+          <p:cNvPr id="10" name="TextBox 9"/>
+          <p:cNvSpPr txBox="1"/>
+          <p:nvPr/>
+        </p:nvSpPr>
+        <p:spPr>
+          <a:xfrm>
+            <a:off x="6310648" y="0"/>
+            <a:ext cx="4644190" cy="2492990"/>
+          </a:xfrm>
+          <a:prstGeom prst="rect">
+            <a:avLst/>
+          </a:prstGeom>
+          <a:noFill/>
+        </p:spPr>
+        <p:txBody>
+          <a:bodyPr wrap="square" rtlCol="0">
+            <a:spAutoFit/>
+          </a:bodyPr>
+          <a:lstStyle/>
+          <a:p>
+            <a:r>
+              <a:rPr lang="en-US" sz="1200" dirty="0" smtClean="0"/>
+              <a:t>Set / Get</a:t>
+            </a:r>
+          </a:p>
+          <a:p>
+            <a:r>
+              <a:rPr lang="en-US" sz="1200" dirty="0" smtClean="0"/>
+              <a:t>Set</a:t>
+            </a:r>
+          </a:p>
+          <a:p>
+            <a:endParaRPr lang="en-US" sz="1200" dirty="0"/>
+          </a:p>
+          <a:p>
+            <a:pPr marL="342900" indent="-342900">
+              <a:buFont typeface="+mj-lt"/>
+              <a:buAutoNum type="arabicPeriod"/>
+            </a:pPr>
+            <a:r>
+              <a:rPr lang="en-US" sz="1200" dirty="0" smtClean="0"/>
+              <a:t>Accept a key and a value</a:t>
+            </a:r>
+          </a:p>
+          <a:p>
+            <a:pPr marL="342900" indent="-342900">
+              <a:buFont typeface="+mj-lt"/>
+              <a:buAutoNum type="arabicPeriod"/>
+            </a:pPr>
+            <a:r>
+              <a:rPr lang="en-US" sz="1200" dirty="0" smtClean="0"/>
+              <a:t>Hashes the key</a:t>
+            </a:r>
+          </a:p>
+          <a:p>
+            <a:pPr marL="342900" indent="-342900">
+              <a:buFont typeface="+mj-lt"/>
+              <a:buAutoNum type="arabicPeriod"/>
+            </a:pPr>
+            <a:r>
+              <a:rPr lang="en-US" sz="1200" dirty="0" smtClean="0"/>
+              <a:t>Store the key-value pair in the hash table array via separate chaining</a:t>
+            </a:r>
+          </a:p>
+          <a:p>
+            <a:endParaRPr lang="en-US" sz="1200" dirty="0"/>
+          </a:p>
+          <a:p>
+            <a:r>
+              <a:rPr lang="en-US" sz="1200" dirty="0" smtClean="0"/>
+              <a:t>Get</a:t>
+            </a:r>
+          </a:p>
+          <a:p>
+            <a:pPr marL="342900" indent="-342900">
+              <a:buFont typeface="+mj-lt"/>
+              <a:buAutoNum type="arabicPeriod"/>
+            </a:pPr>
+            <a:r>
+              <a:rPr lang="en-US" sz="1200" dirty="0" smtClean="0"/>
+              <a:t>Accepts a key</a:t>
+            </a:r>
+          </a:p>
+          <a:p>
+            <a:pPr marL="342900" indent="-342900">
+              <a:buFont typeface="+mj-lt"/>
+              <a:buAutoNum type="arabicPeriod"/>
+            </a:pPr>
+            <a:r>
+              <a:rPr lang="en-US" sz="1200" dirty="0" smtClean="0"/>
+              <a:t>Hashes the key</a:t>
+            </a:r>
+          </a:p>
+          <a:p>
+            <a:pPr marL="342900" indent="-342900">
+              <a:buFont typeface="+mj-lt"/>
+              <a:buAutoNum type="arabicPeriod"/>
+            </a:pPr>
+            <a:r>
+              <a:rPr lang="en-US" sz="1200" dirty="0" smtClean="0"/>
+              <a:t>Retrieves the key-value pair in the hash table</a:t>
+            </a:r>
+          </a:p>
+          <a:p>
+            <a:pPr marL="342900" indent="-342900">
+              <a:buFont typeface="+mj-lt"/>
+              <a:buAutoNum type="arabicPeriod"/>
+            </a:pPr>
+            <a:r>
+              <a:rPr lang="en-US" sz="1200" dirty="0" smtClean="0"/>
+              <a:t>If the key isn’t found return undefined</a:t>
+            </a:r>
+            <a:endParaRPr lang="ru-RU" sz="1200" dirty="0"/>
+          </a:p>
+        </p:txBody>
+      </p:sp>
+      <p:sp>
+        <p:nvSpPr>
+          <p:cNvPr id="11" name="TextBox 10"/>
+          <p:cNvSpPr txBox="1"/>
+          <p:nvPr/>
+        </p:nvSpPr>
+        <p:spPr>
+          <a:xfrm>
+            <a:off x="6332508" y="2629113"/>
+            <a:ext cx="4644190" cy="2585323"/>
+          </a:xfrm>
+          <a:prstGeom prst="rect">
+            <a:avLst/>
+          </a:prstGeom>
+          <a:noFill/>
+        </p:spPr>
+        <p:txBody>
+          <a:bodyPr wrap="square" rtlCol="0">
+            <a:spAutoFit/>
+          </a:bodyPr>
+          <a:lstStyle/>
+          <a:p>
+            <a:r>
+              <a:rPr lang="en-US" dirty="0">
+                <a:solidFill>
+                  <a:srgbClr val="00B050"/>
+                </a:solidFill>
+              </a:rPr>
+              <a:t>In short, if you have data that doesn’t use too many inserts or deletes, and access the items frequently out of order, use an array. If you need data that can be quickly inserted and deleted into and is accessed mostly in sequential order, use a linked list. If you need a fast traversal then a hash table with a good hash function will be a better choice.</a:t>
+            </a:r>
+            <a:endParaRPr lang="en-US" sz="1600" dirty="0" smtClean="0">
+              <a:solidFill>
+                <a:srgbClr val="00B050"/>
+              </a:solidFill>
+            </a:endParaRPr>
+          </a:p>
+        </p:txBody>
+      </p:sp>
+      <p:sp>
+        <p:nvSpPr>
+          <p:cNvPr id="12" name="TextBox 11"/>
+          <p:cNvSpPr txBox="1"/>
+          <p:nvPr/>
+        </p:nvSpPr>
+        <p:spPr>
+          <a:xfrm>
+            <a:off x="433137" y="4957011"/>
+            <a:ext cx="5005137" cy="1477328"/>
+          </a:xfrm>
+          <a:prstGeom prst="rect">
+            <a:avLst/>
+          </a:prstGeom>
+          <a:noFill/>
+        </p:spPr>
+        <p:txBody>
+          <a:bodyPr wrap="square" rtlCol="0">
+            <a:spAutoFit/>
+          </a:bodyPr>
+          <a:lstStyle/>
+          <a:p>
+            <a:r>
+              <a:rPr lang="en-US" dirty="0" smtClean="0"/>
+              <a:t>Methods</a:t>
+            </a:r>
+          </a:p>
+          <a:p>
+            <a:r>
+              <a:rPr lang="en-US" dirty="0" smtClean="0"/>
+              <a:t>1)Set</a:t>
+            </a:r>
+          </a:p>
+          <a:p>
+            <a:r>
+              <a:rPr lang="en-US" dirty="0" smtClean="0"/>
+              <a:t>2)Get</a:t>
+            </a:r>
+          </a:p>
+          <a:p>
+            <a:r>
+              <a:rPr lang="en-US" dirty="0" smtClean="0"/>
+              <a:t>3)Keyes</a:t>
+            </a:r>
+          </a:p>
+          <a:p>
+            <a:r>
+              <a:rPr lang="en-US" dirty="0" smtClean="0"/>
+              <a:t>4)Values</a:t>
+            </a:r>
+          </a:p>
+        </p:txBody>
+      </p:sp>
+      <p:sp>
+        <p:nvSpPr>
+          <p:cNvPr id="13" name="TextBox 12"/>
+          <p:cNvSpPr txBox="1"/>
+          <p:nvPr/>
+        </p:nvSpPr>
+        <p:spPr>
+          <a:xfrm>
+            <a:off x="2601532" y="4479064"/>
+            <a:ext cx="8648842" cy="2062103"/>
+          </a:xfrm>
+          <a:prstGeom prst="rect">
+            <a:avLst/>
+          </a:prstGeom>
+          <a:noFill/>
+        </p:spPr>
+        <p:txBody>
+          <a:bodyPr wrap="square" rtlCol="0">
+            <a:spAutoFit/>
+          </a:bodyPr>
+          <a:lstStyle/>
+          <a:p>
+            <a:r>
+              <a:rPr lang="en-US" sz="1600" dirty="0" smtClean="0"/>
+              <a:t>Big o of hash tables</a:t>
+            </a:r>
+          </a:p>
+          <a:p>
+            <a:r>
+              <a:rPr lang="en-US" sz="1600" dirty="0" smtClean="0"/>
+              <a:t>Insert: O(1)</a:t>
+            </a:r>
+          </a:p>
+          <a:p>
+            <a:r>
+              <a:rPr lang="en-US" sz="1600" dirty="0" smtClean="0"/>
+              <a:t>Deletion: O(1)</a:t>
+            </a:r>
+          </a:p>
+          <a:p>
+            <a:r>
+              <a:rPr lang="en-US" sz="1600" dirty="0" smtClean="0"/>
+              <a:t>Access: O(1)</a:t>
+            </a:r>
+          </a:p>
+          <a:p>
+            <a:r>
+              <a:rPr lang="en-US" sz="1600" dirty="0" smtClean="0"/>
+              <a:t>Only with good hash function and O(n) for bad hash function</a:t>
+            </a:r>
+          </a:p>
+          <a:p>
+            <a:endParaRPr lang="en-US" sz="1600" dirty="0" smtClean="0"/>
+          </a:p>
+          <a:p>
+            <a:r>
+              <a:rPr lang="en-US" sz="1600" dirty="0" smtClean="0"/>
+              <a:t>Why we don’t use hash tables instead of arrays or linked list if there is so fast? </a:t>
+            </a:r>
+            <a:r>
+              <a:rPr lang="en-US" sz="1600" dirty="0"/>
+              <a:t>I</a:t>
+            </a:r>
+            <a:r>
+              <a:rPr lang="en-US" sz="1600" dirty="0" smtClean="0"/>
+              <a:t>t </a:t>
+            </a:r>
+            <a:r>
+              <a:rPr lang="en-US" sz="1600" dirty="0"/>
+              <a:t>doesn’t store its elements in any particular order</a:t>
+            </a:r>
+            <a:endParaRPr lang="ru-RU" sz="1600" dirty="0"/>
           </a:p>
         </p:txBody>
       </p:sp>
     </p:spTree>
     <p:extLst>
       <p:ext uri="{BB962C8B-B14F-4D97-AF65-F5344CB8AC3E}">
-        <p14:creationId xmlns:p14="http://schemas.microsoft.com/office/powerpoint/2010/main" val="1141804580"/>
+        <p14:creationId xmlns:p14="http://schemas.microsoft.com/office/powerpoint/2010/main" val="3273857439"/>
       </p:ext>
     </p:extLst>
   </p:cSld>
@@ -19224,8 +19578,8 @@
           <a:lstStyle/>
           <a:p>
             <a:r>
-              <a:rPr lang="en-US" b="1" dirty="0" smtClean="0"/>
-              <a:t>notes</a:t>
+              <a:rPr lang="en-US" b="1" dirty="0"/>
+              <a:t>Graphs</a:t>
             </a:r>
             <a:endParaRPr lang="en-US" dirty="0"/>
           </a:p>
@@ -19247,72 +19601,28 @@
           <a:lstStyle/>
           <a:p>
             <a:r>
+              <a:rPr lang="ru-RU" dirty="0"/>
+              <a:t>Задача о семи </a:t>
+            </a:r>
+            <a:r>
+              <a:rPr lang="ru-RU" dirty="0" smtClean="0"/>
+              <a:t>мостах</a:t>
+            </a:r>
+            <a:endParaRPr lang="en-US" dirty="0" smtClean="0"/>
+          </a:p>
+          <a:p>
+            <a:endParaRPr lang="en-US" dirty="0"/>
+          </a:p>
+          <a:p>
+            <a:r>
               <a:rPr lang="en-US" dirty="0" smtClean="0"/>
-              <a:t>Open all depends</a:t>
-            </a:r>
-          </a:p>
-          <a:p>
-            <a:r>
-              <a:rPr lang="en-US" dirty="0" err="1" smtClean="0">
-                <a:solidFill>
-                  <a:srgbClr val="FF0000"/>
-                </a:solidFill>
-              </a:rPr>
-              <a:t>Kapy</a:t>
-            </a:r>
-            <a:r>
-              <a:rPr lang="en-US" dirty="0" smtClean="0">
-                <a:solidFill>
-                  <a:srgbClr val="FF0000"/>
-                </a:solidFill>
-              </a:rPr>
-              <a:t> </a:t>
-            </a:r>
-            <a:r>
-              <a:rPr lang="en-US" dirty="0" err="1" smtClean="0">
-                <a:solidFill>
-                  <a:srgbClr val="FF0000"/>
-                </a:solidFill>
-              </a:rPr>
-              <a:t>algoneri</a:t>
-            </a:r>
-            <a:r>
-              <a:rPr lang="en-US" dirty="0" smtClean="0">
-                <a:solidFill>
-                  <a:srgbClr val="FF0000"/>
-                </a:solidFill>
-              </a:rPr>
-              <a:t> u ds </a:t>
-            </a:r>
-            <a:r>
-              <a:rPr lang="en-US" dirty="0" err="1" smtClean="0">
-                <a:solidFill>
-                  <a:srgbClr val="FF0000"/>
-                </a:solidFill>
-              </a:rPr>
-              <a:t>neri</a:t>
-            </a:r>
-            <a:r>
-              <a:rPr lang="en-US" dirty="0" smtClean="0">
-                <a:solidFill>
-                  <a:srgbClr val="FF0000"/>
-                </a:solidFill>
-              </a:rPr>
-              <a:t> </a:t>
-            </a:r>
-            <a:r>
-              <a:rPr lang="en-US" dirty="0" err="1" smtClean="0">
-                <a:solidFill>
-                  <a:srgbClr val="FF0000"/>
-                </a:solidFill>
-              </a:rPr>
-              <a:t>mej</a:t>
-            </a:r>
-            <a:endParaRPr lang="en-US" dirty="0" smtClean="0">
-              <a:solidFill>
-                <a:srgbClr val="FF0000"/>
-              </a:solidFill>
-            </a:endParaRPr>
+              <a:t>Dracula for </a:t>
+            </a:r>
+            <a:r>
+              <a:rPr lang="en-US" smtClean="0"/>
+              <a:t>graph visualization</a:t>
+            </a:r>
+            <a:endParaRPr lang="ru-RU" dirty="0"/>
           </a:p>
           <a:p>
             <a:endParaRPr lang="en-US" dirty="0"/>
@@ -19322,7 +19632,7 @@
     </p:spTree>
     <p:extLst>
       <p:ext uri="{BB962C8B-B14F-4D97-AF65-F5344CB8AC3E}">
-        <p14:creationId xmlns:p14="http://schemas.microsoft.com/office/powerpoint/2010/main" val="3205067114"/>
+        <p14:creationId xmlns:p14="http://schemas.microsoft.com/office/powerpoint/2010/main" val="1141804580"/>
       </p:ext>
     </p:extLst>
   </p:cSld>
@@ -19365,12 +19675,8 @@
           <a:lstStyle/>
           <a:p>
             <a:r>
-              <a:rPr lang="en-US" b="1" dirty="0"/>
-              <a:t>Dijkstra's </a:t>
-            </a:r>
-            <a:r>
               <a:rPr lang="en-US" b="1" dirty="0" smtClean="0"/>
-              <a:t>algorithm and A*</a:t>
+              <a:t>notes</a:t>
             </a:r>
             <a:endParaRPr lang="en-US" dirty="0"/>
           </a:p>
@@ -19378,77 +19684,102 @@
       </p:sp>
       <p:sp>
         <p:nvSpPr>
-          <p:cNvPr id="5" name="Rectangle 4"/>
-          <p:cNvSpPr/>
-          <p:nvPr/>
+          <p:cNvPr id="3" name="Content Placeholder 2"/>
+          <p:cNvSpPr>
+            <a:spLocks noGrp="1"/>
+          </p:cNvSpPr>
+          <p:nvPr>
+            <p:ph idx="1"/>
+          </p:nvPr>
         </p:nvSpPr>
-        <p:spPr>
-          <a:xfrm>
-            <a:off x="838200" y="1690688"/>
-            <a:ext cx="10515600" cy="1200329"/>
-          </a:xfrm>
-          <a:prstGeom prst="rect">
-            <a:avLst/>
-          </a:prstGeom>
-        </p:spPr>
+        <p:spPr/>
         <p:txBody>
-          <a:bodyPr wrap="square">
-            <a:spAutoFit/>
-          </a:bodyPr>
+          <a:bodyPr/>
           <a:lstStyle/>
           <a:p>
             <a:r>
-              <a:rPr lang="en-US" dirty="0"/>
-              <a:t>Dijkstra's algorithm (also called uniform cost search) allows us to prioritize path exploration. Instead of exploring all possible paths uniformly, he favors low cost paths. We can set a reduced cost to keep the algorithm on roads, an increased cost to avoid forests and enemies, and much more. When the cost of the movement may be different, we use it instead of Breadth First Search.</a:t>
-            </a:r>
-          </a:p>
-        </p:txBody>
-      </p:sp>
-      <p:sp>
-        <p:nvSpPr>
-          <p:cNvPr id="6" name="Rectangle 5"/>
-          <p:cNvSpPr/>
-          <p:nvPr/>
-        </p:nvSpPr>
-        <p:spPr>
-          <a:xfrm>
-            <a:off x="838200" y="3457486"/>
-            <a:ext cx="6096000" cy="1200329"/>
-          </a:xfrm>
-          <a:prstGeom prst="rect">
-            <a:avLst/>
-          </a:prstGeom>
-        </p:spPr>
-        <p:txBody>
-          <a:bodyPr>
-            <a:spAutoFit/>
-          </a:bodyPr>
-          <a:lstStyle/>
-          <a:p>
-            <a:r>
-              <a:rPr lang="en-US" dirty="0"/>
-              <a:t>A * is a modification of Dijkstra's algorithm optimized for a single endpoint. Dijkstra's algorithm can find paths to all points, A * finds a path to one point. He prioritizes paths that lead closer to the goal.</a:t>
-            </a:r>
+              <a:rPr lang="en-US" dirty="0" smtClean="0"/>
+              <a:t>Open all depends</a:t>
+            </a:r>
+          </a:p>
+          <a:p>
+            <a:r>
+              <a:rPr lang="en-US" dirty="0" err="1" smtClean="0">
+                <a:solidFill>
+                  <a:srgbClr val="FF0000"/>
+                </a:solidFill>
+              </a:rPr>
+              <a:t>Kapy</a:t>
+            </a:r>
+            <a:r>
+              <a:rPr lang="en-US" dirty="0" smtClean="0">
+                <a:solidFill>
+                  <a:srgbClr val="FF0000"/>
+                </a:solidFill>
+              </a:rPr>
+              <a:t> </a:t>
+            </a:r>
+            <a:r>
+              <a:rPr lang="en-US" dirty="0" err="1" smtClean="0">
+                <a:solidFill>
+                  <a:srgbClr val="FF0000"/>
+                </a:solidFill>
+              </a:rPr>
+              <a:t>algoneri</a:t>
+            </a:r>
+            <a:r>
+              <a:rPr lang="en-US" dirty="0" smtClean="0">
+                <a:solidFill>
+                  <a:srgbClr val="FF0000"/>
+                </a:solidFill>
+              </a:rPr>
+              <a:t> u ds </a:t>
+            </a:r>
+            <a:r>
+              <a:rPr lang="en-US" dirty="0" err="1" smtClean="0">
+                <a:solidFill>
+                  <a:srgbClr val="FF0000"/>
+                </a:solidFill>
+              </a:rPr>
+              <a:t>neri</a:t>
+            </a:r>
+            <a:r>
+              <a:rPr lang="en-US" dirty="0" smtClean="0">
+                <a:solidFill>
+                  <a:srgbClr val="FF0000"/>
+                </a:solidFill>
+              </a:rPr>
+              <a:t> </a:t>
+            </a:r>
+            <a:r>
+              <a:rPr lang="en-US" dirty="0" err="1" smtClean="0">
+                <a:solidFill>
+                  <a:srgbClr val="FF0000"/>
+                </a:solidFill>
+              </a:rPr>
+              <a:t>mej</a:t>
+            </a:r>
+            <a:endParaRPr lang="en-US" dirty="0" smtClean="0">
+              <a:solidFill>
+                <a:srgbClr val="FF0000"/>
+              </a:solidFill>
+            </a:endParaRPr>
+          </a:p>
+          <a:p>
+            <a:endParaRPr lang="en-US" dirty="0"/>
           </a:p>
         </p:txBody>
       </p:sp>
     </p:spTree>
     <p:extLst>
       <p:ext uri="{BB962C8B-B14F-4D97-AF65-F5344CB8AC3E}">
-        <p14:creationId xmlns:p14="http://schemas.microsoft.com/office/powerpoint/2010/main" val="3888841012"/>
+        <p14:creationId xmlns:p14="http://schemas.microsoft.com/office/powerpoint/2010/main" val="3205067114"/>
       </p:ext>
     </p:extLst>
   </p:cSld>
   <p:clrMapOvr>
     <a:masterClrMapping/>
   </p:clrMapOvr>
-  <p:timing>
-    <p:tnLst>
-      <p:par>
-        <p:cTn id="1" dur="indefinite" restart="never" nodeType="tmRoot"/>
-      </p:par>
-    </p:tnLst>
-  </p:timing>
 </p:sld>
 </file>
 

</xml_diff>

<commit_message>
Graphs - add vertex
</commit_message>
<xml_diff>
--- a/ds&a.pptx
+++ b/ds&a.pptx
@@ -5,7 +5,7 @@
     <p:sldMasterId id="2147483660" r:id="rId1"/>
   </p:sldMasterIdLst>
   <p:notesMasterIdLst>
-    <p:notesMasterId r:id="rId29"/>
+    <p:notesMasterId r:id="rId32"/>
   </p:notesMasterIdLst>
   <p:sldIdLst>
     <p:sldId id="281" r:id="rId2"/>
@@ -33,8 +33,11 @@
     <p:sldId id="264" r:id="rId24"/>
     <p:sldId id="289" r:id="rId25"/>
     <p:sldId id="290" r:id="rId26"/>
-    <p:sldId id="267" r:id="rId27"/>
-    <p:sldId id="280" r:id="rId28"/>
+    <p:sldId id="291" r:id="rId27"/>
+    <p:sldId id="292" r:id="rId28"/>
+    <p:sldId id="293" r:id="rId29"/>
+    <p:sldId id="267" r:id="rId30"/>
+    <p:sldId id="280" r:id="rId31"/>
   </p:sldIdLst>
   <p:sldSz cx="12192000" cy="6858000"/>
   <p:notesSz cx="6858000" cy="9144000"/>
@@ -20166,6 +20169,13 @@
   <p:clrMapOvr>
     <a:masterClrMapping/>
   </p:clrMapOvr>
+  <p:timing>
+    <p:tnLst>
+      <p:par>
+        <p:cTn id="1" dur="indefinite" restart="never" nodeType="tmRoot"/>
+      </p:par>
+    </p:tnLst>
+  </p:timing>
 </p:sld>
 </file>
 
@@ -20759,6 +20769,13 @@
   <p:clrMapOvr>
     <a:masterClrMapping/>
   </p:clrMapOvr>
+  <p:timing>
+    <p:tnLst>
+      <p:par>
+        <p:cTn id="1" dur="indefinite" restart="never" nodeType="tmRoot"/>
+      </p:par>
+    </p:tnLst>
+  </p:timing>
 </p:sld>
 </file>
 
@@ -21330,6 +21347,13 @@
   <p:clrMapOvr>
     <a:masterClrMapping/>
   </p:clrMapOvr>
+  <p:timing>
+    <p:tnLst>
+      <p:par>
+        <p:cTn id="1" dur="indefinite" restart="never" nodeType="tmRoot"/>
+      </p:par>
+    </p:tnLst>
+  </p:timing>
 </p:sld>
 </file>
 
@@ -21360,7 +21384,12 @@
             <p:ph type="title"/>
           </p:nvPr>
         </p:nvSpPr>
-        <p:spPr/>
+        <p:spPr>
+          <a:xfrm>
+            <a:off x="0" y="0"/>
+            <a:ext cx="9610000" cy="844400"/>
+          </a:xfrm>
+        </p:spPr>
         <p:txBody>
           <a:bodyPr/>
           <a:lstStyle/>
@@ -21389,74 +21418,412 @@
             <p:ph idx="1"/>
           </p:nvPr>
         </p:nvSpPr>
-        <p:spPr/>
+        <p:spPr>
+          <a:xfrm>
+            <a:off x="0" y="844400"/>
+            <a:ext cx="9610000" cy="5169538"/>
+          </a:xfrm>
+        </p:spPr>
         <p:txBody>
           <a:bodyPr/>
           <a:lstStyle/>
           <a:p>
-            <a:r>
-              <a:rPr lang="ru-RU" dirty="0">
-                <a:latin typeface="Segoe UI" panose="020B0502040204020203" pitchFamily="34" charset="0"/>
-                <a:cs typeface="Segoe UI" panose="020B0502040204020203" pitchFamily="34" charset="0"/>
-              </a:rPr>
-              <a:t>Задача о семи </a:t>
-            </a:r>
-            <a:r>
-              <a:rPr lang="ru-RU" dirty="0" smtClean="0">
-                <a:latin typeface="Segoe UI" panose="020B0502040204020203" pitchFamily="34" charset="0"/>
-                <a:cs typeface="Segoe UI" panose="020B0502040204020203" pitchFamily="34" charset="0"/>
-              </a:rPr>
-              <a:t>мостах</a:t>
-            </a:r>
-            <a:endParaRPr lang="en-US" dirty="0" smtClean="0">
+            <a:pPr marL="76200" indent="0">
+              <a:buNone/>
+            </a:pPr>
+            <a:endParaRPr lang="en-US" sz="1200" dirty="0">
               <a:latin typeface="Segoe UI" panose="020B0502040204020203" pitchFamily="34" charset="0"/>
               <a:cs typeface="Segoe UI" panose="020B0502040204020203" pitchFamily="34" charset="0"/>
             </a:endParaRPr>
           </a:p>
           <a:p>
-            <a:endParaRPr lang="en-US" dirty="0">
+            <a:pPr marL="76200" indent="0">
+              <a:buNone/>
+            </a:pPr>
+            <a:r>
+              <a:rPr lang="en-US" sz="1200" dirty="0" smtClean="0">
+                <a:latin typeface="Segoe UI" panose="020B0502040204020203" pitchFamily="34" charset="0"/>
+                <a:cs typeface="Segoe UI" panose="020B0502040204020203" pitchFamily="34" charset="0"/>
+              </a:rPr>
+              <a:t>Objectives</a:t>
+            </a:r>
+          </a:p>
+          <a:p>
+            <a:r>
+              <a:rPr lang="en-US" sz="1200" dirty="0" smtClean="0">
+                <a:latin typeface="Segoe UI" panose="020B0502040204020203" pitchFamily="34" charset="0"/>
+                <a:cs typeface="Segoe UI" panose="020B0502040204020203" pitchFamily="34" charset="0"/>
+              </a:rPr>
+              <a:t>Explain what a graph</a:t>
+            </a:r>
+          </a:p>
+          <a:p>
+            <a:r>
+              <a:rPr lang="en-US" sz="1200" dirty="0" smtClean="0">
+                <a:latin typeface="Segoe UI" panose="020B0502040204020203" pitchFamily="34" charset="0"/>
+                <a:cs typeface="Segoe UI" panose="020B0502040204020203" pitchFamily="34" charset="0"/>
+              </a:rPr>
+              <a:t>Compare and contrast different types of graphs and their cases in the real world</a:t>
+            </a:r>
+          </a:p>
+          <a:p>
+            <a:r>
+              <a:rPr lang="en-US" sz="1200" dirty="0" smtClean="0">
+                <a:latin typeface="Segoe UI" panose="020B0502040204020203" pitchFamily="34" charset="0"/>
+                <a:cs typeface="Segoe UI" panose="020B0502040204020203" pitchFamily="34" charset="0"/>
+              </a:rPr>
+              <a:t>Implement a graph using adjacency list</a:t>
+            </a:r>
+          </a:p>
+          <a:p>
+            <a:r>
+              <a:rPr lang="en-US" sz="1200" dirty="0" smtClean="0">
+                <a:latin typeface="Segoe UI" panose="020B0502040204020203" pitchFamily="34" charset="0"/>
+                <a:cs typeface="Segoe UI" panose="020B0502040204020203" pitchFamily="34" charset="0"/>
+              </a:rPr>
+              <a:t>Traverse through a graph using BFS and DFS</a:t>
+            </a:r>
+          </a:p>
+          <a:p>
+            <a:r>
+              <a:rPr lang="en-US" sz="1200" dirty="0">
+                <a:latin typeface="Segoe UI" panose="020B0502040204020203" pitchFamily="34" charset="0"/>
+                <a:cs typeface="Segoe UI" panose="020B0502040204020203" pitchFamily="34" charset="0"/>
+              </a:rPr>
+              <a:t>Compare and </a:t>
+            </a:r>
+            <a:r>
+              <a:rPr lang="en-US" sz="1200" dirty="0" smtClean="0">
+                <a:latin typeface="Segoe UI" panose="020B0502040204020203" pitchFamily="34" charset="0"/>
+                <a:cs typeface="Segoe UI" panose="020B0502040204020203" pitchFamily="34" charset="0"/>
+              </a:rPr>
+              <a:t>contrast graph traversal algorithms</a:t>
+            </a:r>
+            <a:endParaRPr lang="en-US" sz="1200" dirty="0" smtClean="0">
               <a:latin typeface="Segoe UI" panose="020B0502040204020203" pitchFamily="34" charset="0"/>
               <a:cs typeface="Segoe UI" panose="020B0502040204020203" pitchFamily="34" charset="0"/>
             </a:endParaRPr>
           </a:p>
           <a:p>
-            <a:r>
-              <a:rPr lang="en-US" dirty="0" smtClean="0">
-                <a:latin typeface="Segoe UI" panose="020B0502040204020203" pitchFamily="34" charset="0"/>
-                <a:cs typeface="Segoe UI" panose="020B0502040204020203" pitchFamily="34" charset="0"/>
-              </a:rPr>
-              <a:t>Dracula for </a:t>
-            </a:r>
-            <a:r>
-              <a:rPr lang="en-US" smtClean="0">
-                <a:latin typeface="Segoe UI" panose="020B0502040204020203" pitchFamily="34" charset="0"/>
-                <a:cs typeface="Segoe UI" panose="020B0502040204020203" pitchFamily="34" charset="0"/>
-              </a:rPr>
-              <a:t>graph visualization</a:t>
-            </a:r>
-            <a:endParaRPr lang="ru-RU" dirty="0">
+            <a:endParaRPr lang="en-US" sz="1200" dirty="0" smtClean="0">
               <a:latin typeface="Segoe UI" panose="020B0502040204020203" pitchFamily="34" charset="0"/>
               <a:cs typeface="Segoe UI" panose="020B0502040204020203" pitchFamily="34" charset="0"/>
             </a:endParaRPr>
           </a:p>
           <a:p>
-            <a:endParaRPr lang="en-US" dirty="0">
+            <a:pPr marL="76200" indent="0">
+              <a:buNone/>
+            </a:pPr>
+            <a:r>
+              <a:rPr lang="en-US" sz="1200" dirty="0" smtClean="0">
+                <a:latin typeface="Segoe UI" panose="020B0502040204020203" pitchFamily="34" charset="0"/>
+                <a:cs typeface="Segoe UI" panose="020B0502040204020203" pitchFamily="34" charset="0"/>
+              </a:rPr>
+              <a:t>What is graph? </a:t>
+            </a:r>
+          </a:p>
+          <a:p>
+            <a:pPr marL="76200" indent="0">
+              <a:buNone/>
+            </a:pPr>
+            <a:r>
+              <a:rPr lang="en-US" sz="1200" dirty="0" smtClean="0">
+                <a:latin typeface="Segoe UI" panose="020B0502040204020203" pitchFamily="34" charset="0"/>
+                <a:cs typeface="Segoe UI" panose="020B0502040204020203" pitchFamily="34" charset="0"/>
+              </a:rPr>
+              <a:t>Graph is a data structure consists of a finite (and possibly mutable) set of vertices or nodes or points, together with a set of unordered pairs of these vertices for an undirected graph or a set of ordered pairs for a directed graph</a:t>
+            </a:r>
+            <a:endParaRPr lang="en-US" sz="1200" dirty="0" smtClean="0">
               <a:latin typeface="Segoe UI" panose="020B0502040204020203" pitchFamily="34" charset="0"/>
               <a:cs typeface="Segoe UI" panose="020B0502040204020203" pitchFamily="34" charset="0"/>
             </a:endParaRPr>
           </a:p>
+          <a:p>
+            <a:pPr marL="76200" indent="0">
+              <a:buNone/>
+            </a:pPr>
+            <a:r>
+              <a:rPr lang="en-US" sz="1200" dirty="0" smtClean="0">
+                <a:solidFill>
+                  <a:schemeClr val="accent3">
+                    <a:lumMod val="50000"/>
+                  </a:schemeClr>
+                </a:solidFill>
+                <a:latin typeface="Segoe UI" panose="020B0502040204020203" pitchFamily="34" charset="0"/>
+                <a:cs typeface="Segoe UI" panose="020B0502040204020203" pitchFamily="34" charset="0"/>
+              </a:rPr>
+              <a:t>(Nodes and connections)</a:t>
+            </a:r>
+          </a:p>
+          <a:p>
+            <a:pPr marL="76200" indent="0">
+              <a:buNone/>
+            </a:pPr>
+            <a:endParaRPr lang="en-US" sz="1200" dirty="0">
+              <a:solidFill>
+                <a:schemeClr val="accent3">
+                  <a:lumMod val="50000"/>
+                </a:schemeClr>
+              </a:solidFill>
+              <a:latin typeface="Segoe UI" panose="020B0502040204020203" pitchFamily="34" charset="0"/>
+              <a:cs typeface="Segoe UI" panose="020B0502040204020203" pitchFamily="34" charset="0"/>
+            </a:endParaRPr>
+          </a:p>
+          <a:p>
+            <a:pPr marL="76200" indent="0">
+              <a:buNone/>
+            </a:pPr>
+            <a:r>
+              <a:rPr lang="en-US" sz="1200" dirty="0" smtClean="0">
+                <a:solidFill>
+                  <a:schemeClr val="tx1"/>
+                </a:solidFill>
+                <a:latin typeface="Segoe UI" panose="020B0502040204020203" pitchFamily="34" charset="0"/>
+                <a:cs typeface="Segoe UI" panose="020B0502040204020203" pitchFamily="34" charset="0"/>
+              </a:rPr>
+              <a:t>Tree is a  type of graph, but graph ha no root element, or child nodes, there are just nodes, connected with each other</a:t>
+            </a:r>
+          </a:p>
+          <a:p>
+            <a:pPr marL="76200" indent="0">
+              <a:buNone/>
+            </a:pPr>
+            <a:r>
+              <a:rPr lang="en-US" sz="1200" dirty="0">
+                <a:solidFill>
+                  <a:schemeClr val="tx1"/>
+                </a:solidFill>
+                <a:latin typeface="Segoe UI" panose="020B0502040204020203" pitchFamily="34" charset="0"/>
+                <a:cs typeface="Segoe UI" panose="020B0502040204020203" pitchFamily="34" charset="0"/>
+              </a:rPr>
+              <a:t>In graph theory, a tree is an undirected graph in which any two vertices are connected by exactly one </a:t>
+            </a:r>
+            <a:r>
+              <a:rPr lang="en-US" sz="1200" dirty="0" smtClean="0">
+                <a:solidFill>
+                  <a:schemeClr val="tx1"/>
+                </a:solidFill>
+                <a:latin typeface="Segoe UI" panose="020B0502040204020203" pitchFamily="34" charset="0"/>
+                <a:cs typeface="Segoe UI" panose="020B0502040204020203" pitchFamily="34" charset="0"/>
+              </a:rPr>
+              <a:t>path</a:t>
+            </a:r>
+          </a:p>
+          <a:p>
+            <a:pPr marL="76200" indent="0">
+              <a:buNone/>
+            </a:pPr>
+            <a:endParaRPr lang="en-US" sz="1200" dirty="0">
+              <a:solidFill>
+                <a:schemeClr val="tx1"/>
+              </a:solidFill>
+              <a:latin typeface="Segoe UI" panose="020B0502040204020203" pitchFamily="34" charset="0"/>
+              <a:cs typeface="Segoe UI" panose="020B0502040204020203" pitchFamily="34" charset="0"/>
+            </a:endParaRPr>
+          </a:p>
+          <a:p>
+            <a:r>
+              <a:rPr lang="en-US" sz="1200" dirty="0">
+                <a:latin typeface="Segoe UI" panose="020B0502040204020203" pitchFamily="34" charset="0"/>
+                <a:cs typeface="Segoe UI" panose="020B0502040204020203" pitchFamily="34" charset="0"/>
+              </a:rPr>
+              <a:t>Any social network – friend</a:t>
+            </a:r>
+          </a:p>
+          <a:p>
+            <a:r>
+              <a:rPr lang="en-US" sz="1200" dirty="0">
+                <a:latin typeface="Segoe UI" panose="020B0502040204020203" pitchFamily="34" charset="0"/>
+                <a:cs typeface="Segoe UI" panose="020B0502040204020203" pitchFamily="34" charset="0"/>
+              </a:rPr>
+              <a:t>Recommendation </a:t>
+            </a:r>
+            <a:r>
+              <a:rPr lang="en-US" sz="1200" dirty="0" smtClean="0">
+                <a:latin typeface="Segoe UI" panose="020B0502040204020203" pitchFamily="34" charset="0"/>
+                <a:cs typeface="Segoe UI" panose="020B0502040204020203" pitchFamily="34" charset="0"/>
+              </a:rPr>
+              <a:t>engines(people also watched, You might also like…, people you might know)</a:t>
+            </a:r>
+          </a:p>
+          <a:p>
+            <a:r>
+              <a:rPr lang="en-US" sz="1200" dirty="0" smtClean="0">
+                <a:latin typeface="Segoe UI" panose="020B0502040204020203" pitchFamily="34" charset="0"/>
+                <a:cs typeface="Segoe UI" panose="020B0502040204020203" pitchFamily="34" charset="0"/>
+              </a:rPr>
+              <a:t>Routing algorithms( cities are nodes and routes between there is edges)</a:t>
+            </a:r>
+          </a:p>
+          <a:p>
+            <a:r>
+              <a:rPr lang="en-US" sz="1200" dirty="0" smtClean="0">
+                <a:latin typeface="Segoe UI" panose="020B0502040204020203" pitchFamily="34" charset="0"/>
+                <a:cs typeface="Segoe UI" panose="020B0502040204020203" pitchFamily="34" charset="0"/>
+              </a:rPr>
+              <a:t>Web – pages linked to other pages</a:t>
+            </a:r>
+            <a:endParaRPr lang="en-US" sz="1200" dirty="0">
+              <a:latin typeface="Segoe UI" panose="020B0502040204020203" pitchFamily="34" charset="0"/>
+              <a:cs typeface="Segoe UI" panose="020B0502040204020203" pitchFamily="34" charset="0"/>
+            </a:endParaRPr>
+          </a:p>
+          <a:p>
+            <a:r>
+              <a:rPr lang="en-US" sz="1200" dirty="0" smtClean="0">
+                <a:latin typeface="Segoe UI" panose="020B0502040204020203" pitchFamily="34" charset="0"/>
+                <a:cs typeface="Segoe UI" panose="020B0502040204020203" pitchFamily="34" charset="0"/>
+              </a:rPr>
+              <a:t>Everywhere</a:t>
+            </a:r>
+          </a:p>
+          <a:p>
+            <a:pPr marL="76200" indent="0">
+              <a:buNone/>
+            </a:pPr>
+            <a:endParaRPr lang="en-US" sz="1200" dirty="0" smtClean="0">
+              <a:latin typeface="Segoe UI" panose="020B0502040204020203" pitchFamily="34" charset="0"/>
+              <a:cs typeface="Segoe UI" panose="020B0502040204020203" pitchFamily="34" charset="0"/>
+            </a:endParaRPr>
+          </a:p>
+          <a:p>
+            <a:pPr marL="76200" indent="0">
+              <a:buNone/>
+            </a:pPr>
+            <a:r>
+              <a:rPr lang="en-US" sz="1200" dirty="0">
+                <a:latin typeface="Segoe UI" panose="020B0502040204020203" pitchFamily="34" charset="0"/>
+                <a:cs typeface="Segoe UI" panose="020B0502040204020203" pitchFamily="34" charset="0"/>
+                <a:hlinkClick r:id="rId2"/>
+              </a:rPr>
+              <a:t>https://musicmap.info/</a:t>
+            </a:r>
+            <a:endParaRPr lang="en-US" sz="1200" dirty="0">
+              <a:latin typeface="Segoe UI" panose="020B0502040204020203" pitchFamily="34" charset="0"/>
+              <a:cs typeface="Segoe UI" panose="020B0502040204020203" pitchFamily="34" charset="0"/>
+            </a:endParaRPr>
+          </a:p>
+          <a:p>
+            <a:pPr marL="76200" indent="0">
+              <a:buNone/>
+            </a:pPr>
+            <a:endParaRPr lang="en-US" sz="1200" dirty="0">
+              <a:solidFill>
+                <a:schemeClr val="tx1"/>
+              </a:solidFill>
+              <a:latin typeface="Segoe UI" panose="020B0502040204020203" pitchFamily="34" charset="0"/>
+              <a:cs typeface="Segoe UI" panose="020B0502040204020203" pitchFamily="34" charset="0"/>
+            </a:endParaRPr>
+          </a:p>
         </p:txBody>
       </p:sp>
+      <p:pic>
+        <p:nvPicPr>
+          <p:cNvPr id="4" name="Рисунок 3"/>
+          <p:cNvPicPr>
+            <a:picLocks noChangeAspect="1"/>
+          </p:cNvPicPr>
+          <p:nvPr/>
+        </p:nvPicPr>
+        <p:blipFill>
+          <a:blip r:embed="rId3" cstate="print">
+            <a:extLst>
+              <a:ext uri="{28A0092B-C50C-407E-A947-70E740481C1C}">
+                <a14:useLocalDpi xmlns:a14="http://schemas.microsoft.com/office/drawing/2010/main" val="0"/>
+              </a:ext>
+            </a:extLst>
+          </a:blip>
+          <a:stretch>
+            <a:fillRect/>
+          </a:stretch>
+        </p:blipFill>
+        <p:spPr>
+          <a:xfrm>
+            <a:off x="9252024" y="0"/>
+            <a:ext cx="2939976" cy="2617787"/>
+          </a:xfrm>
+          <a:prstGeom prst="rect">
+            <a:avLst/>
+          </a:prstGeom>
+        </p:spPr>
+      </p:pic>
+      <p:pic>
+        <p:nvPicPr>
+          <p:cNvPr id="5" name="Picture 4"/>
+          <p:cNvPicPr>
+            <a:picLocks noChangeAspect="1"/>
+          </p:cNvPicPr>
+          <p:nvPr/>
+        </p:nvPicPr>
+        <p:blipFill>
+          <a:blip r:embed="rId4">
+            <a:extLst>
+              <a:ext uri="{28A0092B-C50C-407E-A947-70E740481C1C}">
+                <a14:useLocalDpi xmlns:a14="http://schemas.microsoft.com/office/drawing/2010/main" val="0"/>
+              </a:ext>
+            </a:extLst>
+          </a:blip>
+          <a:stretch>
+            <a:fillRect/>
+          </a:stretch>
+        </p:blipFill>
+        <p:spPr>
+          <a:xfrm>
+            <a:off x="4805000" y="242093"/>
+            <a:ext cx="4286250" cy="1066800"/>
+          </a:xfrm>
+          <a:prstGeom prst="rect">
+            <a:avLst/>
+          </a:prstGeom>
+        </p:spPr>
+      </p:pic>
+      <p:pic>
+        <p:nvPicPr>
+          <p:cNvPr id="6" name="Picture 5"/>
+          <p:cNvPicPr>
+            <a:picLocks noChangeAspect="1"/>
+          </p:cNvPicPr>
+          <p:nvPr/>
+        </p:nvPicPr>
+        <p:blipFill>
+          <a:blip r:embed="rId5">
+            <a:extLst>
+              <a:ext uri="{28A0092B-C50C-407E-A947-70E740481C1C}">
+                <a14:useLocalDpi xmlns:a14="http://schemas.microsoft.com/office/drawing/2010/main" val="0"/>
+              </a:ext>
+            </a:extLst>
+          </a:blip>
+          <a:stretch>
+            <a:fillRect/>
+          </a:stretch>
+        </p:blipFill>
+        <p:spPr>
+          <a:xfrm>
+            <a:off x="8591032" y="3272403"/>
+            <a:ext cx="3395813" cy="3395813"/>
+          </a:xfrm>
+          <a:prstGeom prst="rect">
+            <a:avLst/>
+          </a:prstGeom>
+        </p:spPr>
+      </p:pic>
     </p:spTree>
     <p:extLst>
       <p:ext uri="{BB962C8B-B14F-4D97-AF65-F5344CB8AC3E}">
-        <p14:creationId xmlns:p14="http://schemas.microsoft.com/office/powerpoint/2010/main" val="1141804580"/>
+        <p14:creationId xmlns:p14="http://schemas.microsoft.com/office/powerpoint/2010/main" val="265621626"/>
       </p:ext>
     </p:extLst>
   </p:cSld>
   <p:clrMapOvr>
     <a:masterClrMapping/>
   </p:clrMapOvr>
+  <p:timing>
+    <p:tnLst>
+      <p:par>
+        <p:cTn id="1" dur="indefinite" restart="never" nodeType="tmRoot"/>
+      </p:par>
+    </p:tnLst>
+  </p:timing>
 </p:sld>
 </file>
 
@@ -21487,17 +21854,289 @@
             <p:ph type="title"/>
           </p:nvPr>
         </p:nvSpPr>
+        <p:spPr>
+          <a:xfrm>
+            <a:off x="0" y="0"/>
+            <a:ext cx="9610000" cy="844400"/>
+          </a:xfrm>
+        </p:spPr>
+        <p:txBody>
+          <a:bodyPr/>
+          <a:lstStyle/>
+          <a:p>
+            <a:r>
+              <a:rPr lang="en-US" b="1" dirty="0">
+                <a:latin typeface="Segoe UI" panose="020B0502040204020203" pitchFamily="34" charset="0"/>
+                <a:cs typeface="Segoe UI" panose="020B0502040204020203" pitchFamily="34" charset="0"/>
+              </a:rPr>
+              <a:t>Graphs</a:t>
+            </a:r>
+            <a:endParaRPr lang="en-US" dirty="0">
+              <a:latin typeface="Segoe UI" panose="020B0502040204020203" pitchFamily="34" charset="0"/>
+              <a:cs typeface="Segoe UI" panose="020B0502040204020203" pitchFamily="34" charset="0"/>
+            </a:endParaRPr>
+          </a:p>
+        </p:txBody>
+      </p:sp>
+      <p:sp>
+        <p:nvSpPr>
+          <p:cNvPr id="8" name="Content Placeholder 7"/>
+          <p:cNvSpPr>
+            <a:spLocks noGrp="1"/>
+          </p:cNvSpPr>
+          <p:nvPr>
+            <p:ph idx="1"/>
+          </p:nvPr>
+        </p:nvSpPr>
+        <p:spPr>
+          <a:xfrm>
+            <a:off x="0" y="990678"/>
+            <a:ext cx="9610000" cy="5515629"/>
+          </a:xfrm>
+        </p:spPr>
+        <p:txBody>
+          <a:bodyPr/>
+          <a:lstStyle/>
+          <a:p>
+            <a:pPr marL="76200" indent="0">
+              <a:buNone/>
+            </a:pPr>
+            <a:r>
+              <a:rPr lang="en-US" dirty="0" smtClean="0">
+                <a:latin typeface="Segoe UI" panose="020B0502040204020203" pitchFamily="34" charset="0"/>
+                <a:cs typeface="Segoe UI" panose="020B0502040204020203" pitchFamily="34" charset="0"/>
+              </a:rPr>
+              <a:t>Terminology</a:t>
+            </a:r>
+          </a:p>
+          <a:p>
+            <a:r>
+              <a:rPr lang="en-US" dirty="0" smtClean="0">
+                <a:latin typeface="Segoe UI" panose="020B0502040204020203" pitchFamily="34" charset="0"/>
+                <a:cs typeface="Segoe UI" panose="020B0502040204020203" pitchFamily="34" charset="0"/>
+              </a:rPr>
+              <a:t>Vertex – a node</a:t>
+            </a:r>
+          </a:p>
+          <a:p>
+            <a:r>
+              <a:rPr lang="en-US" dirty="0" smtClean="0">
+                <a:latin typeface="Segoe UI" panose="020B0502040204020203" pitchFamily="34" charset="0"/>
+                <a:cs typeface="Segoe UI" panose="020B0502040204020203" pitchFamily="34" charset="0"/>
+              </a:rPr>
+              <a:t>Edge – connection between nodes</a:t>
+            </a:r>
+          </a:p>
+          <a:p>
+            <a:r>
+              <a:rPr lang="en-US" dirty="0" smtClean="0">
+                <a:latin typeface="Segoe UI" panose="020B0502040204020203" pitchFamily="34" charset="0"/>
+                <a:cs typeface="Segoe UI" panose="020B0502040204020203" pitchFamily="34" charset="0"/>
+              </a:rPr>
+              <a:t>Weighted / Unweighted – values assigned to distances between vertices ( map / Instagram followers )</a:t>
+            </a:r>
+          </a:p>
+          <a:p>
+            <a:r>
+              <a:rPr lang="en-US" dirty="0" smtClean="0">
+                <a:latin typeface="Segoe UI" panose="020B0502040204020203" pitchFamily="34" charset="0"/>
+                <a:cs typeface="Segoe UI" panose="020B0502040204020203" pitchFamily="34" charset="0"/>
+              </a:rPr>
+              <a:t>Directed / Undirected – directions assigned to distanced </a:t>
+            </a:r>
+            <a:r>
+              <a:rPr lang="en-US" dirty="0">
+                <a:latin typeface="Segoe UI" panose="020B0502040204020203" pitchFamily="34" charset="0"/>
+                <a:cs typeface="Segoe UI" panose="020B0502040204020203" pitchFamily="34" charset="0"/>
+              </a:rPr>
+              <a:t>between vertices (one way </a:t>
+            </a:r>
+            <a:r>
+              <a:rPr lang="en-US" dirty="0" smtClean="0">
+                <a:latin typeface="Segoe UI" panose="020B0502040204020203" pitchFamily="34" charset="0"/>
+                <a:cs typeface="Segoe UI" panose="020B0502040204020203" pitchFamily="34" charset="0"/>
+              </a:rPr>
+              <a:t>street / friends </a:t>
+            </a:r>
+            <a:r>
+              <a:rPr lang="en-US" dirty="0">
+                <a:latin typeface="Segoe UI" panose="020B0502040204020203" pitchFamily="34" charset="0"/>
+                <a:cs typeface="Segoe UI" panose="020B0502040204020203" pitchFamily="34" charset="0"/>
+              </a:rPr>
+              <a:t>on </a:t>
+            </a:r>
+            <a:r>
+              <a:rPr lang="en-US" dirty="0" smtClean="0">
+                <a:latin typeface="Segoe UI" panose="020B0502040204020203" pitchFamily="34" charset="0"/>
+                <a:cs typeface="Segoe UI" panose="020B0502040204020203" pitchFamily="34" charset="0"/>
+              </a:rPr>
+              <a:t>Facebook )</a:t>
+            </a:r>
+          </a:p>
+          <a:p>
+            <a:endParaRPr lang="en-US" dirty="0">
+              <a:latin typeface="Segoe UI" panose="020B0502040204020203" pitchFamily="34" charset="0"/>
+              <a:cs typeface="Segoe UI" panose="020B0502040204020203" pitchFamily="34" charset="0"/>
+            </a:endParaRPr>
+          </a:p>
+        </p:txBody>
+      </p:sp>
+    </p:spTree>
+    <p:extLst>
+      <p:ext uri="{BB962C8B-B14F-4D97-AF65-F5344CB8AC3E}">
+        <p14:creationId xmlns:p14="http://schemas.microsoft.com/office/powerpoint/2010/main" val="4274038994"/>
+      </p:ext>
+    </p:extLst>
+  </p:cSld>
+  <p:clrMapOvr>
+    <a:masterClrMapping/>
+  </p:clrMapOvr>
+  <p:timing>
+    <p:tnLst>
+      <p:par>
+        <p:cTn id="1" dur="indefinite" restart="never" nodeType="tmRoot"/>
+      </p:par>
+    </p:tnLst>
+  </p:timing>
+</p:sld>
+</file>
+
+<file path=ppt/slides/slide28.xml><?xml version="1.0" encoding="utf-8"?>
+<p:sld xmlns:a="http://schemas.openxmlformats.org/drawingml/2006/main" xmlns:r="http://schemas.openxmlformats.org/officeDocument/2006/relationships" xmlns:p="http://schemas.openxmlformats.org/presentationml/2006/main">
+  <p:cSld>
+    <p:spTree>
+      <p:nvGrpSpPr>
+        <p:cNvPr id="1" name=""/>
+        <p:cNvGrpSpPr/>
+        <p:nvPr/>
+      </p:nvGrpSpPr>
+      <p:grpSpPr>
+        <a:xfrm>
+          <a:off x="0" y="0"/>
+          <a:ext cx="0" cy="0"/>
+          <a:chOff x="0" y="0"/>
+          <a:chExt cx="0" cy="0"/>
+        </a:xfrm>
+      </p:grpSpPr>
+      <p:sp>
+        <p:nvSpPr>
+          <p:cNvPr id="2" name="Title 1"/>
+          <p:cNvSpPr>
+            <a:spLocks noGrp="1"/>
+          </p:cNvSpPr>
+          <p:nvPr>
+            <p:ph type="title"/>
+          </p:nvPr>
+        </p:nvSpPr>
+        <p:spPr>
+          <a:xfrm>
+            <a:off x="0" y="0"/>
+            <a:ext cx="9610000" cy="844400"/>
+          </a:xfrm>
+        </p:spPr>
+        <p:txBody>
+          <a:bodyPr/>
+          <a:lstStyle/>
+          <a:p>
+            <a:r>
+              <a:rPr lang="en-US" b="1" dirty="0">
+                <a:latin typeface="Segoe UI" panose="020B0502040204020203" pitchFamily="34" charset="0"/>
+                <a:cs typeface="Segoe UI" panose="020B0502040204020203" pitchFamily="34" charset="0"/>
+              </a:rPr>
+              <a:t>Graphs</a:t>
+            </a:r>
+            <a:endParaRPr lang="en-US" dirty="0">
+              <a:latin typeface="Segoe UI" panose="020B0502040204020203" pitchFamily="34" charset="0"/>
+              <a:cs typeface="Segoe UI" panose="020B0502040204020203" pitchFamily="34" charset="0"/>
+            </a:endParaRPr>
+          </a:p>
+        </p:txBody>
+      </p:sp>
+      <p:sp>
+        <p:nvSpPr>
+          <p:cNvPr id="3" name="Content Placeholder 2"/>
+          <p:cNvSpPr>
+            <a:spLocks noGrp="1"/>
+          </p:cNvSpPr>
+          <p:nvPr>
+            <p:ph idx="1"/>
+          </p:nvPr>
+        </p:nvSpPr>
+        <p:spPr>
+          <a:xfrm>
+            <a:off x="284802" y="1096187"/>
+            <a:ext cx="9610000" cy="3676800"/>
+          </a:xfrm>
+        </p:spPr>
+        <p:txBody>
+          <a:bodyPr/>
+          <a:lstStyle/>
+          <a:p>
+            <a:endParaRPr lang="en-US" dirty="0">
+              <a:latin typeface="Segoe UI" panose="020B0502040204020203" pitchFamily="34" charset="0"/>
+              <a:cs typeface="Segoe UI" panose="020B0502040204020203" pitchFamily="34" charset="0"/>
+            </a:endParaRPr>
+          </a:p>
+        </p:txBody>
+      </p:sp>
+    </p:spTree>
+    <p:extLst>
+      <p:ext uri="{BB962C8B-B14F-4D97-AF65-F5344CB8AC3E}">
+        <p14:creationId xmlns:p14="http://schemas.microsoft.com/office/powerpoint/2010/main" val="3103039562"/>
+      </p:ext>
+    </p:extLst>
+  </p:cSld>
+  <p:clrMapOvr>
+    <a:masterClrMapping/>
+  </p:clrMapOvr>
+  <p:timing>
+    <p:tnLst>
+      <p:par>
+        <p:cTn id="1" dur="indefinite" restart="never" nodeType="tmRoot"/>
+      </p:par>
+    </p:tnLst>
+  </p:timing>
+</p:sld>
+</file>
+
+<file path=ppt/slides/slide29.xml><?xml version="1.0" encoding="utf-8"?>
+<p:sld xmlns:a="http://schemas.openxmlformats.org/drawingml/2006/main" xmlns:r="http://schemas.openxmlformats.org/officeDocument/2006/relationships" xmlns:p="http://schemas.openxmlformats.org/presentationml/2006/main">
+  <p:cSld>
+    <p:spTree>
+      <p:nvGrpSpPr>
+        <p:cNvPr id="1" name=""/>
+        <p:cNvGrpSpPr/>
+        <p:nvPr/>
+      </p:nvGrpSpPr>
+      <p:grpSpPr>
+        <a:xfrm>
+          <a:off x="0" y="0"/>
+          <a:ext cx="0" cy="0"/>
+          <a:chOff x="0" y="0"/>
+          <a:chExt cx="0" cy="0"/>
+        </a:xfrm>
+      </p:grpSpPr>
+      <p:sp>
+        <p:nvSpPr>
+          <p:cNvPr id="2" name="Title 1"/>
+          <p:cNvSpPr>
+            <a:spLocks noGrp="1"/>
+          </p:cNvSpPr>
+          <p:nvPr>
+            <p:ph type="title"/>
+          </p:nvPr>
+        </p:nvSpPr>
         <p:spPr/>
         <p:txBody>
           <a:bodyPr/>
           <a:lstStyle/>
           <a:p>
             <a:r>
-              <a:rPr lang="en-US" b="1" dirty="0" smtClean="0">
-                <a:latin typeface="Segoe UI" panose="020B0502040204020203" pitchFamily="34" charset="0"/>
-                <a:cs typeface="Segoe UI" panose="020B0502040204020203" pitchFamily="34" charset="0"/>
-              </a:rPr>
-              <a:t>notes</a:t>
+              <a:rPr lang="en-US" b="1" dirty="0">
+                <a:latin typeface="Segoe UI" panose="020B0502040204020203" pitchFamily="34" charset="0"/>
+                <a:cs typeface="Segoe UI" panose="020B0502040204020203" pitchFamily="34" charset="0"/>
+              </a:rPr>
+              <a:t>Graphs</a:t>
             </a:r>
             <a:endParaRPr lang="en-US" dirty="0">
               <a:latin typeface="Segoe UI" panose="020B0502040204020203" pitchFamily="34" charset="0"/>
@@ -21522,88 +22161,46 @@
           <a:lstStyle/>
           <a:p>
             <a:r>
+              <a:rPr lang="ru-RU" dirty="0">
+                <a:latin typeface="Segoe UI" panose="020B0502040204020203" pitchFamily="34" charset="0"/>
+                <a:cs typeface="Segoe UI" panose="020B0502040204020203" pitchFamily="34" charset="0"/>
+              </a:rPr>
+              <a:t>Задача о семи </a:t>
+            </a:r>
+            <a:r>
+              <a:rPr lang="ru-RU" dirty="0" smtClean="0">
+                <a:latin typeface="Segoe UI" panose="020B0502040204020203" pitchFamily="34" charset="0"/>
+                <a:cs typeface="Segoe UI" panose="020B0502040204020203" pitchFamily="34" charset="0"/>
+              </a:rPr>
+              <a:t>мостах</a:t>
+            </a:r>
+            <a:endParaRPr lang="en-US" dirty="0" smtClean="0">
+              <a:latin typeface="Segoe UI" panose="020B0502040204020203" pitchFamily="34" charset="0"/>
+              <a:cs typeface="Segoe UI" panose="020B0502040204020203" pitchFamily="34" charset="0"/>
+            </a:endParaRPr>
+          </a:p>
+          <a:p>
+            <a:endParaRPr lang="en-US" dirty="0">
+              <a:latin typeface="Segoe UI" panose="020B0502040204020203" pitchFamily="34" charset="0"/>
+              <a:cs typeface="Segoe UI" panose="020B0502040204020203" pitchFamily="34" charset="0"/>
+            </a:endParaRPr>
+          </a:p>
+          <a:p>
+            <a:r>
               <a:rPr lang="en-US" dirty="0" smtClean="0">
                 <a:latin typeface="Segoe UI" panose="020B0502040204020203" pitchFamily="34" charset="0"/>
                 <a:cs typeface="Segoe UI" panose="020B0502040204020203" pitchFamily="34" charset="0"/>
               </a:rPr>
-              <a:t>Open all depends</a:t>
-            </a:r>
-          </a:p>
-          <a:p>
-            <a:r>
-              <a:rPr lang="en-US" dirty="0" err="1" smtClean="0">
-                <a:solidFill>
-                  <a:srgbClr val="FF0000"/>
-                </a:solidFill>
-                <a:latin typeface="Segoe UI" panose="020B0502040204020203" pitchFamily="34" charset="0"/>
-                <a:cs typeface="Segoe UI" panose="020B0502040204020203" pitchFamily="34" charset="0"/>
-              </a:rPr>
-              <a:t>Kapy</a:t>
-            </a:r>
-            <a:r>
-              <a:rPr lang="en-US" dirty="0" smtClean="0">
-                <a:solidFill>
-                  <a:srgbClr val="FF0000"/>
-                </a:solidFill>
-                <a:latin typeface="Segoe UI" panose="020B0502040204020203" pitchFamily="34" charset="0"/>
-                <a:cs typeface="Segoe UI" panose="020B0502040204020203" pitchFamily="34" charset="0"/>
-              </a:rPr>
-              <a:t> </a:t>
-            </a:r>
-            <a:r>
-              <a:rPr lang="en-US" dirty="0" err="1" smtClean="0">
-                <a:solidFill>
-                  <a:srgbClr val="FF0000"/>
-                </a:solidFill>
-                <a:latin typeface="Segoe UI" panose="020B0502040204020203" pitchFamily="34" charset="0"/>
-                <a:cs typeface="Segoe UI" panose="020B0502040204020203" pitchFamily="34" charset="0"/>
-              </a:rPr>
-              <a:t>algoneri</a:t>
-            </a:r>
-            <a:r>
-              <a:rPr lang="en-US" dirty="0" smtClean="0">
-                <a:solidFill>
-                  <a:srgbClr val="FF0000"/>
-                </a:solidFill>
-                <a:latin typeface="Segoe UI" panose="020B0502040204020203" pitchFamily="34" charset="0"/>
-                <a:cs typeface="Segoe UI" panose="020B0502040204020203" pitchFamily="34" charset="0"/>
-              </a:rPr>
-              <a:t> u ds </a:t>
-            </a:r>
-            <a:r>
-              <a:rPr lang="en-US" dirty="0" err="1" smtClean="0">
-                <a:solidFill>
-                  <a:srgbClr val="FF0000"/>
-                </a:solidFill>
-                <a:latin typeface="Segoe UI" panose="020B0502040204020203" pitchFamily="34" charset="0"/>
-                <a:cs typeface="Segoe UI" panose="020B0502040204020203" pitchFamily="34" charset="0"/>
-              </a:rPr>
-              <a:t>neri</a:t>
-            </a:r>
-            <a:r>
-              <a:rPr lang="en-US" dirty="0" smtClean="0">
-                <a:solidFill>
-                  <a:srgbClr val="FF0000"/>
-                </a:solidFill>
-                <a:latin typeface="Segoe UI" panose="020B0502040204020203" pitchFamily="34" charset="0"/>
-                <a:cs typeface="Segoe UI" panose="020B0502040204020203" pitchFamily="34" charset="0"/>
-              </a:rPr>
-              <a:t> </a:t>
-            </a:r>
-            <a:r>
-              <a:rPr lang="en-US" dirty="0" err="1" smtClean="0">
-                <a:solidFill>
-                  <a:srgbClr val="FF0000"/>
-                </a:solidFill>
-                <a:latin typeface="Segoe UI" panose="020B0502040204020203" pitchFamily="34" charset="0"/>
-                <a:cs typeface="Segoe UI" panose="020B0502040204020203" pitchFamily="34" charset="0"/>
-              </a:rPr>
-              <a:t>mej</a:t>
-            </a:r>
-            <a:endParaRPr lang="en-US" dirty="0" smtClean="0">
-              <a:solidFill>
-                <a:srgbClr val="FF0000"/>
-              </a:solidFill>
+              <a:t>Dracula for </a:t>
+            </a:r>
+            <a:r>
+              <a:rPr lang="en-US" smtClean="0">
+                <a:latin typeface="Segoe UI" panose="020B0502040204020203" pitchFamily="34" charset="0"/>
+                <a:cs typeface="Segoe UI" panose="020B0502040204020203" pitchFamily="34" charset="0"/>
+              </a:rPr>
+              <a:t>graph visualization</a:t>
+            </a:r>
+            <a:endParaRPr lang="ru-RU" dirty="0">
               <a:latin typeface="Segoe UI" panose="020B0502040204020203" pitchFamily="34" charset="0"/>
               <a:cs typeface="Segoe UI" panose="020B0502040204020203" pitchFamily="34" charset="0"/>
             </a:endParaRPr>
@@ -21619,7 +22216,7 @@
     </p:spTree>
     <p:extLst>
       <p:ext uri="{BB962C8B-B14F-4D97-AF65-F5344CB8AC3E}">
-        <p14:creationId xmlns:p14="http://schemas.microsoft.com/office/powerpoint/2010/main" val="3205067114"/>
+        <p14:creationId xmlns:p14="http://schemas.microsoft.com/office/powerpoint/2010/main" val="1141804580"/>
       </p:ext>
     </p:extLst>
   </p:cSld>
@@ -23410,6 +24007,175 @@
       </p:par>
     </p:tnLst>
   </p:timing>
+</p:sld>
+</file>
+
+<file path=ppt/slides/slide30.xml><?xml version="1.0" encoding="utf-8"?>
+<p:sld xmlns:a="http://schemas.openxmlformats.org/drawingml/2006/main" xmlns:r="http://schemas.openxmlformats.org/officeDocument/2006/relationships" xmlns:p="http://schemas.openxmlformats.org/presentationml/2006/main">
+  <p:cSld>
+    <p:spTree>
+      <p:nvGrpSpPr>
+        <p:cNvPr id="1" name=""/>
+        <p:cNvGrpSpPr/>
+        <p:nvPr/>
+      </p:nvGrpSpPr>
+      <p:grpSpPr>
+        <a:xfrm>
+          <a:off x="0" y="0"/>
+          <a:ext cx="0" cy="0"/>
+          <a:chOff x="0" y="0"/>
+          <a:chExt cx="0" cy="0"/>
+        </a:xfrm>
+      </p:grpSpPr>
+      <p:sp>
+        <p:nvSpPr>
+          <p:cNvPr id="2" name="Title 1"/>
+          <p:cNvSpPr>
+            <a:spLocks noGrp="1"/>
+          </p:cNvSpPr>
+          <p:nvPr>
+            <p:ph type="title"/>
+          </p:nvPr>
+        </p:nvSpPr>
+        <p:spPr/>
+        <p:txBody>
+          <a:bodyPr/>
+          <a:lstStyle/>
+          <a:p>
+            <a:r>
+              <a:rPr lang="en-US" b="1" dirty="0" smtClean="0">
+                <a:latin typeface="Segoe UI" panose="020B0502040204020203" pitchFamily="34" charset="0"/>
+                <a:cs typeface="Segoe UI" panose="020B0502040204020203" pitchFamily="34" charset="0"/>
+              </a:rPr>
+              <a:t>notes</a:t>
+            </a:r>
+            <a:endParaRPr lang="en-US" dirty="0">
+              <a:latin typeface="Segoe UI" panose="020B0502040204020203" pitchFamily="34" charset="0"/>
+              <a:cs typeface="Segoe UI" panose="020B0502040204020203" pitchFamily="34" charset="0"/>
+            </a:endParaRPr>
+          </a:p>
+        </p:txBody>
+      </p:sp>
+      <p:sp>
+        <p:nvSpPr>
+          <p:cNvPr id="3" name="Content Placeholder 2"/>
+          <p:cNvSpPr>
+            <a:spLocks noGrp="1"/>
+          </p:cNvSpPr>
+          <p:nvPr>
+            <p:ph idx="1"/>
+          </p:nvPr>
+        </p:nvSpPr>
+        <p:spPr/>
+        <p:txBody>
+          <a:bodyPr/>
+          <a:lstStyle/>
+          <a:p>
+            <a:r>
+              <a:rPr lang="en-US" dirty="0" smtClean="0">
+                <a:latin typeface="Segoe UI" panose="020B0502040204020203" pitchFamily="34" charset="0"/>
+                <a:cs typeface="Segoe UI" panose="020B0502040204020203" pitchFamily="34" charset="0"/>
+              </a:rPr>
+              <a:t>Open all depends</a:t>
+            </a:r>
+          </a:p>
+          <a:p>
+            <a:r>
+              <a:rPr lang="en-US" dirty="0" err="1" smtClean="0">
+                <a:solidFill>
+                  <a:srgbClr val="FF0000"/>
+                </a:solidFill>
+                <a:latin typeface="Segoe UI" panose="020B0502040204020203" pitchFamily="34" charset="0"/>
+                <a:cs typeface="Segoe UI" panose="020B0502040204020203" pitchFamily="34" charset="0"/>
+              </a:rPr>
+              <a:t>Kapy</a:t>
+            </a:r>
+            <a:r>
+              <a:rPr lang="en-US" dirty="0" smtClean="0">
+                <a:solidFill>
+                  <a:srgbClr val="FF0000"/>
+                </a:solidFill>
+                <a:latin typeface="Segoe UI" panose="020B0502040204020203" pitchFamily="34" charset="0"/>
+                <a:cs typeface="Segoe UI" panose="020B0502040204020203" pitchFamily="34" charset="0"/>
+              </a:rPr>
+              <a:t> </a:t>
+            </a:r>
+            <a:r>
+              <a:rPr lang="en-US" dirty="0" err="1" smtClean="0">
+                <a:solidFill>
+                  <a:srgbClr val="FF0000"/>
+                </a:solidFill>
+                <a:latin typeface="Segoe UI" panose="020B0502040204020203" pitchFamily="34" charset="0"/>
+                <a:cs typeface="Segoe UI" panose="020B0502040204020203" pitchFamily="34" charset="0"/>
+              </a:rPr>
+              <a:t>algoneri</a:t>
+            </a:r>
+            <a:r>
+              <a:rPr lang="en-US" dirty="0" smtClean="0">
+                <a:solidFill>
+                  <a:srgbClr val="FF0000"/>
+                </a:solidFill>
+                <a:latin typeface="Segoe UI" panose="020B0502040204020203" pitchFamily="34" charset="0"/>
+                <a:cs typeface="Segoe UI" panose="020B0502040204020203" pitchFamily="34" charset="0"/>
+              </a:rPr>
+              <a:t> u ds </a:t>
+            </a:r>
+            <a:r>
+              <a:rPr lang="en-US" dirty="0" err="1" smtClean="0">
+                <a:solidFill>
+                  <a:srgbClr val="FF0000"/>
+                </a:solidFill>
+                <a:latin typeface="Segoe UI" panose="020B0502040204020203" pitchFamily="34" charset="0"/>
+                <a:cs typeface="Segoe UI" panose="020B0502040204020203" pitchFamily="34" charset="0"/>
+              </a:rPr>
+              <a:t>neri</a:t>
+            </a:r>
+            <a:r>
+              <a:rPr lang="en-US" dirty="0" smtClean="0">
+                <a:solidFill>
+                  <a:srgbClr val="FF0000"/>
+                </a:solidFill>
+                <a:latin typeface="Segoe UI" panose="020B0502040204020203" pitchFamily="34" charset="0"/>
+                <a:cs typeface="Segoe UI" panose="020B0502040204020203" pitchFamily="34" charset="0"/>
+              </a:rPr>
+              <a:t> </a:t>
+            </a:r>
+            <a:r>
+              <a:rPr lang="en-US" dirty="0" err="1" smtClean="0">
+                <a:solidFill>
+                  <a:srgbClr val="FF0000"/>
+                </a:solidFill>
+                <a:latin typeface="Segoe UI" panose="020B0502040204020203" pitchFamily="34" charset="0"/>
+                <a:cs typeface="Segoe UI" panose="020B0502040204020203" pitchFamily="34" charset="0"/>
+              </a:rPr>
+              <a:t>mej</a:t>
+            </a:r>
+            <a:endParaRPr lang="en-US" dirty="0" smtClean="0">
+              <a:solidFill>
+                <a:srgbClr val="FF0000"/>
+              </a:solidFill>
+              <a:latin typeface="Segoe UI" panose="020B0502040204020203" pitchFamily="34" charset="0"/>
+              <a:cs typeface="Segoe UI" panose="020B0502040204020203" pitchFamily="34" charset="0"/>
+            </a:endParaRPr>
+          </a:p>
+          <a:p>
+            <a:endParaRPr lang="en-US" dirty="0">
+              <a:latin typeface="Segoe UI" panose="020B0502040204020203" pitchFamily="34" charset="0"/>
+              <a:cs typeface="Segoe UI" panose="020B0502040204020203" pitchFamily="34" charset="0"/>
+            </a:endParaRPr>
+          </a:p>
+        </p:txBody>
+      </p:sp>
+    </p:spTree>
+    <p:extLst>
+      <p:ext uri="{BB962C8B-B14F-4D97-AF65-F5344CB8AC3E}">
+        <p14:creationId xmlns:p14="http://schemas.microsoft.com/office/powerpoint/2010/main" val="3205067114"/>
+      </p:ext>
+    </p:extLst>
+  </p:cSld>
+  <p:clrMapOvr>
+    <a:masterClrMapping/>
+  </p:clrMapOvr>
 </p:sld>
 </file>
 

</xml_diff>

<commit_message>
Graph - addEdge, removeEdge, removeVertex
</commit_message>
<xml_diff>
--- a/ds&a.pptx
+++ b/ds&a.pptx
@@ -5,7 +5,7 @@
     <p:sldMasterId id="2147483660" r:id="rId1"/>
   </p:sldMasterIdLst>
   <p:notesMasterIdLst>
-    <p:notesMasterId r:id="rId32"/>
+    <p:notesMasterId r:id="rId33"/>
   </p:notesMasterIdLst>
   <p:sldIdLst>
     <p:sldId id="281" r:id="rId2"/>
@@ -37,7 +37,8 @@
     <p:sldId id="292" r:id="rId28"/>
     <p:sldId id="293" r:id="rId29"/>
     <p:sldId id="267" r:id="rId30"/>
-    <p:sldId id="280" r:id="rId31"/>
+    <p:sldId id="294" r:id="rId31"/>
+    <p:sldId id="280" r:id="rId32"/>
   </p:sldIdLst>
   <p:sldSz cx="12192000" cy="6858000"/>
   <p:notesSz cx="6858000" cy="9144000"/>
@@ -10698,7 +10699,7 @@
           <p:nvPr>
             <p:extLst>
               <p:ext uri="{D42A27DB-BD31-4B8C-83A1-F6EECF244321}">
-                <p14:modId xmlns:p14="http://schemas.microsoft.com/office/powerpoint/2010/main" val="3450857828"/>
+                <p14:modId xmlns:p14="http://schemas.microsoft.com/office/powerpoint/2010/main" val="3164479419"/>
               </p:ext>
             </p:extLst>
           </p:nvPr>
@@ -10774,6 +10775,8 @@
                       </a:pPr>
                       <a:r>
                         <a:rPr lang="en-US" sz="1500" u="none" strike="noStrike" cap="none" dirty="0" smtClean="0">
+                          <a:latin typeface="Segoe UI" panose="020B0502040204020203" pitchFamily="34" charset="0"/>
+                          <a:cs typeface="Segoe UI" panose="020B0502040204020203" pitchFamily="34" charset="0"/>
                           <a:sym typeface="Red Hat Text"/>
                         </a:rPr>
                         <a:t>Sorting algorithms</a:t>
@@ -10782,9 +10785,9 @@
                         <a:solidFill>
                           <a:schemeClr val="dk2"/>
                         </a:solidFill>
-                        <a:latin typeface="Red Hat Text"/>
+                        <a:latin typeface="Segoe UI" panose="020B0502040204020203" pitchFamily="34" charset="0"/>
                         <a:ea typeface="Red Hat Text"/>
-                        <a:cs typeface="Red Hat Text"/>
+                        <a:cs typeface="Segoe UI" panose="020B0502040204020203" pitchFamily="34" charset="0"/>
                         <a:sym typeface="Red Hat Text"/>
                       </a:endParaRPr>
                     </a:p>
@@ -10814,6 +10817,8 @@
                       </a:pPr>
                       <a:r>
                         <a:rPr lang="en" sz="1500" u="none" strike="noStrike" cap="none" dirty="0" smtClean="0">
+                          <a:latin typeface="Segoe UI" panose="020B0502040204020203" pitchFamily="34" charset="0"/>
+                          <a:cs typeface="Segoe UI" panose="020B0502040204020203" pitchFamily="34" charset="0"/>
                           <a:sym typeface="Red Hat Text"/>
                         </a:rPr>
                         <a:t>Speed</a:t>
@@ -10822,9 +10827,9 @@
                         <a:solidFill>
                           <a:schemeClr val="dk2"/>
                         </a:solidFill>
-                        <a:latin typeface="Red Hat Text"/>
+                        <a:latin typeface="Segoe UI" panose="020B0502040204020203" pitchFamily="34" charset="0"/>
                         <a:ea typeface="Red Hat Text"/>
-                        <a:cs typeface="Red Hat Text"/>
+                        <a:cs typeface="Segoe UI" panose="020B0502040204020203" pitchFamily="34" charset="0"/>
                         <a:sym typeface="Red Hat Text"/>
                       </a:endParaRPr>
                     </a:p>
@@ -10986,6 +10991,8 @@
                       </a:pPr>
                       <a:r>
                         <a:rPr lang="en-US" sz="1500" u="none" strike="noStrike" cap="none" dirty="0" smtClean="0">
+                          <a:latin typeface="Segoe UI" panose="020B0502040204020203" pitchFamily="34" charset="0"/>
+                          <a:cs typeface="Segoe UI" panose="020B0502040204020203" pitchFamily="34" charset="0"/>
                           <a:sym typeface="Red Hat Text"/>
                         </a:rPr>
                         <a:t>Memory</a:t>
@@ -10994,9 +11001,9 @@
                         <a:solidFill>
                           <a:schemeClr val="dk2"/>
                         </a:solidFill>
-                        <a:latin typeface="Red Hat Text"/>
+                        <a:latin typeface="Segoe UI" panose="020B0502040204020203" pitchFamily="34" charset="0"/>
                         <a:ea typeface="Red Hat Text"/>
-                        <a:cs typeface="Red Hat Text"/>
+                        <a:cs typeface="Segoe UI" panose="020B0502040204020203" pitchFamily="34" charset="0"/>
                         <a:sym typeface="Red Hat Text"/>
                       </a:endParaRPr>
                     </a:p>
@@ -11101,6 +11108,8 @@
                       </a:pPr>
                       <a:r>
                         <a:rPr lang="en-US" sz="1500" u="none" strike="noStrike" cap="none" dirty="0" smtClean="0">
+                          <a:latin typeface="Segoe UI" panose="020B0502040204020203" pitchFamily="34" charset="0"/>
+                          <a:cs typeface="Segoe UI" panose="020B0502040204020203" pitchFamily="34" charset="0"/>
                           <a:sym typeface="Red Hat Text"/>
                         </a:rPr>
                         <a:t>Best</a:t>
@@ -11109,9 +11118,9 @@
                         <a:solidFill>
                           <a:schemeClr val="dk2"/>
                         </a:solidFill>
-                        <a:latin typeface="Red Hat Text"/>
+                        <a:latin typeface="Segoe UI" panose="020B0502040204020203" pitchFamily="34" charset="0"/>
                         <a:ea typeface="Red Hat Text"/>
-                        <a:cs typeface="Red Hat Text"/>
+                        <a:cs typeface="Segoe UI" panose="020B0502040204020203" pitchFamily="34" charset="0"/>
                         <a:sym typeface="Red Hat Text"/>
                       </a:endParaRPr>
                     </a:p>
@@ -11141,6 +11150,8 @@
                       </a:pPr>
                       <a:r>
                         <a:rPr lang="en-US" sz="1500" u="none" strike="noStrike" cap="none" dirty="0" smtClean="0">
+                          <a:latin typeface="Segoe UI" panose="020B0502040204020203" pitchFamily="34" charset="0"/>
+                          <a:cs typeface="Segoe UI" panose="020B0502040204020203" pitchFamily="34" charset="0"/>
                           <a:sym typeface="Red Hat Text"/>
                         </a:rPr>
                         <a:t>Average</a:t>
@@ -11149,9 +11160,9 @@
                         <a:solidFill>
                           <a:schemeClr val="dk2"/>
                         </a:solidFill>
-                        <a:latin typeface="Red Hat Text"/>
+                        <a:latin typeface="Segoe UI" panose="020B0502040204020203" pitchFamily="34" charset="0"/>
                         <a:ea typeface="Red Hat Text"/>
-                        <a:cs typeface="Red Hat Text"/>
+                        <a:cs typeface="Segoe UI" panose="020B0502040204020203" pitchFamily="34" charset="0"/>
                         <a:sym typeface="Red Hat Text"/>
                       </a:endParaRPr>
                     </a:p>
@@ -11181,6 +11192,8 @@
                       </a:pPr>
                       <a:r>
                         <a:rPr lang="en-US" sz="1500" u="none" strike="noStrike" cap="none" dirty="0" smtClean="0">
+                          <a:latin typeface="Segoe UI" panose="020B0502040204020203" pitchFamily="34" charset="0"/>
+                          <a:cs typeface="Segoe UI" panose="020B0502040204020203" pitchFamily="34" charset="0"/>
                           <a:sym typeface="Red Hat Text"/>
                         </a:rPr>
                         <a:t>Worst</a:t>
@@ -11189,9 +11202,9 @@
                         <a:solidFill>
                           <a:schemeClr val="dk2"/>
                         </a:solidFill>
-                        <a:latin typeface="Red Hat Text"/>
+                        <a:latin typeface="Segoe UI" panose="020B0502040204020203" pitchFamily="34" charset="0"/>
                         <a:ea typeface="Red Hat Text"/>
-                        <a:cs typeface="Red Hat Text"/>
+                        <a:cs typeface="Segoe UI" panose="020B0502040204020203" pitchFamily="34" charset="0"/>
                         <a:sym typeface="Red Hat Text"/>
                       </a:endParaRPr>
                     </a:p>
@@ -11221,6 +11234,8 @@
                       </a:pPr>
                       <a:r>
                         <a:rPr lang="en-US" sz="1500" u="none" strike="noStrike" cap="none" dirty="0" smtClean="0">
+                          <a:latin typeface="Segoe UI" panose="020B0502040204020203" pitchFamily="34" charset="0"/>
+                          <a:cs typeface="Segoe UI" panose="020B0502040204020203" pitchFamily="34" charset="0"/>
                           <a:sym typeface="Red Hat Text"/>
                         </a:rPr>
                         <a:t>Worst</a:t>
@@ -11229,9 +11244,9 @@
                         <a:solidFill>
                           <a:schemeClr val="dk2"/>
                         </a:solidFill>
-                        <a:latin typeface="Red Hat Text"/>
+                        <a:latin typeface="Segoe UI" panose="020B0502040204020203" pitchFamily="34" charset="0"/>
                         <a:ea typeface="Red Hat Text"/>
-                        <a:cs typeface="Red Hat Text"/>
+                        <a:cs typeface="Segoe UI" panose="020B0502040204020203" pitchFamily="34" charset="0"/>
                         <a:sym typeface="Red Hat Text"/>
                       </a:endParaRPr>
                     </a:p>
@@ -11268,6 +11283,8 @@
                       </a:pPr>
                       <a:r>
                         <a:rPr lang="en" sz="1500" u="none" strike="noStrike" cap="none" dirty="0" smtClean="0">
+                          <a:latin typeface="Segoe UI" panose="020B0502040204020203" pitchFamily="34" charset="0"/>
+                          <a:cs typeface="Segoe UI" panose="020B0502040204020203" pitchFamily="34" charset="0"/>
                           <a:sym typeface="Red Hat Text"/>
                         </a:rPr>
                         <a:t>Bubble sort</a:t>
@@ -11276,9 +11293,9 @@
                         <a:solidFill>
                           <a:schemeClr val="dk2"/>
                         </a:solidFill>
-                        <a:latin typeface="Red Hat Text"/>
+                        <a:latin typeface="Segoe UI" panose="020B0502040204020203" pitchFamily="34" charset="0"/>
                         <a:ea typeface="Red Hat Text"/>
-                        <a:cs typeface="Red Hat Text"/>
+                        <a:cs typeface="Segoe UI" panose="020B0502040204020203" pitchFamily="34" charset="0"/>
                         <a:sym typeface="Red Hat Text"/>
                       </a:endParaRPr>
                     </a:p>
@@ -11313,9 +11330,9 @@
                               <a:lumMod val="10000"/>
                             </a:schemeClr>
                           </a:solidFill>
-                          <a:latin typeface="Red Hat Text"/>
+                          <a:latin typeface="Segoe UI" panose="020B0502040204020203" pitchFamily="34" charset="0"/>
                           <a:ea typeface="Red Hat Text"/>
-                          <a:cs typeface="Red Hat Text"/>
+                          <a:cs typeface="Segoe UI" panose="020B0502040204020203" pitchFamily="34" charset="0"/>
                           <a:sym typeface="Red Hat Text"/>
                         </a:rPr>
                         <a:t>n</a:t>
@@ -11326,9 +11343,9 @@
                             <a:lumMod val="10000"/>
                           </a:schemeClr>
                         </a:solidFill>
-                        <a:latin typeface="Red Hat Text"/>
+                        <a:latin typeface="Segoe UI" panose="020B0502040204020203" pitchFamily="34" charset="0"/>
                         <a:ea typeface="Red Hat Text"/>
-                        <a:cs typeface="Red Hat Text"/>
+                        <a:cs typeface="Segoe UI" panose="020B0502040204020203" pitchFamily="34" charset="0"/>
                         <a:sym typeface="Red Hat Text"/>
                       </a:endParaRPr>
                     </a:p>
@@ -11370,9 +11387,9 @@
                               <a:lumMod val="10000"/>
                             </a:schemeClr>
                           </a:solidFill>
-                          <a:latin typeface="Red Hat Text"/>
+                          <a:latin typeface="Segoe UI" panose="020B0502040204020203" pitchFamily="34" charset="0"/>
                           <a:ea typeface="Red Hat Text"/>
-                          <a:cs typeface="Red Hat Text"/>
+                          <a:cs typeface="Segoe UI" panose="020B0502040204020203" pitchFamily="34" charset="0"/>
                           <a:sym typeface="Arial"/>
                         </a:rPr>
                         <a:t>n^2</a:t>
@@ -11383,9 +11400,9 @@
                             <a:lumMod val="10000"/>
                           </a:schemeClr>
                         </a:solidFill>
-                        <a:latin typeface="Red Hat Text"/>
+                        <a:latin typeface="Segoe UI" panose="020B0502040204020203" pitchFamily="34" charset="0"/>
                         <a:ea typeface="Red Hat Text"/>
-                        <a:cs typeface="Red Hat Text"/>
+                        <a:cs typeface="Segoe UI" panose="020B0502040204020203" pitchFamily="34" charset="0"/>
                         <a:sym typeface="Red Hat Text"/>
                       </a:endParaRPr>
                     </a:p>
@@ -11424,9 +11441,9 @@
                               <a:lumMod val="10000"/>
                             </a:schemeClr>
                           </a:solidFill>
-                          <a:latin typeface="Red Hat Text"/>
+                          <a:latin typeface="Segoe UI" panose="020B0502040204020203" pitchFamily="34" charset="0"/>
                           <a:ea typeface="Red Hat Text"/>
-                          <a:cs typeface="Red Hat Text"/>
+                          <a:cs typeface="Segoe UI" panose="020B0502040204020203" pitchFamily="34" charset="0"/>
                           <a:sym typeface="Arial"/>
                         </a:rPr>
                         <a:t>n^2</a:t>
@@ -11437,9 +11454,9 @@
                             <a:lumMod val="10000"/>
                           </a:schemeClr>
                         </a:solidFill>
-                        <a:latin typeface="Red Hat Text"/>
+                        <a:latin typeface="Segoe UI" panose="020B0502040204020203" pitchFamily="34" charset="0"/>
                         <a:ea typeface="Red Hat Text"/>
-                        <a:cs typeface="Red Hat Text"/>
+                        <a:cs typeface="Segoe UI" panose="020B0502040204020203" pitchFamily="34" charset="0"/>
                         <a:sym typeface="Red Hat Text"/>
                       </a:endParaRPr>
                     </a:p>
@@ -11478,9 +11495,9 @@
                               <a:lumMod val="10000"/>
                             </a:schemeClr>
                           </a:solidFill>
-                          <a:latin typeface="Red Hat Text"/>
+                          <a:latin typeface="Segoe UI" panose="020B0502040204020203" pitchFamily="34" charset="0"/>
                           <a:ea typeface="Red Hat Text"/>
-                          <a:cs typeface="Red Hat Text"/>
+                          <a:cs typeface="Segoe UI" panose="020B0502040204020203" pitchFamily="34" charset="0"/>
                           <a:sym typeface="Red Hat Text"/>
                         </a:rPr>
                         <a:t>1</a:t>
@@ -11491,9 +11508,9 @@
                             <a:lumMod val="10000"/>
                           </a:schemeClr>
                         </a:solidFill>
-                        <a:latin typeface="Red Hat Text"/>
+                        <a:latin typeface="Segoe UI" panose="020B0502040204020203" pitchFamily="34" charset="0"/>
                         <a:ea typeface="Red Hat Text"/>
-                        <a:cs typeface="Red Hat Text"/>
+                        <a:cs typeface="Segoe UI" panose="020B0502040204020203" pitchFamily="34" charset="0"/>
                         <a:sym typeface="Red Hat Text"/>
                       </a:endParaRPr>
                     </a:p>
@@ -11534,6 +11551,8 @@
                       </a:pPr>
                       <a:r>
                         <a:rPr lang="en" sz="1500" u="none" strike="noStrike" cap="none" dirty="0" smtClean="0">
+                          <a:latin typeface="Segoe UI" panose="020B0502040204020203" pitchFamily="34" charset="0"/>
+                          <a:cs typeface="Segoe UI" panose="020B0502040204020203" pitchFamily="34" charset="0"/>
                           <a:sym typeface="Red Hat Text"/>
                         </a:rPr>
                         <a:t>Selection sort</a:t>
@@ -11542,9 +11561,9 @@
                         <a:solidFill>
                           <a:schemeClr val="dk2"/>
                         </a:solidFill>
-                        <a:latin typeface="Red Hat Text"/>
+                        <a:latin typeface="Segoe UI" panose="020B0502040204020203" pitchFamily="34" charset="0"/>
                         <a:ea typeface="Red Hat Text"/>
-                        <a:cs typeface="Red Hat Text"/>
+                        <a:cs typeface="Segoe UI" panose="020B0502040204020203" pitchFamily="34" charset="0"/>
                         <a:sym typeface="Red Hat Text"/>
                       </a:endParaRPr>
                     </a:p>
@@ -11582,9 +11601,9 @@
                               <a:lumMod val="10000"/>
                             </a:schemeClr>
                           </a:solidFill>
-                          <a:latin typeface="Red Hat Text"/>
+                          <a:latin typeface="Segoe UI" panose="020B0502040204020203" pitchFamily="34" charset="0"/>
                           <a:ea typeface="Red Hat Text"/>
-                          <a:cs typeface="Red Hat Text"/>
+                          <a:cs typeface="Segoe UI" panose="020B0502040204020203" pitchFamily="34" charset="0"/>
                           <a:sym typeface="Arial"/>
                         </a:rPr>
                         <a:t>n^2</a:t>
@@ -11625,9 +11644,9 @@
                               <a:lumMod val="10000"/>
                             </a:schemeClr>
                           </a:solidFill>
-                          <a:latin typeface="Red Hat Text"/>
+                          <a:latin typeface="Segoe UI" panose="020B0502040204020203" pitchFamily="34" charset="0"/>
                           <a:ea typeface="Red Hat Text"/>
-                          <a:cs typeface="Red Hat Text"/>
+                          <a:cs typeface="Segoe UI" panose="020B0502040204020203" pitchFamily="34" charset="0"/>
                           <a:sym typeface="Arial"/>
                         </a:rPr>
                         <a:t>n^2</a:t>
@@ -11638,9 +11657,9 @@
                             <a:lumMod val="10000"/>
                           </a:schemeClr>
                         </a:solidFill>
-                        <a:latin typeface="Red Hat Text"/>
+                        <a:latin typeface="Segoe UI" panose="020B0502040204020203" pitchFamily="34" charset="0"/>
                         <a:ea typeface="Red Hat Text"/>
-                        <a:cs typeface="Red Hat Text"/>
+                        <a:cs typeface="Segoe UI" panose="020B0502040204020203" pitchFamily="34" charset="0"/>
                         <a:sym typeface="Red Hat Text"/>
                       </a:endParaRPr>
                     </a:p>
@@ -11679,9 +11698,9 @@
                               <a:lumMod val="10000"/>
                             </a:schemeClr>
                           </a:solidFill>
-                          <a:latin typeface="Red Hat Text"/>
+                          <a:latin typeface="Segoe UI" panose="020B0502040204020203" pitchFamily="34" charset="0"/>
                           <a:ea typeface="Red Hat Text"/>
-                          <a:cs typeface="Red Hat Text"/>
+                          <a:cs typeface="Segoe UI" panose="020B0502040204020203" pitchFamily="34" charset="0"/>
                           <a:sym typeface="Arial"/>
                         </a:rPr>
                         <a:t>n^2</a:t>
@@ -11692,9 +11711,9 @@
                             <a:lumMod val="10000"/>
                           </a:schemeClr>
                         </a:solidFill>
-                        <a:latin typeface="Red Hat Text"/>
+                        <a:latin typeface="Segoe UI" panose="020B0502040204020203" pitchFamily="34" charset="0"/>
                         <a:ea typeface="Red Hat Text"/>
-                        <a:cs typeface="Red Hat Text"/>
+                        <a:cs typeface="Segoe UI" panose="020B0502040204020203" pitchFamily="34" charset="0"/>
                         <a:sym typeface="Red Hat Text"/>
                       </a:endParaRPr>
                     </a:p>
@@ -11733,9 +11752,9 @@
                               <a:lumMod val="10000"/>
                             </a:schemeClr>
                           </a:solidFill>
-                          <a:latin typeface="Red Hat Text"/>
+                          <a:latin typeface="Segoe UI" panose="020B0502040204020203" pitchFamily="34" charset="0"/>
                           <a:ea typeface="Red Hat Text"/>
-                          <a:cs typeface="Red Hat Text"/>
+                          <a:cs typeface="Segoe UI" panose="020B0502040204020203" pitchFamily="34" charset="0"/>
                           <a:sym typeface="Red Hat Text"/>
                         </a:rPr>
                         <a:t>1</a:t>
@@ -11746,9 +11765,9 @@
                             <a:lumMod val="10000"/>
                           </a:schemeClr>
                         </a:solidFill>
-                        <a:latin typeface="Red Hat Text"/>
+                        <a:latin typeface="Segoe UI" panose="020B0502040204020203" pitchFamily="34" charset="0"/>
                         <a:ea typeface="Red Hat Text"/>
-                        <a:cs typeface="Red Hat Text"/>
+                        <a:cs typeface="Segoe UI" panose="020B0502040204020203" pitchFamily="34" charset="0"/>
                         <a:sym typeface="Red Hat Text"/>
                       </a:endParaRPr>
                     </a:p>
@@ -11789,6 +11808,8 @@
                       </a:pPr>
                       <a:r>
                         <a:rPr lang="en" sz="1500" u="none" strike="noStrike" cap="none" dirty="0" smtClean="0">
+                          <a:latin typeface="Segoe UI" panose="020B0502040204020203" pitchFamily="34" charset="0"/>
+                          <a:cs typeface="Segoe UI" panose="020B0502040204020203" pitchFamily="34" charset="0"/>
                           <a:sym typeface="Red Hat Text"/>
                         </a:rPr>
                         <a:t>Insertion sort</a:t>
@@ -11797,9 +11818,9 @@
                         <a:solidFill>
                           <a:schemeClr val="dk2"/>
                         </a:solidFill>
-                        <a:latin typeface="Red Hat Text"/>
+                        <a:latin typeface="Segoe UI" panose="020B0502040204020203" pitchFamily="34" charset="0"/>
                         <a:ea typeface="Red Hat Text"/>
-                        <a:cs typeface="Red Hat Text"/>
+                        <a:cs typeface="Segoe UI" panose="020B0502040204020203" pitchFamily="34" charset="0"/>
                         <a:sym typeface="Red Hat Text"/>
                       </a:endParaRPr>
                     </a:p>
@@ -11834,9 +11855,9 @@
                               <a:lumMod val="10000"/>
                             </a:schemeClr>
                           </a:solidFill>
-                          <a:latin typeface="Red Hat Text"/>
+                          <a:latin typeface="Segoe UI" panose="020B0502040204020203" pitchFamily="34" charset="0"/>
                           <a:ea typeface="Red Hat Text"/>
-                          <a:cs typeface="Red Hat Text"/>
+                          <a:cs typeface="Segoe UI" panose="020B0502040204020203" pitchFamily="34" charset="0"/>
                           <a:sym typeface="Red Hat Text"/>
                         </a:rPr>
                         <a:t>n</a:t>
@@ -11847,9 +11868,9 @@
                             <a:lumMod val="10000"/>
                           </a:schemeClr>
                         </a:solidFill>
-                        <a:latin typeface="Red Hat Text"/>
+                        <a:latin typeface="Segoe UI" panose="020B0502040204020203" pitchFamily="34" charset="0"/>
                         <a:ea typeface="Red Hat Text"/>
-                        <a:cs typeface="Red Hat Text"/>
+                        <a:cs typeface="Segoe UI" panose="020B0502040204020203" pitchFamily="34" charset="0"/>
                         <a:sym typeface="Red Hat Text"/>
                       </a:endParaRPr>
                     </a:p>
@@ -11891,9 +11912,9 @@
                               <a:lumMod val="10000"/>
                             </a:schemeClr>
                           </a:solidFill>
-                          <a:latin typeface="Red Hat Text"/>
+                          <a:latin typeface="Segoe UI" panose="020B0502040204020203" pitchFamily="34" charset="0"/>
                           <a:ea typeface="Red Hat Text"/>
-                          <a:cs typeface="Red Hat Text"/>
+                          <a:cs typeface="Segoe UI" panose="020B0502040204020203" pitchFamily="34" charset="0"/>
                           <a:sym typeface="Arial"/>
                         </a:rPr>
                         <a:t>n^2</a:t>
@@ -11904,9 +11925,9 @@
                             <a:lumMod val="10000"/>
                           </a:schemeClr>
                         </a:solidFill>
-                        <a:latin typeface="Red Hat Text"/>
+                        <a:latin typeface="Segoe UI" panose="020B0502040204020203" pitchFamily="34" charset="0"/>
                         <a:ea typeface="Red Hat Text"/>
-                        <a:cs typeface="Red Hat Text"/>
+                        <a:cs typeface="Segoe UI" panose="020B0502040204020203" pitchFamily="34" charset="0"/>
                         <a:sym typeface="Red Hat Text"/>
                       </a:endParaRPr>
                     </a:p>
@@ -11945,9 +11966,9 @@
                               <a:lumMod val="10000"/>
                             </a:schemeClr>
                           </a:solidFill>
-                          <a:latin typeface="Red Hat Text"/>
+                          <a:latin typeface="Segoe UI" panose="020B0502040204020203" pitchFamily="34" charset="0"/>
                           <a:ea typeface="Red Hat Text"/>
-                          <a:cs typeface="Red Hat Text"/>
+                          <a:cs typeface="Segoe UI" panose="020B0502040204020203" pitchFamily="34" charset="0"/>
                           <a:sym typeface="Arial"/>
                         </a:rPr>
                         <a:t>n^2</a:t>
@@ -11958,9 +11979,9 @@
                             <a:lumMod val="10000"/>
                           </a:schemeClr>
                         </a:solidFill>
-                        <a:latin typeface="Red Hat Text"/>
+                        <a:latin typeface="Segoe UI" panose="020B0502040204020203" pitchFamily="34" charset="0"/>
                         <a:ea typeface="Red Hat Text"/>
-                        <a:cs typeface="Red Hat Text"/>
+                        <a:cs typeface="Segoe UI" panose="020B0502040204020203" pitchFamily="34" charset="0"/>
                         <a:sym typeface="Red Hat Text"/>
                       </a:endParaRPr>
                     </a:p>
@@ -11999,9 +12020,9 @@
                               <a:lumMod val="10000"/>
                             </a:schemeClr>
                           </a:solidFill>
-                          <a:latin typeface="Red Hat Text"/>
+                          <a:latin typeface="Segoe UI" panose="020B0502040204020203" pitchFamily="34" charset="0"/>
                           <a:ea typeface="Red Hat Text"/>
-                          <a:cs typeface="Red Hat Text"/>
+                          <a:cs typeface="Segoe UI" panose="020B0502040204020203" pitchFamily="34" charset="0"/>
                           <a:sym typeface="Red Hat Text"/>
                         </a:rPr>
                         <a:t>1</a:t>
@@ -12012,9 +12033,9 @@
                             <a:lumMod val="10000"/>
                           </a:schemeClr>
                         </a:solidFill>
-                        <a:latin typeface="Red Hat Text"/>
+                        <a:latin typeface="Segoe UI" panose="020B0502040204020203" pitchFamily="34" charset="0"/>
                         <a:ea typeface="Red Hat Text"/>
-                        <a:cs typeface="Red Hat Text"/>
+                        <a:cs typeface="Segoe UI" panose="020B0502040204020203" pitchFamily="34" charset="0"/>
                         <a:sym typeface="Red Hat Text"/>
                       </a:endParaRPr>
                     </a:p>
@@ -12058,6 +12079,8 @@
                       </a:pPr>
                       <a:r>
                         <a:rPr lang="en-US" sz="1500" u="none" strike="noStrike" cap="none" dirty="0" smtClean="0">
+                          <a:latin typeface="Segoe UI" panose="020B0502040204020203" pitchFamily="34" charset="0"/>
+                          <a:cs typeface="Segoe UI" panose="020B0502040204020203" pitchFamily="34" charset="0"/>
                           <a:sym typeface="Red Hat Text"/>
                         </a:rPr>
                         <a:t>Merge sort</a:t>
@@ -12066,9 +12089,9 @@
                         <a:solidFill>
                           <a:schemeClr val="dk2"/>
                         </a:solidFill>
-                        <a:latin typeface="Red Hat Text"/>
+                        <a:latin typeface="Segoe UI" panose="020B0502040204020203" pitchFamily="34" charset="0"/>
                         <a:ea typeface="Red Hat Text"/>
-                        <a:cs typeface="Red Hat Text"/>
+                        <a:cs typeface="Segoe UI" panose="020B0502040204020203" pitchFamily="34" charset="0"/>
                         <a:sym typeface="Red Hat Text"/>
                       </a:endParaRPr>
                     </a:p>
@@ -12106,9 +12129,9 @@
                               <a:lumMod val="10000"/>
                             </a:schemeClr>
                           </a:solidFill>
-                          <a:latin typeface="Red Hat Text"/>
+                          <a:latin typeface="Segoe UI" panose="020B0502040204020203" pitchFamily="34" charset="0"/>
                           <a:ea typeface="Red Hat Text"/>
-                          <a:cs typeface="Red Hat Text"/>
+                          <a:cs typeface="Segoe UI" panose="020B0502040204020203" pitchFamily="34" charset="0"/>
                           <a:sym typeface="Arial"/>
                         </a:rPr>
                         <a:t>n * log(n)</a:t>
@@ -12149,9 +12172,9 @@
                               <a:lumMod val="10000"/>
                             </a:schemeClr>
                           </a:solidFill>
-                          <a:latin typeface="Red Hat Text"/>
+                          <a:latin typeface="Segoe UI" panose="020B0502040204020203" pitchFamily="34" charset="0"/>
                           <a:ea typeface="Red Hat Text"/>
-                          <a:cs typeface="Red Hat Text"/>
+                          <a:cs typeface="Segoe UI" panose="020B0502040204020203" pitchFamily="34" charset="0"/>
                           <a:sym typeface="Arial"/>
                         </a:rPr>
                         <a:t>n * log(n)</a:t>
@@ -12162,9 +12185,9 @@
                             <a:lumMod val="10000"/>
                           </a:schemeClr>
                         </a:solidFill>
-                        <a:latin typeface="Red Hat Text"/>
+                        <a:latin typeface="Segoe UI" panose="020B0502040204020203" pitchFamily="34" charset="0"/>
                         <a:ea typeface="Red Hat Text"/>
-                        <a:cs typeface="Red Hat Text"/>
+                        <a:cs typeface="Segoe UI" panose="020B0502040204020203" pitchFamily="34" charset="0"/>
                         <a:sym typeface="Red Hat Text"/>
                       </a:endParaRPr>
                     </a:p>
@@ -12203,9 +12226,9 @@
                               <a:lumMod val="10000"/>
                             </a:schemeClr>
                           </a:solidFill>
-                          <a:latin typeface="Red Hat Text"/>
+                          <a:latin typeface="Segoe UI" panose="020B0502040204020203" pitchFamily="34" charset="0"/>
                           <a:ea typeface="Red Hat Text"/>
-                          <a:cs typeface="Red Hat Text"/>
+                          <a:cs typeface="Segoe UI" panose="020B0502040204020203" pitchFamily="34" charset="0"/>
                           <a:sym typeface="Arial"/>
                         </a:rPr>
                         <a:t>n * log(n)</a:t>
@@ -12216,9 +12239,9 @@
                             <a:lumMod val="10000"/>
                           </a:schemeClr>
                         </a:solidFill>
-                        <a:latin typeface="Red Hat Text"/>
+                        <a:latin typeface="Segoe UI" panose="020B0502040204020203" pitchFamily="34" charset="0"/>
                         <a:ea typeface="Red Hat Text"/>
-                        <a:cs typeface="Red Hat Text"/>
+                        <a:cs typeface="Segoe UI" panose="020B0502040204020203" pitchFamily="34" charset="0"/>
                         <a:sym typeface="Red Hat Text"/>
                       </a:endParaRPr>
                     </a:p>
@@ -12260,9 +12283,9 @@
                               <a:lumMod val="10000"/>
                             </a:schemeClr>
                           </a:solidFill>
-                          <a:latin typeface="Red Hat Text"/>
+                          <a:latin typeface="Segoe UI" panose="020B0502040204020203" pitchFamily="34" charset="0"/>
                           <a:ea typeface="Red Hat Text"/>
-                          <a:cs typeface="Red Hat Text"/>
+                          <a:cs typeface="Segoe UI" panose="020B0502040204020203" pitchFamily="34" charset="0"/>
                           <a:sym typeface="Red Hat Text"/>
                         </a:rPr>
                         <a:t>n</a:t>
@@ -12311,6 +12334,8 @@
                       </a:pPr>
                       <a:r>
                         <a:rPr lang="en-US" sz="1500" u="none" strike="noStrike" cap="none" dirty="0" smtClean="0">
+                          <a:latin typeface="Segoe UI" panose="020B0502040204020203" pitchFamily="34" charset="0"/>
+                          <a:cs typeface="Segoe UI" panose="020B0502040204020203" pitchFamily="34" charset="0"/>
                           <a:sym typeface="Red Hat Text"/>
                         </a:rPr>
                         <a:t>Quick sort</a:t>
@@ -12319,9 +12344,9 @@
                         <a:solidFill>
                           <a:schemeClr val="dk2"/>
                         </a:solidFill>
-                        <a:latin typeface="Red Hat Text"/>
+                        <a:latin typeface="Segoe UI" panose="020B0502040204020203" pitchFamily="34" charset="0"/>
                         <a:ea typeface="Red Hat Text"/>
-                        <a:cs typeface="Red Hat Text"/>
+                        <a:cs typeface="Segoe UI" panose="020B0502040204020203" pitchFamily="34" charset="0"/>
                         <a:sym typeface="Red Hat Text"/>
                       </a:endParaRPr>
                     </a:p>
@@ -12356,9 +12381,9 @@
                               <a:lumMod val="10000"/>
                             </a:schemeClr>
                           </a:solidFill>
-                          <a:latin typeface="Red Hat Text"/>
+                          <a:latin typeface="Segoe UI" panose="020B0502040204020203" pitchFamily="34" charset="0"/>
                           <a:ea typeface="Red Hat Text"/>
-                          <a:cs typeface="Red Hat Text"/>
+                          <a:cs typeface="Segoe UI" panose="020B0502040204020203" pitchFamily="34" charset="0"/>
                           <a:sym typeface="Arial"/>
                         </a:rPr>
                         <a:t>n * log(n)</a:t>
@@ -12369,9 +12394,9 @@
                             <a:lumMod val="10000"/>
                           </a:schemeClr>
                         </a:solidFill>
-                        <a:latin typeface="Red Hat Text"/>
+                        <a:latin typeface="Segoe UI" panose="020B0502040204020203" pitchFamily="34" charset="0"/>
                         <a:ea typeface="Red Hat Text"/>
-                        <a:cs typeface="Red Hat Text"/>
+                        <a:cs typeface="Segoe UI" panose="020B0502040204020203" pitchFamily="34" charset="0"/>
                         <a:sym typeface="Red Hat Text"/>
                       </a:endParaRPr>
                     </a:p>
@@ -12410,9 +12435,9 @@
                               <a:lumMod val="10000"/>
                             </a:schemeClr>
                           </a:solidFill>
-                          <a:latin typeface="Red Hat Text"/>
+                          <a:latin typeface="Segoe UI" panose="020B0502040204020203" pitchFamily="34" charset="0"/>
                           <a:ea typeface="Red Hat Text"/>
-                          <a:cs typeface="Red Hat Text"/>
+                          <a:cs typeface="Segoe UI" panose="020B0502040204020203" pitchFamily="34" charset="0"/>
                           <a:sym typeface="Arial"/>
                         </a:rPr>
                         <a:t>n * log(n)</a:t>
@@ -12423,9 +12448,9 @@
                             <a:lumMod val="10000"/>
                           </a:schemeClr>
                         </a:solidFill>
-                        <a:latin typeface="Red Hat Text"/>
+                        <a:latin typeface="Segoe UI" panose="020B0502040204020203" pitchFamily="34" charset="0"/>
                         <a:ea typeface="Red Hat Text"/>
-                        <a:cs typeface="Red Hat Text"/>
+                        <a:cs typeface="Segoe UI" panose="020B0502040204020203" pitchFamily="34" charset="0"/>
                         <a:sym typeface="Red Hat Text"/>
                       </a:endParaRPr>
                     </a:p>
@@ -12464,9 +12489,9 @@
                               <a:lumMod val="10000"/>
                             </a:schemeClr>
                           </a:solidFill>
-                          <a:latin typeface="Red Hat Text"/>
+                          <a:latin typeface="Segoe UI" panose="020B0502040204020203" pitchFamily="34" charset="0"/>
                           <a:ea typeface="Red Hat Text"/>
-                          <a:cs typeface="Red Hat Text"/>
+                          <a:cs typeface="Segoe UI" panose="020B0502040204020203" pitchFamily="34" charset="0"/>
                           <a:sym typeface="Arial"/>
                         </a:rPr>
                         <a:t>n^2</a:t>
@@ -12477,9 +12502,9 @@
                             <a:lumMod val="10000"/>
                           </a:schemeClr>
                         </a:solidFill>
-                        <a:latin typeface="Red Hat Text"/>
+                        <a:latin typeface="Segoe UI" panose="020B0502040204020203" pitchFamily="34" charset="0"/>
                         <a:ea typeface="Red Hat Text"/>
-                        <a:cs typeface="Red Hat Text"/>
+                        <a:cs typeface="Segoe UI" panose="020B0502040204020203" pitchFamily="34" charset="0"/>
                         <a:sym typeface="Red Hat Text"/>
                       </a:endParaRPr>
                     </a:p>
@@ -12518,9 +12543,9 @@
                               <a:lumMod val="10000"/>
                             </a:schemeClr>
                           </a:solidFill>
-                          <a:latin typeface="Red Hat Text"/>
+                          <a:latin typeface="Segoe UI" panose="020B0502040204020203" pitchFamily="34" charset="0"/>
                           <a:ea typeface="Red Hat Text"/>
-                          <a:cs typeface="Red Hat Text"/>
+                          <a:cs typeface="Segoe UI" panose="020B0502040204020203" pitchFamily="34" charset="0"/>
                           <a:sym typeface="Red Hat Text"/>
                         </a:rPr>
                         <a:t>log(n)</a:t>
@@ -12531,9 +12556,9 @@
                             <a:lumMod val="10000"/>
                           </a:schemeClr>
                         </a:solidFill>
-                        <a:latin typeface="Red Hat Text"/>
+                        <a:latin typeface="Segoe UI" panose="020B0502040204020203" pitchFamily="34" charset="0"/>
                         <a:ea typeface="Red Hat Text"/>
-                        <a:cs typeface="Red Hat Text"/>
+                        <a:cs typeface="Segoe UI" panose="020B0502040204020203" pitchFamily="34" charset="0"/>
                         <a:sym typeface="Red Hat Text"/>
                       </a:endParaRPr>
                     </a:p>
@@ -21891,7 +21916,7 @@
         <p:spPr>
           <a:xfrm>
             <a:off x="0" y="990678"/>
-            <a:ext cx="9610000" cy="5515629"/>
+            <a:ext cx="9610000" cy="1312907"/>
           </a:xfrm>
         </p:spPr>
         <p:txBody>
@@ -21902,7 +21927,7 @@
               <a:buNone/>
             </a:pPr>
             <a:r>
-              <a:rPr lang="en-US" dirty="0" smtClean="0">
+              <a:rPr lang="en-US" sz="1400" dirty="0" smtClean="0">
                 <a:latin typeface="Segoe UI" panose="020B0502040204020203" pitchFamily="34" charset="0"/>
                 <a:cs typeface="Segoe UI" panose="020B0502040204020203" pitchFamily="34" charset="0"/>
               </a:rPr>
@@ -21911,7 +21936,7 @@
           </a:p>
           <a:p>
             <a:r>
-              <a:rPr lang="en-US" dirty="0" smtClean="0">
+              <a:rPr lang="en-US" sz="1400" dirty="0" smtClean="0">
                 <a:latin typeface="Segoe UI" panose="020B0502040204020203" pitchFamily="34" charset="0"/>
                 <a:cs typeface="Segoe UI" panose="020B0502040204020203" pitchFamily="34" charset="0"/>
               </a:rPr>
@@ -21920,7 +21945,7 @@
           </a:p>
           <a:p>
             <a:r>
-              <a:rPr lang="en-US" dirty="0" smtClean="0">
+              <a:rPr lang="en-US" sz="1400" dirty="0" smtClean="0">
                 <a:latin typeface="Segoe UI" panose="020B0502040204020203" pitchFamily="34" charset="0"/>
                 <a:cs typeface="Segoe UI" panose="020B0502040204020203" pitchFamily="34" charset="0"/>
               </a:rPr>
@@ -21929,7 +21954,7 @@
           </a:p>
           <a:p>
             <a:r>
-              <a:rPr lang="en-US" dirty="0" smtClean="0">
+              <a:rPr lang="en-US" sz="1400" dirty="0" smtClean="0">
                 <a:latin typeface="Segoe UI" panose="020B0502040204020203" pitchFamily="34" charset="0"/>
                 <a:cs typeface="Segoe UI" panose="020B0502040204020203" pitchFamily="34" charset="0"/>
               </a:rPr>
@@ -21938,35 +21963,35 @@
           </a:p>
           <a:p>
             <a:r>
-              <a:rPr lang="en-US" dirty="0" smtClean="0">
+              <a:rPr lang="en-US" sz="1400" dirty="0" smtClean="0">
                 <a:latin typeface="Segoe UI" panose="020B0502040204020203" pitchFamily="34" charset="0"/>
                 <a:cs typeface="Segoe UI" panose="020B0502040204020203" pitchFamily="34" charset="0"/>
               </a:rPr>
               <a:t>Directed / Undirected – directions assigned to distanced </a:t>
             </a:r>
             <a:r>
-              <a:rPr lang="en-US" dirty="0">
+              <a:rPr lang="en-US" sz="1400" dirty="0">
                 <a:latin typeface="Segoe UI" panose="020B0502040204020203" pitchFamily="34" charset="0"/>
                 <a:cs typeface="Segoe UI" panose="020B0502040204020203" pitchFamily="34" charset="0"/>
               </a:rPr>
               <a:t>between vertices (one way </a:t>
             </a:r>
             <a:r>
-              <a:rPr lang="en-US" dirty="0" smtClean="0">
+              <a:rPr lang="en-US" sz="1400" dirty="0" smtClean="0">
                 <a:latin typeface="Segoe UI" panose="020B0502040204020203" pitchFamily="34" charset="0"/>
                 <a:cs typeface="Segoe UI" panose="020B0502040204020203" pitchFamily="34" charset="0"/>
               </a:rPr>
               <a:t>street / friends </a:t>
             </a:r>
             <a:r>
-              <a:rPr lang="en-US" dirty="0">
+              <a:rPr lang="en-US" sz="1400" dirty="0">
                 <a:latin typeface="Segoe UI" panose="020B0502040204020203" pitchFamily="34" charset="0"/>
                 <a:cs typeface="Segoe UI" panose="020B0502040204020203" pitchFamily="34" charset="0"/>
               </a:rPr>
               <a:t>on </a:t>
             </a:r>
             <a:r>
-              <a:rPr lang="en-US" dirty="0" smtClean="0">
+              <a:rPr lang="en-US" sz="1400" dirty="0" smtClean="0">
                 <a:latin typeface="Segoe UI" panose="020B0502040204020203" pitchFamily="34" charset="0"/>
                 <a:cs typeface="Segoe UI" panose="020B0502040204020203" pitchFamily="34" charset="0"/>
               </a:rPr>
@@ -21974,13 +21999,126 @@
             </a:r>
           </a:p>
           <a:p>
-            <a:endParaRPr lang="en-US" dirty="0">
+            <a:endParaRPr lang="en-US" sz="1400" dirty="0">
               <a:latin typeface="Segoe UI" panose="020B0502040204020203" pitchFamily="34" charset="0"/>
               <a:cs typeface="Segoe UI" panose="020B0502040204020203" pitchFamily="34" charset="0"/>
             </a:endParaRPr>
           </a:p>
+          <a:p>
+            <a:pPr marL="76200" indent="0">
+              <a:buNone/>
+            </a:pPr>
+            <a:endParaRPr lang="en-US" sz="1400" dirty="0" smtClean="0">
+              <a:latin typeface="Segoe UI" panose="020B0502040204020203" pitchFamily="34" charset="0"/>
+              <a:cs typeface="Segoe UI" panose="020B0502040204020203" pitchFamily="34" charset="0"/>
+            </a:endParaRPr>
+          </a:p>
         </p:txBody>
       </p:sp>
+      <p:sp>
+        <p:nvSpPr>
+          <p:cNvPr id="9" name="TextBox 8"/>
+          <p:cNvSpPr txBox="1"/>
+          <p:nvPr/>
+        </p:nvSpPr>
+        <p:spPr>
+          <a:xfrm>
+            <a:off x="175845" y="2409092"/>
+            <a:ext cx="7034313" cy="646331"/>
+          </a:xfrm>
+          <a:prstGeom prst="rect">
+            <a:avLst/>
+          </a:prstGeom>
+          <a:noFill/>
+        </p:spPr>
+        <p:txBody>
+          <a:bodyPr wrap="square" rtlCol="0">
+            <a:spAutoFit/>
+          </a:bodyPr>
+          <a:lstStyle/>
+          <a:p>
+            <a:r>
+              <a:rPr lang="en-US" dirty="0" smtClean="0"/>
+              <a:t>Adjacency matrix – </a:t>
+            </a:r>
+            <a:r>
+              <a:rPr lang="en-US" dirty="0" smtClean="0">
+                <a:solidFill>
+                  <a:srgbClr val="FF0000"/>
+                </a:solidFill>
+              </a:rPr>
+              <a:t>only for undirected graph</a:t>
+            </a:r>
+          </a:p>
+          <a:p>
+            <a:r>
+              <a:rPr lang="en-US" dirty="0" smtClean="0"/>
+              <a:t>Adjacency lists(can use hash tables if keys in not numbers)</a:t>
+            </a:r>
+            <a:endParaRPr lang="en-US" dirty="0"/>
+          </a:p>
+        </p:txBody>
+      </p:sp>
+      <p:pic>
+        <p:nvPicPr>
+          <p:cNvPr id="11" name="Picture 10"/>
+          <p:cNvPicPr>
+            <a:picLocks noChangeAspect="1"/>
+          </p:cNvPicPr>
+          <p:nvPr/>
+        </p:nvPicPr>
+        <p:blipFill>
+          <a:blip r:embed="rId2">
+            <a:extLst>
+              <a:ext uri="{28A0092B-C50C-407E-A947-70E740481C1C}">
+                <a14:useLocalDpi xmlns:a14="http://schemas.microsoft.com/office/drawing/2010/main" val="0"/>
+              </a:ext>
+            </a:extLst>
+          </a:blip>
+          <a:stretch>
+            <a:fillRect/>
+          </a:stretch>
+        </p:blipFill>
+        <p:spPr>
+          <a:xfrm>
+            <a:off x="0" y="3440113"/>
+            <a:ext cx="4511187" cy="3417887"/>
+          </a:xfrm>
+          <a:prstGeom prst="rect">
+            <a:avLst/>
+          </a:prstGeom>
+        </p:spPr>
+      </p:pic>
+      <p:pic>
+        <p:nvPicPr>
+          <p:cNvPr id="12" name="Picture 11"/>
+          <p:cNvPicPr>
+            <a:picLocks noChangeAspect="1"/>
+          </p:cNvPicPr>
+          <p:nvPr/>
+        </p:nvPicPr>
+        <p:blipFill>
+          <a:blip r:embed="rId3">
+            <a:extLst>
+              <a:ext uri="{28A0092B-C50C-407E-A947-70E740481C1C}">
+                <a14:useLocalDpi xmlns:a14="http://schemas.microsoft.com/office/drawing/2010/main" val="0"/>
+              </a:ext>
+            </a:extLst>
+          </a:blip>
+          <a:stretch>
+            <a:fillRect/>
+          </a:stretch>
+        </p:blipFill>
+        <p:spPr>
+          <a:xfrm>
+            <a:off x="7210159" y="2409092"/>
+            <a:ext cx="4799682" cy="3116970"/>
+          </a:xfrm>
+          <a:prstGeom prst="rect">
+            <a:avLst/>
+          </a:prstGeom>
+        </p:spPr>
+      </p:pic>
     </p:spTree>
     <p:extLst>
       <p:ext uri="{BB962C8B-B14F-4D97-AF65-F5344CB8AC3E}">
@@ -22039,11 +22177,18 @@
           <a:lstStyle/>
           <a:p>
             <a:r>
-              <a:rPr lang="en-US" b="1" dirty="0">
-                <a:latin typeface="Segoe UI" panose="020B0502040204020203" pitchFamily="34" charset="0"/>
-                <a:cs typeface="Segoe UI" panose="020B0502040204020203" pitchFamily="34" charset="0"/>
-              </a:rPr>
-              <a:t>Graphs</a:t>
+              <a:rPr lang="en-US" dirty="0" smtClean="0">
+                <a:latin typeface="Segoe UI" panose="020B0502040204020203" pitchFamily="34" charset="0"/>
+                <a:cs typeface="Segoe UI" panose="020B0502040204020203" pitchFamily="34" charset="0"/>
+              </a:rPr>
+              <a:t>Graphs Big </a:t>
+            </a:r>
+            <a:r>
+              <a:rPr lang="en-US" dirty="0">
+                <a:latin typeface="Segoe UI" panose="020B0502040204020203" pitchFamily="34" charset="0"/>
+                <a:cs typeface="Segoe UI" panose="020B0502040204020203" pitchFamily="34" charset="0"/>
+              </a:rPr>
+              <a:t>O</a:t>
             </a:r>
             <a:endParaRPr lang="en-US" dirty="0">
               <a:latin typeface="Segoe UI" panose="020B0502040204020203" pitchFamily="34" charset="0"/>
@@ -22072,13 +22217,1579 @@
           <a:bodyPr/>
           <a:lstStyle/>
           <a:p>
+            <a:r>
+              <a:rPr lang="en-US" dirty="0" smtClean="0">
+                <a:latin typeface="Segoe UI" panose="020B0502040204020203" pitchFamily="34" charset="0"/>
+                <a:cs typeface="Segoe UI" panose="020B0502040204020203" pitchFamily="34" charset="0"/>
+              </a:rPr>
+              <a:t>| V | - number of vertices</a:t>
+            </a:r>
+          </a:p>
+          <a:p>
+            <a:r>
+              <a:rPr lang="en-US" dirty="0" smtClean="0">
+                <a:latin typeface="Segoe UI" panose="020B0502040204020203" pitchFamily="34" charset="0"/>
+                <a:cs typeface="Segoe UI" panose="020B0502040204020203" pitchFamily="34" charset="0"/>
+              </a:rPr>
+              <a:t>| E | - number of edges</a:t>
+            </a:r>
+          </a:p>
+          <a:p>
             <a:endParaRPr lang="en-US" dirty="0">
               <a:latin typeface="Segoe UI" panose="020B0502040204020203" pitchFamily="34" charset="0"/>
               <a:cs typeface="Segoe UI" panose="020B0502040204020203" pitchFamily="34" charset="0"/>
             </a:endParaRPr>
           </a:p>
+          <a:p>
+            <a:pPr marL="76200" indent="0">
+              <a:buNone/>
+            </a:pPr>
+            <a:endParaRPr lang="en-US" dirty="0">
+              <a:latin typeface="Segoe UI" panose="020B0502040204020203" pitchFamily="34" charset="0"/>
+              <a:cs typeface="Segoe UI" panose="020B0502040204020203" pitchFamily="34" charset="0"/>
+            </a:endParaRPr>
+          </a:p>
         </p:txBody>
       </p:sp>
+      <p:graphicFrame>
+        <p:nvGraphicFramePr>
+          <p:cNvPr id="6" name="Table 5"/>
+          <p:cNvGraphicFramePr>
+            <a:graphicFrameLocks noGrp="1"/>
+          </p:cNvGraphicFramePr>
+          <p:nvPr>
+            <p:extLst>
+              <p:ext uri="{D42A27DB-BD31-4B8C-83A1-F6EECF244321}">
+                <p14:modId xmlns:p14="http://schemas.microsoft.com/office/powerpoint/2010/main" val="127576466"/>
+              </p:ext>
+            </p:extLst>
+          </p:nvPr>
+        </p:nvGraphicFramePr>
+        <p:xfrm>
+          <a:off x="306787" y="2291496"/>
+          <a:ext cx="5766000" cy="3778901"/>
+        </p:xfrm>
+        <a:graphic>
+          <a:graphicData uri="http://schemas.openxmlformats.org/drawingml/2006/table">
+            <a:tbl>
+              <a:tblPr>
+                <a:tableStyleId>{775DCB02-9BB8-47FD-8907-85C794F793BA}</a:tableStyleId>
+              </a:tblPr>
+              <a:tblGrid>
+                <a:gridCol w="1922000">
+                  <a:extLst>
+                    <a:ext uri="{9D8B030D-6E8A-4147-A177-3AD203B41FA5}">
+                      <a16:colId xmlns:a16="http://schemas.microsoft.com/office/drawing/2014/main" val="64851094"/>
+                    </a:ext>
+                  </a:extLst>
+                </a:gridCol>
+                <a:gridCol w="1922000">
+                  <a:extLst>
+                    <a:ext uri="{9D8B030D-6E8A-4147-A177-3AD203B41FA5}">
+                      <a16:colId xmlns:a16="http://schemas.microsoft.com/office/drawing/2014/main" val="1353966151"/>
+                    </a:ext>
+                  </a:extLst>
+                </a:gridCol>
+                <a:gridCol w="1922000">
+                  <a:extLst>
+                    <a:ext uri="{9D8B030D-6E8A-4147-A177-3AD203B41FA5}">
+                      <a16:colId xmlns:a16="http://schemas.microsoft.com/office/drawing/2014/main" val="2043248338"/>
+                    </a:ext>
+                  </a:extLst>
+                </a:gridCol>
+              </a:tblGrid>
+              <a:tr h="539843">
+                <a:tc>
+                  <a:txBody>
+                    <a:bodyPr/>
+                    <a:lstStyle/>
+                    <a:p>
+                      <a:pPr marL="0" marR="0" lvl="0" indent="0" algn="ctr" rtl="0" eaLnBrk="1" hangingPunct="1">
+                        <a:lnSpc>
+                          <a:spcPct val="100000"/>
+                        </a:lnSpc>
+                        <a:spcBef>
+                          <a:spcPts val="0"/>
+                        </a:spcBef>
+                        <a:spcAft>
+                          <a:spcPts val="0"/>
+                        </a:spcAft>
+                        <a:buClr>
+                          <a:srgbClr val="000000"/>
+                        </a:buClr>
+                        <a:buFont typeface="Arial"/>
+                        <a:buNone/>
+                      </a:pPr>
+                      <a:r>
+                        <a:rPr lang="en-US" sz="1500" b="0" i="0" u="none" strike="noStrike" cap="none" dirty="0" smtClean="0">
+                          <a:solidFill>
+                            <a:schemeClr val="dk2"/>
+                          </a:solidFill>
+                          <a:latin typeface="Segoe UI" panose="020B0502040204020203" pitchFamily="34" charset="0"/>
+                          <a:ea typeface="Red Hat Text"/>
+                          <a:cs typeface="Segoe UI" panose="020B0502040204020203" pitchFamily="34" charset="0"/>
+                          <a:sym typeface="Red Hat Text"/>
+                        </a:rPr>
+                        <a:t>Operation</a:t>
+                      </a:r>
+                      <a:endParaRPr sz="1500" b="0" i="0" u="none" strike="noStrike" cap="none" dirty="0">
+                        <a:solidFill>
+                          <a:schemeClr val="dk2"/>
+                        </a:solidFill>
+                        <a:latin typeface="Segoe UI" panose="020B0502040204020203" pitchFamily="34" charset="0"/>
+                        <a:ea typeface="Red Hat Text"/>
+                        <a:cs typeface="Segoe UI" panose="020B0502040204020203" pitchFamily="34" charset="0"/>
+                        <a:sym typeface="Red Hat Text"/>
+                      </a:endParaRPr>
+                    </a:p>
+                  </a:txBody>
+                  <a:tcPr marL="121900" marR="121900" marT="91433" marB="91433" anchor="ctr"/>
+                </a:tc>
+                <a:tc>
+                  <a:txBody>
+                    <a:bodyPr/>
+                    <a:lstStyle/>
+                    <a:p>
+                      <a:pPr marL="0" marR="0" lvl="0" indent="0" algn="ctr" rtl="0" eaLnBrk="1" hangingPunct="1">
+                        <a:lnSpc>
+                          <a:spcPct val="100000"/>
+                        </a:lnSpc>
+                        <a:spcBef>
+                          <a:spcPts val="0"/>
+                        </a:spcBef>
+                        <a:spcAft>
+                          <a:spcPts val="0"/>
+                        </a:spcAft>
+                        <a:buClr>
+                          <a:srgbClr val="000000"/>
+                        </a:buClr>
+                        <a:buFont typeface="Arial"/>
+                        <a:buNone/>
+                      </a:pPr>
+                      <a:r>
+                        <a:rPr lang="en-US" sz="1500" b="0" i="0" u="none" strike="noStrike" cap="none" dirty="0" smtClean="0">
+                          <a:solidFill>
+                            <a:schemeClr val="dk2"/>
+                          </a:solidFill>
+                          <a:latin typeface="Segoe UI" panose="020B0502040204020203" pitchFamily="34" charset="0"/>
+                          <a:ea typeface="Red Hat Text"/>
+                          <a:cs typeface="Segoe UI" panose="020B0502040204020203" pitchFamily="34" charset="0"/>
+                          <a:sym typeface="Arial"/>
+                        </a:rPr>
+                        <a:t> Adjacency lists</a:t>
+                      </a:r>
+                      <a:endParaRPr sz="1500" b="0" i="0" u="none" strike="noStrike" cap="none" dirty="0">
+                        <a:solidFill>
+                          <a:schemeClr val="dk2"/>
+                        </a:solidFill>
+                        <a:latin typeface="Segoe UI" panose="020B0502040204020203" pitchFamily="34" charset="0"/>
+                        <a:ea typeface="Red Hat Text"/>
+                        <a:cs typeface="Segoe UI" panose="020B0502040204020203" pitchFamily="34" charset="0"/>
+                        <a:sym typeface="Red Hat Text"/>
+                      </a:endParaRPr>
+                    </a:p>
+                  </a:txBody>
+                  <a:tcPr marL="121900" marR="121900" marT="91433" marB="91433" anchor="ctr"/>
+                </a:tc>
+                <a:tc>
+                  <a:txBody>
+                    <a:bodyPr/>
+                    <a:lstStyle/>
+                    <a:p>
+                      <a:pPr marL="0" marR="0" lvl="0" indent="0" algn="ctr" rtl="0" eaLnBrk="1" hangingPunct="1">
+                        <a:lnSpc>
+                          <a:spcPct val="100000"/>
+                        </a:lnSpc>
+                        <a:spcBef>
+                          <a:spcPts val="0"/>
+                        </a:spcBef>
+                        <a:spcAft>
+                          <a:spcPts val="0"/>
+                        </a:spcAft>
+                        <a:buClr>
+                          <a:srgbClr val="000000"/>
+                        </a:buClr>
+                        <a:buFont typeface="Arial"/>
+                        <a:buNone/>
+                      </a:pPr>
+                      <a:r>
+                        <a:rPr lang="en-US" sz="1500" b="0" i="0" u="none" strike="noStrike" cap="none" dirty="0" smtClean="0">
+                          <a:solidFill>
+                            <a:schemeClr val="dk2"/>
+                          </a:solidFill>
+                          <a:latin typeface="Segoe UI" panose="020B0502040204020203" pitchFamily="34" charset="0"/>
+                          <a:ea typeface="Red Hat Text"/>
+                          <a:cs typeface="Segoe UI" panose="020B0502040204020203" pitchFamily="34" charset="0"/>
+                          <a:sym typeface="Arial"/>
+                        </a:rPr>
+                        <a:t>Adjacency matrix</a:t>
+                      </a:r>
+                      <a:endParaRPr sz="1500" b="0" i="0" u="none" strike="noStrike" cap="none" dirty="0">
+                        <a:solidFill>
+                          <a:schemeClr val="dk2"/>
+                        </a:solidFill>
+                        <a:latin typeface="Segoe UI" panose="020B0502040204020203" pitchFamily="34" charset="0"/>
+                        <a:ea typeface="Red Hat Text"/>
+                        <a:cs typeface="Segoe UI" panose="020B0502040204020203" pitchFamily="34" charset="0"/>
+                        <a:sym typeface="Red Hat Text"/>
+                      </a:endParaRPr>
+                    </a:p>
+                  </a:txBody>
+                  <a:tcPr marL="121900" marR="121900" marT="91433" marB="91433" anchor="ctr"/>
+                </a:tc>
+                <a:extLst>
+                  <a:ext uri="{0D108BD9-81ED-4DB2-BD59-A6C34878D82A}">
+                    <a16:rowId xmlns:a16="http://schemas.microsoft.com/office/drawing/2014/main" val="1308435311"/>
+                  </a:ext>
+                </a:extLst>
+              </a:tr>
+              <a:tr h="539843">
+                <a:tc>
+                  <a:txBody>
+                    <a:bodyPr/>
+                    <a:lstStyle/>
+                    <a:p>
+                      <a:pPr marL="0" marR="0" lvl="0" indent="0" algn="ctr" rtl="0" eaLnBrk="1" hangingPunct="1">
+                        <a:lnSpc>
+                          <a:spcPct val="100000"/>
+                        </a:lnSpc>
+                        <a:spcBef>
+                          <a:spcPts val="0"/>
+                        </a:spcBef>
+                        <a:spcAft>
+                          <a:spcPts val="0"/>
+                        </a:spcAft>
+                        <a:buClr>
+                          <a:srgbClr val="000000"/>
+                        </a:buClr>
+                        <a:buFont typeface="Arial"/>
+                        <a:buNone/>
+                      </a:pPr>
+                      <a:r>
+                        <a:rPr lang="en" sz="1500" b="0" i="0" u="none" strike="noStrike" cap="none" dirty="0" smtClean="0">
+                          <a:solidFill>
+                            <a:schemeClr val="dk2"/>
+                          </a:solidFill>
+                          <a:latin typeface="Segoe UI" panose="020B0502040204020203" pitchFamily="34" charset="0"/>
+                          <a:ea typeface="Red Hat Text"/>
+                          <a:cs typeface="Segoe UI" panose="020B0502040204020203" pitchFamily="34" charset="0"/>
+                          <a:sym typeface="Red Hat Text"/>
+                        </a:rPr>
+                        <a:t>Add vertex</a:t>
+                      </a:r>
+                      <a:endParaRPr sz="1500" b="0" i="0" u="none" strike="noStrike" cap="none" dirty="0">
+                        <a:solidFill>
+                          <a:schemeClr val="dk2"/>
+                        </a:solidFill>
+                        <a:latin typeface="Segoe UI" panose="020B0502040204020203" pitchFamily="34" charset="0"/>
+                        <a:ea typeface="Red Hat Text"/>
+                        <a:cs typeface="Segoe UI" panose="020B0502040204020203" pitchFamily="34" charset="0"/>
+                        <a:sym typeface="Red Hat Text"/>
+                      </a:endParaRPr>
+                    </a:p>
+                  </a:txBody>
+                  <a:tcPr marL="121900" marR="121900" marT="91433" marB="91433" anchor="ctr"/>
+                </a:tc>
+                <a:tc>
+                  <a:txBody>
+                    <a:bodyPr/>
+                    <a:lstStyle/>
+                    <a:p>
+                      <a:pPr marL="0" marR="0" lvl="0" indent="0" algn="ctr" rtl="0" eaLnBrk="1" hangingPunct="1">
+                        <a:lnSpc>
+                          <a:spcPct val="100000"/>
+                        </a:lnSpc>
+                        <a:spcBef>
+                          <a:spcPts val="0"/>
+                        </a:spcBef>
+                        <a:spcAft>
+                          <a:spcPts val="0"/>
+                        </a:spcAft>
+                        <a:buClr>
+                          <a:srgbClr val="000000"/>
+                        </a:buClr>
+                        <a:buFont typeface="Arial"/>
+                        <a:buNone/>
+                      </a:pPr>
+                      <a:r>
+                        <a:rPr lang="en-US" sz="1400" b="0" i="0" u="none" strike="noStrike" cap="none" dirty="0" smtClean="0">
+                          <a:solidFill>
+                            <a:schemeClr val="tx1"/>
+                          </a:solidFill>
+                          <a:latin typeface="Segoe UI" panose="020B0502040204020203" pitchFamily="34" charset="0"/>
+                          <a:ea typeface="Red Hat Text"/>
+                          <a:cs typeface="Segoe UI" panose="020B0502040204020203" pitchFamily="34" charset="0"/>
+                          <a:sym typeface="Red Hat Text"/>
+                        </a:rPr>
+                        <a:t>O(1)</a:t>
+                      </a:r>
+                      <a:endParaRPr sz="1400" b="0" i="0" u="none" strike="noStrike" cap="none" dirty="0">
+                        <a:solidFill>
+                          <a:schemeClr val="tx1"/>
+                        </a:solidFill>
+                        <a:latin typeface="Segoe UI" panose="020B0502040204020203" pitchFamily="34" charset="0"/>
+                        <a:ea typeface="Red Hat Text"/>
+                        <a:cs typeface="Segoe UI" panose="020B0502040204020203" pitchFamily="34" charset="0"/>
+                        <a:sym typeface="Red Hat Text"/>
+                      </a:endParaRPr>
+                    </a:p>
+                  </a:txBody>
+                  <a:tcPr marL="121900" marR="121900" marT="91433" marB="91433" anchor="ctr">
+                    <a:solidFill>
+                      <a:schemeClr val="bg1"/>
+                    </a:solidFill>
+                  </a:tcPr>
+                </a:tc>
+                <a:tc>
+                  <a:txBody>
+                    <a:bodyPr/>
+                    <a:lstStyle/>
+                    <a:p>
+                      <a:pPr marL="0" marR="0" lvl="0" indent="0" algn="ctr" rtl="0" eaLnBrk="1" hangingPunct="1">
+                        <a:lnSpc>
+                          <a:spcPct val="100000"/>
+                        </a:lnSpc>
+                        <a:spcBef>
+                          <a:spcPts val="0"/>
+                        </a:spcBef>
+                        <a:spcAft>
+                          <a:spcPts val="0"/>
+                        </a:spcAft>
+                        <a:buClr>
+                          <a:srgbClr val="000000"/>
+                        </a:buClr>
+                        <a:buFont typeface="Arial"/>
+                        <a:buNone/>
+                      </a:pPr>
+                      <a:r>
+                        <a:rPr lang="en-US" sz="1400" b="0" i="0" u="none" strike="noStrike" cap="none" dirty="0" smtClean="0">
+                          <a:solidFill>
+                            <a:schemeClr val="tx1"/>
+                          </a:solidFill>
+                          <a:latin typeface="Segoe UI" panose="020B0502040204020203" pitchFamily="34" charset="0"/>
+                          <a:ea typeface="Red Hat Text"/>
+                          <a:cs typeface="Segoe UI" panose="020B0502040204020203" pitchFamily="34" charset="0"/>
+                          <a:sym typeface="Red Hat Text"/>
+                        </a:rPr>
+                        <a:t>O( | V^2 | )</a:t>
+                      </a:r>
+                      <a:endParaRPr sz="1400" b="0" i="0" u="none" strike="noStrike" cap="none" dirty="0">
+                        <a:solidFill>
+                          <a:schemeClr val="tx1"/>
+                        </a:solidFill>
+                        <a:latin typeface="Segoe UI" panose="020B0502040204020203" pitchFamily="34" charset="0"/>
+                        <a:ea typeface="Red Hat Text"/>
+                        <a:cs typeface="Segoe UI" panose="020B0502040204020203" pitchFamily="34" charset="0"/>
+                        <a:sym typeface="Red Hat Text"/>
+                      </a:endParaRPr>
+                    </a:p>
+                  </a:txBody>
+                  <a:tcPr marL="121900" marR="121900" marT="91433" marB="91433" anchor="ctr">
+                    <a:solidFill>
+                      <a:schemeClr val="bg1"/>
+                    </a:solidFill>
+                  </a:tcPr>
+                </a:tc>
+                <a:extLst>
+                  <a:ext uri="{0D108BD9-81ED-4DB2-BD59-A6C34878D82A}">
+                    <a16:rowId xmlns:a16="http://schemas.microsoft.com/office/drawing/2014/main" val="6178432"/>
+                  </a:ext>
+                </a:extLst>
+              </a:tr>
+              <a:tr h="539843">
+                <a:tc>
+                  <a:txBody>
+                    <a:bodyPr/>
+                    <a:lstStyle/>
+                    <a:p>
+                      <a:pPr marL="0" marR="0" lvl="0" indent="0" algn="ctr" rtl="0" eaLnBrk="1" hangingPunct="1">
+                        <a:lnSpc>
+                          <a:spcPct val="100000"/>
+                        </a:lnSpc>
+                        <a:spcBef>
+                          <a:spcPts val="0"/>
+                        </a:spcBef>
+                        <a:spcAft>
+                          <a:spcPts val="0"/>
+                        </a:spcAft>
+                        <a:buClr>
+                          <a:srgbClr val="000000"/>
+                        </a:buClr>
+                        <a:buFont typeface="Arial"/>
+                        <a:buNone/>
+                      </a:pPr>
+                      <a:r>
+                        <a:rPr lang="en-US" sz="1500" b="0" i="0" u="none" strike="noStrike" cap="none" dirty="0" smtClean="0">
+                          <a:solidFill>
+                            <a:schemeClr val="dk2"/>
+                          </a:solidFill>
+                          <a:latin typeface="Segoe UI" panose="020B0502040204020203" pitchFamily="34" charset="0"/>
+                          <a:ea typeface="Red Hat Text"/>
+                          <a:cs typeface="Segoe UI" panose="020B0502040204020203" pitchFamily="34" charset="0"/>
+                          <a:sym typeface="Red Hat Text"/>
+                        </a:rPr>
+                        <a:t>Add edge</a:t>
+                      </a:r>
+                      <a:endParaRPr sz="1500" b="0" i="0" u="none" strike="noStrike" cap="none" dirty="0">
+                        <a:solidFill>
+                          <a:schemeClr val="dk2"/>
+                        </a:solidFill>
+                        <a:latin typeface="Segoe UI" panose="020B0502040204020203" pitchFamily="34" charset="0"/>
+                        <a:ea typeface="Red Hat Text"/>
+                        <a:cs typeface="Segoe UI" panose="020B0502040204020203" pitchFamily="34" charset="0"/>
+                        <a:sym typeface="Red Hat Text"/>
+                      </a:endParaRPr>
+                    </a:p>
+                  </a:txBody>
+                  <a:tcPr marL="121900" marR="121900" marT="91433" marB="91433" anchor="ctr"/>
+                </a:tc>
+                <a:tc>
+                  <a:txBody>
+                    <a:bodyPr/>
+                    <a:lstStyle/>
+                    <a:p>
+                      <a:pPr marL="0" marR="0" lvl="0" indent="0" algn="ctr" defTabSz="914400" rtl="0" eaLnBrk="1" fontAlgn="auto" latinLnBrk="0" hangingPunct="1">
+                        <a:lnSpc>
+                          <a:spcPct val="100000"/>
+                        </a:lnSpc>
+                        <a:spcBef>
+                          <a:spcPts val="0"/>
+                        </a:spcBef>
+                        <a:spcAft>
+                          <a:spcPts val="0"/>
+                        </a:spcAft>
+                        <a:buClr>
+                          <a:srgbClr val="000000"/>
+                        </a:buClr>
+                        <a:buSzTx/>
+                        <a:buFont typeface="Arial"/>
+                        <a:buNone/>
+                        <a:tabLst/>
+                        <a:defRPr/>
+                      </a:pPr>
+                      <a:r>
+                        <a:rPr lang="en-US" sz="1400" b="0" i="0" u="none" strike="noStrike" cap="none" dirty="0" smtClean="0">
+                          <a:solidFill>
+                            <a:schemeClr val="tx1"/>
+                          </a:solidFill>
+                          <a:latin typeface="Segoe UI" panose="020B0502040204020203" pitchFamily="34" charset="0"/>
+                          <a:ea typeface="Red Hat Text"/>
+                          <a:cs typeface="Segoe UI" panose="020B0502040204020203" pitchFamily="34" charset="0"/>
+                          <a:sym typeface="Red Hat Text"/>
+                        </a:rPr>
+                        <a:t>O(1)</a:t>
+                      </a:r>
+                    </a:p>
+                  </a:txBody>
+                  <a:tcPr marL="121900" marR="121900" marT="91433" marB="91433" anchor="ctr">
+                    <a:solidFill>
+                      <a:schemeClr val="bg1"/>
+                    </a:solidFill>
+                  </a:tcPr>
+                </a:tc>
+                <a:tc>
+                  <a:txBody>
+                    <a:bodyPr/>
+                    <a:lstStyle/>
+                    <a:p>
+                      <a:pPr marL="0" marR="0" lvl="0" indent="0" algn="ctr" rtl="0" eaLnBrk="1" hangingPunct="1">
+                        <a:lnSpc>
+                          <a:spcPct val="100000"/>
+                        </a:lnSpc>
+                        <a:spcBef>
+                          <a:spcPts val="0"/>
+                        </a:spcBef>
+                        <a:spcAft>
+                          <a:spcPts val="0"/>
+                        </a:spcAft>
+                        <a:buClr>
+                          <a:srgbClr val="000000"/>
+                        </a:buClr>
+                        <a:buFont typeface="Arial"/>
+                        <a:buNone/>
+                      </a:pPr>
+                      <a:r>
+                        <a:rPr lang="en-US" sz="1400" b="0" i="0" u="none" strike="noStrike" cap="none" dirty="0" smtClean="0">
+                          <a:solidFill>
+                            <a:schemeClr val="tx1"/>
+                          </a:solidFill>
+                          <a:latin typeface="Segoe UI" panose="020B0502040204020203" pitchFamily="34" charset="0"/>
+                          <a:ea typeface="Red Hat Text"/>
+                          <a:cs typeface="Segoe UI" panose="020B0502040204020203" pitchFamily="34" charset="0"/>
+                          <a:sym typeface="Red Hat Text"/>
+                        </a:rPr>
+                        <a:t>O(1)</a:t>
+                      </a:r>
+                      <a:endParaRPr sz="1400" b="0" i="0" u="none" strike="noStrike" cap="none" dirty="0">
+                        <a:solidFill>
+                          <a:schemeClr val="tx1"/>
+                        </a:solidFill>
+                        <a:latin typeface="Segoe UI" panose="020B0502040204020203" pitchFamily="34" charset="0"/>
+                        <a:ea typeface="Red Hat Text"/>
+                        <a:cs typeface="Segoe UI" panose="020B0502040204020203" pitchFamily="34" charset="0"/>
+                        <a:sym typeface="Red Hat Text"/>
+                      </a:endParaRPr>
+                    </a:p>
+                  </a:txBody>
+                  <a:tcPr marL="121900" marR="121900" marT="91433" marB="91433" anchor="ctr">
+                    <a:solidFill>
+                      <a:schemeClr val="bg1"/>
+                    </a:solidFill>
+                  </a:tcPr>
+                </a:tc>
+                <a:extLst>
+                  <a:ext uri="{0D108BD9-81ED-4DB2-BD59-A6C34878D82A}">
+                    <a16:rowId xmlns:a16="http://schemas.microsoft.com/office/drawing/2014/main" val="1420133012"/>
+                  </a:ext>
+                </a:extLst>
+              </a:tr>
+              <a:tr h="539843">
+                <a:tc>
+                  <a:txBody>
+                    <a:bodyPr/>
+                    <a:lstStyle/>
+                    <a:p>
+                      <a:pPr marL="0" marR="0" lvl="0" indent="0" algn="ctr" rtl="0" eaLnBrk="1" hangingPunct="1">
+                        <a:lnSpc>
+                          <a:spcPct val="100000"/>
+                        </a:lnSpc>
+                        <a:spcBef>
+                          <a:spcPts val="0"/>
+                        </a:spcBef>
+                        <a:spcAft>
+                          <a:spcPts val="0"/>
+                        </a:spcAft>
+                        <a:buClr>
+                          <a:srgbClr val="000000"/>
+                        </a:buClr>
+                        <a:buFont typeface="Arial"/>
+                        <a:buNone/>
+                      </a:pPr>
+                      <a:r>
+                        <a:rPr lang="en" sz="1500" b="0" i="0" u="none" strike="noStrike" cap="none" dirty="0" smtClean="0">
+                          <a:solidFill>
+                            <a:schemeClr val="dk2"/>
+                          </a:solidFill>
+                          <a:latin typeface="Segoe UI" panose="020B0502040204020203" pitchFamily="34" charset="0"/>
+                          <a:ea typeface="Red Hat Text"/>
+                          <a:cs typeface="Segoe UI" panose="020B0502040204020203" pitchFamily="34" charset="0"/>
+                          <a:sym typeface="Red Hat Text"/>
+                        </a:rPr>
+                        <a:t>Remove vertex</a:t>
+                      </a:r>
+                      <a:endParaRPr sz="1500" b="0" i="0" u="none" strike="noStrike" cap="none" dirty="0">
+                        <a:solidFill>
+                          <a:schemeClr val="dk2"/>
+                        </a:solidFill>
+                        <a:latin typeface="Segoe UI" panose="020B0502040204020203" pitchFamily="34" charset="0"/>
+                        <a:ea typeface="Red Hat Text"/>
+                        <a:cs typeface="Segoe UI" panose="020B0502040204020203" pitchFamily="34" charset="0"/>
+                        <a:sym typeface="Red Hat Text"/>
+                      </a:endParaRPr>
+                    </a:p>
+                  </a:txBody>
+                  <a:tcPr marL="121900" marR="121900" marT="91433" marB="91433" anchor="ctr"/>
+                </a:tc>
+                <a:tc>
+                  <a:txBody>
+                    <a:bodyPr/>
+                    <a:lstStyle/>
+                    <a:p>
+                      <a:pPr marL="0" marR="0" lvl="0" indent="0" algn="ctr" defTabSz="914400" rtl="0" eaLnBrk="1" fontAlgn="auto" latinLnBrk="0" hangingPunct="1">
+                        <a:lnSpc>
+                          <a:spcPct val="100000"/>
+                        </a:lnSpc>
+                        <a:spcBef>
+                          <a:spcPts val="0"/>
+                        </a:spcBef>
+                        <a:spcAft>
+                          <a:spcPts val="0"/>
+                        </a:spcAft>
+                        <a:buClr>
+                          <a:srgbClr val="000000"/>
+                        </a:buClr>
+                        <a:buSzTx/>
+                        <a:buFont typeface="Arial"/>
+                        <a:buNone/>
+                        <a:tabLst/>
+                        <a:defRPr/>
+                      </a:pPr>
+                      <a:r>
+                        <a:rPr lang="en-US" sz="1400" b="0" i="0" u="none" strike="noStrike" cap="none" dirty="0" smtClean="0">
+                          <a:solidFill>
+                            <a:schemeClr val="tx1"/>
+                          </a:solidFill>
+                          <a:latin typeface="Segoe UI" panose="020B0502040204020203" pitchFamily="34" charset="0"/>
+                          <a:ea typeface="Red Hat Text"/>
+                          <a:cs typeface="Segoe UI" panose="020B0502040204020203" pitchFamily="34" charset="0"/>
+                          <a:sym typeface="Red Hat Text"/>
+                        </a:rPr>
+                        <a:t>O( | V | + | E | )</a:t>
+                      </a:r>
+                    </a:p>
+                  </a:txBody>
+                  <a:tcPr marL="121900" marR="121900" marT="91433" marB="91433" anchor="ctr">
+                    <a:solidFill>
+                      <a:schemeClr val="bg1"/>
+                    </a:solidFill>
+                  </a:tcPr>
+                </a:tc>
+                <a:tc>
+                  <a:txBody>
+                    <a:bodyPr/>
+                    <a:lstStyle/>
+                    <a:p>
+                      <a:pPr marL="0" marR="0" lvl="0" indent="0" algn="ctr" defTabSz="914400" rtl="0" eaLnBrk="1" fontAlgn="auto" latinLnBrk="0" hangingPunct="1">
+                        <a:lnSpc>
+                          <a:spcPct val="100000"/>
+                        </a:lnSpc>
+                        <a:spcBef>
+                          <a:spcPts val="0"/>
+                        </a:spcBef>
+                        <a:spcAft>
+                          <a:spcPts val="0"/>
+                        </a:spcAft>
+                        <a:buClr>
+                          <a:srgbClr val="000000"/>
+                        </a:buClr>
+                        <a:buSzTx/>
+                        <a:buFont typeface="Arial"/>
+                        <a:buNone/>
+                        <a:tabLst/>
+                        <a:defRPr/>
+                      </a:pPr>
+                      <a:r>
+                        <a:rPr lang="en-US" sz="1400" b="0" i="0" u="none" strike="noStrike" cap="none" dirty="0" smtClean="0">
+                          <a:solidFill>
+                            <a:schemeClr val="tx1"/>
+                          </a:solidFill>
+                          <a:latin typeface="Segoe UI" panose="020B0502040204020203" pitchFamily="34" charset="0"/>
+                          <a:ea typeface="Red Hat Text"/>
+                          <a:cs typeface="Segoe UI" panose="020B0502040204020203" pitchFamily="34" charset="0"/>
+                          <a:sym typeface="Red Hat Text"/>
+                        </a:rPr>
+                        <a:t>O( | V^2 | )</a:t>
+                      </a:r>
+                    </a:p>
+                  </a:txBody>
+                  <a:tcPr marL="121900" marR="121900" marT="91433" marB="91433" anchor="ctr">
+                    <a:solidFill>
+                      <a:schemeClr val="bg1"/>
+                    </a:solidFill>
+                  </a:tcPr>
+                </a:tc>
+                <a:extLst>
+                  <a:ext uri="{0D108BD9-81ED-4DB2-BD59-A6C34878D82A}">
+                    <a16:rowId xmlns:a16="http://schemas.microsoft.com/office/drawing/2014/main" val="742927673"/>
+                  </a:ext>
+                </a:extLst>
+              </a:tr>
+              <a:tr h="539843">
+                <a:tc>
+                  <a:txBody>
+                    <a:bodyPr/>
+                    <a:lstStyle/>
+                    <a:p>
+                      <a:pPr marL="0" marR="0" lvl="0" indent="0" algn="ctr" defTabSz="914400" rtl="0" eaLnBrk="1" fontAlgn="auto" latinLnBrk="0" hangingPunct="1">
+                        <a:lnSpc>
+                          <a:spcPct val="100000"/>
+                        </a:lnSpc>
+                        <a:spcBef>
+                          <a:spcPts val="0"/>
+                        </a:spcBef>
+                        <a:spcAft>
+                          <a:spcPts val="0"/>
+                        </a:spcAft>
+                        <a:buClr>
+                          <a:srgbClr val="000000"/>
+                        </a:buClr>
+                        <a:buSzTx/>
+                        <a:buFont typeface="Arial"/>
+                        <a:buNone/>
+                        <a:tabLst/>
+                        <a:defRPr/>
+                      </a:pPr>
+                      <a:r>
+                        <a:rPr lang="en-US" sz="1500" b="0" i="0" u="none" strike="noStrike" cap="none" dirty="0" smtClean="0">
+                          <a:solidFill>
+                            <a:schemeClr val="dk2"/>
+                          </a:solidFill>
+                          <a:latin typeface="Segoe UI" panose="020B0502040204020203" pitchFamily="34" charset="0"/>
+                          <a:ea typeface="Red Hat Text"/>
+                          <a:cs typeface="Segoe UI" panose="020B0502040204020203" pitchFamily="34" charset="0"/>
+                          <a:sym typeface="Red Hat Text"/>
+                        </a:rPr>
+                        <a:t>Remove edge</a:t>
+                      </a:r>
+                    </a:p>
+                  </a:txBody>
+                  <a:tcPr marL="121900" marR="121900" marT="91433" marB="91433" anchor="ctr"/>
+                </a:tc>
+                <a:tc>
+                  <a:txBody>
+                    <a:bodyPr/>
+                    <a:lstStyle/>
+                    <a:p>
+                      <a:pPr marL="0" marR="0" lvl="0" indent="0" algn="ctr" defTabSz="914400" rtl="0" eaLnBrk="1" fontAlgn="auto" latinLnBrk="0" hangingPunct="1">
+                        <a:lnSpc>
+                          <a:spcPct val="100000"/>
+                        </a:lnSpc>
+                        <a:spcBef>
+                          <a:spcPts val="0"/>
+                        </a:spcBef>
+                        <a:spcAft>
+                          <a:spcPts val="0"/>
+                        </a:spcAft>
+                        <a:buClr>
+                          <a:srgbClr val="000000"/>
+                        </a:buClr>
+                        <a:buSzTx/>
+                        <a:buFont typeface="Arial"/>
+                        <a:buNone/>
+                        <a:tabLst/>
+                        <a:defRPr/>
+                      </a:pPr>
+                      <a:r>
+                        <a:rPr lang="en-US" sz="1400" b="0" i="0" u="none" strike="noStrike" cap="none" dirty="0" smtClean="0">
+                          <a:solidFill>
+                            <a:schemeClr val="tx1"/>
+                          </a:solidFill>
+                          <a:latin typeface="Segoe UI" panose="020B0502040204020203" pitchFamily="34" charset="0"/>
+                          <a:ea typeface="Red Hat Text"/>
+                          <a:cs typeface="Segoe UI" panose="020B0502040204020203" pitchFamily="34" charset="0"/>
+                          <a:sym typeface="Red Hat Text"/>
+                        </a:rPr>
+                        <a:t>O( | E | )</a:t>
+                      </a:r>
+                    </a:p>
+                  </a:txBody>
+                  <a:tcPr marL="121900" marR="121900" marT="91433" marB="91433" anchor="ctr">
+                    <a:solidFill>
+                      <a:schemeClr val="bg1"/>
+                    </a:solidFill>
+                  </a:tcPr>
+                </a:tc>
+                <a:tc>
+                  <a:txBody>
+                    <a:bodyPr/>
+                    <a:lstStyle/>
+                    <a:p>
+                      <a:pPr marL="0" marR="0" lvl="0" indent="0" algn="ctr" rtl="0" eaLnBrk="1" hangingPunct="1">
+                        <a:lnSpc>
+                          <a:spcPct val="100000"/>
+                        </a:lnSpc>
+                        <a:spcBef>
+                          <a:spcPts val="0"/>
+                        </a:spcBef>
+                        <a:spcAft>
+                          <a:spcPts val="0"/>
+                        </a:spcAft>
+                        <a:buClr>
+                          <a:srgbClr val="000000"/>
+                        </a:buClr>
+                        <a:buFont typeface="Arial"/>
+                        <a:buNone/>
+                      </a:pPr>
+                      <a:r>
+                        <a:rPr lang="en-US" sz="1400" b="0" i="0" u="none" strike="noStrike" cap="none" dirty="0" smtClean="0">
+                          <a:solidFill>
+                            <a:schemeClr val="tx1"/>
+                          </a:solidFill>
+                          <a:latin typeface="Segoe UI" panose="020B0502040204020203" pitchFamily="34" charset="0"/>
+                          <a:ea typeface="Red Hat Text"/>
+                          <a:cs typeface="Segoe UI" panose="020B0502040204020203" pitchFamily="34" charset="0"/>
+                          <a:sym typeface="Red Hat Text"/>
+                        </a:rPr>
+                        <a:t>O(1)</a:t>
+                      </a:r>
+                      <a:endParaRPr sz="1400" b="0" i="0" u="none" strike="noStrike" cap="none" dirty="0">
+                        <a:solidFill>
+                          <a:schemeClr val="tx1"/>
+                        </a:solidFill>
+                        <a:latin typeface="Segoe UI" panose="020B0502040204020203" pitchFamily="34" charset="0"/>
+                        <a:ea typeface="Red Hat Text"/>
+                        <a:cs typeface="Segoe UI" panose="020B0502040204020203" pitchFamily="34" charset="0"/>
+                        <a:sym typeface="Red Hat Text"/>
+                      </a:endParaRPr>
+                    </a:p>
+                  </a:txBody>
+                  <a:tcPr marL="121900" marR="121900" marT="91433" marB="91433" anchor="ctr">
+                    <a:solidFill>
+                      <a:schemeClr val="bg1"/>
+                    </a:solidFill>
+                  </a:tcPr>
+                </a:tc>
+                <a:extLst>
+                  <a:ext uri="{0D108BD9-81ED-4DB2-BD59-A6C34878D82A}">
+                    <a16:rowId xmlns:a16="http://schemas.microsoft.com/office/drawing/2014/main" val="968978206"/>
+                  </a:ext>
+                </a:extLst>
+              </a:tr>
+              <a:tr h="539843">
+                <a:tc>
+                  <a:txBody>
+                    <a:bodyPr/>
+                    <a:lstStyle/>
+                    <a:p>
+                      <a:pPr marL="0" marR="0" lvl="0" indent="0" algn="ctr" defTabSz="914400" rtl="0" eaLnBrk="1" fontAlgn="auto" latinLnBrk="0" hangingPunct="1">
+                        <a:lnSpc>
+                          <a:spcPct val="100000"/>
+                        </a:lnSpc>
+                        <a:spcBef>
+                          <a:spcPts val="0"/>
+                        </a:spcBef>
+                        <a:spcAft>
+                          <a:spcPts val="0"/>
+                        </a:spcAft>
+                        <a:buClr>
+                          <a:srgbClr val="000000"/>
+                        </a:buClr>
+                        <a:buSzTx/>
+                        <a:buFont typeface="Arial"/>
+                        <a:buNone/>
+                        <a:tabLst/>
+                        <a:defRPr/>
+                      </a:pPr>
+                      <a:r>
+                        <a:rPr lang="en-US" sz="1500" b="0" i="0" u="none" strike="noStrike" cap="none" dirty="0" smtClean="0">
+                          <a:solidFill>
+                            <a:schemeClr val="dk2"/>
+                          </a:solidFill>
+                          <a:latin typeface="Segoe UI" panose="020B0502040204020203" pitchFamily="34" charset="0"/>
+                          <a:ea typeface="Red Hat Text"/>
+                          <a:cs typeface="Segoe UI" panose="020B0502040204020203" pitchFamily="34" charset="0"/>
+                          <a:sym typeface="Red Hat Text"/>
+                        </a:rPr>
+                        <a:t>Query</a:t>
+                      </a:r>
+                    </a:p>
+                  </a:txBody>
+                  <a:tcPr marL="121900" marR="121900" marT="91433" marB="91433" anchor="ctr"/>
+                </a:tc>
+                <a:tc>
+                  <a:txBody>
+                    <a:bodyPr/>
+                    <a:lstStyle/>
+                    <a:p>
+                      <a:pPr marL="0" marR="0" lvl="0" indent="0" algn="ctr" defTabSz="914400" rtl="0" eaLnBrk="1" fontAlgn="auto" latinLnBrk="0" hangingPunct="1">
+                        <a:lnSpc>
+                          <a:spcPct val="100000"/>
+                        </a:lnSpc>
+                        <a:spcBef>
+                          <a:spcPts val="0"/>
+                        </a:spcBef>
+                        <a:spcAft>
+                          <a:spcPts val="0"/>
+                        </a:spcAft>
+                        <a:buClr>
+                          <a:srgbClr val="000000"/>
+                        </a:buClr>
+                        <a:buSzTx/>
+                        <a:buFont typeface="Arial"/>
+                        <a:buNone/>
+                        <a:tabLst/>
+                        <a:defRPr/>
+                      </a:pPr>
+                      <a:r>
+                        <a:rPr lang="en-US" sz="1400" b="0" i="0" u="none" strike="noStrike" cap="none" dirty="0" smtClean="0">
+                          <a:solidFill>
+                            <a:schemeClr val="tx1"/>
+                          </a:solidFill>
+                          <a:latin typeface="Segoe UI" panose="020B0502040204020203" pitchFamily="34" charset="0"/>
+                          <a:ea typeface="Red Hat Text"/>
+                          <a:cs typeface="Segoe UI" panose="020B0502040204020203" pitchFamily="34" charset="0"/>
+                          <a:sym typeface="Red Hat Text"/>
+                        </a:rPr>
+                        <a:t>O( | V | + | E | )</a:t>
+                      </a:r>
+                    </a:p>
+                  </a:txBody>
+                  <a:tcPr marL="121900" marR="121900" marT="91433" marB="91433" anchor="ctr">
+                    <a:solidFill>
+                      <a:schemeClr val="bg1"/>
+                    </a:solidFill>
+                  </a:tcPr>
+                </a:tc>
+                <a:tc>
+                  <a:txBody>
+                    <a:bodyPr/>
+                    <a:lstStyle/>
+                    <a:p>
+                      <a:pPr marL="0" marR="0" lvl="0" indent="0" algn="ctr" rtl="0" eaLnBrk="1" hangingPunct="1">
+                        <a:lnSpc>
+                          <a:spcPct val="100000"/>
+                        </a:lnSpc>
+                        <a:spcBef>
+                          <a:spcPts val="0"/>
+                        </a:spcBef>
+                        <a:spcAft>
+                          <a:spcPts val="0"/>
+                        </a:spcAft>
+                        <a:buClr>
+                          <a:srgbClr val="000000"/>
+                        </a:buClr>
+                        <a:buFont typeface="Arial"/>
+                        <a:buNone/>
+                      </a:pPr>
+                      <a:r>
+                        <a:rPr lang="en-US" sz="1400" b="0" i="0" u="none" strike="noStrike" cap="none" dirty="0" smtClean="0">
+                          <a:solidFill>
+                            <a:schemeClr val="tx1"/>
+                          </a:solidFill>
+                          <a:latin typeface="Segoe UI" panose="020B0502040204020203" pitchFamily="34" charset="0"/>
+                          <a:ea typeface="Red Hat Text"/>
+                          <a:cs typeface="Segoe UI" panose="020B0502040204020203" pitchFamily="34" charset="0"/>
+                          <a:sym typeface="Red Hat Text"/>
+                        </a:rPr>
+                        <a:t>O(1)</a:t>
+                      </a:r>
+                      <a:endParaRPr sz="1400" b="0" i="0" u="none" strike="noStrike" cap="none" dirty="0">
+                        <a:solidFill>
+                          <a:schemeClr val="tx1"/>
+                        </a:solidFill>
+                        <a:latin typeface="Segoe UI" panose="020B0502040204020203" pitchFamily="34" charset="0"/>
+                        <a:ea typeface="Red Hat Text"/>
+                        <a:cs typeface="Segoe UI" panose="020B0502040204020203" pitchFamily="34" charset="0"/>
+                        <a:sym typeface="Red Hat Text"/>
+                      </a:endParaRPr>
+                    </a:p>
+                  </a:txBody>
+                  <a:tcPr marL="121900" marR="121900" marT="91433" marB="91433" anchor="ctr">
+                    <a:solidFill>
+                      <a:schemeClr val="bg1"/>
+                    </a:solidFill>
+                  </a:tcPr>
+                </a:tc>
+                <a:extLst>
+                  <a:ext uri="{0D108BD9-81ED-4DB2-BD59-A6C34878D82A}">
+                    <a16:rowId xmlns:a16="http://schemas.microsoft.com/office/drawing/2014/main" val="2927654351"/>
+                  </a:ext>
+                </a:extLst>
+              </a:tr>
+              <a:tr h="539843">
+                <a:tc>
+                  <a:txBody>
+                    <a:bodyPr/>
+                    <a:lstStyle/>
+                    <a:p>
+                      <a:pPr marL="0" marR="0" lvl="0" indent="0" algn="ctr" defTabSz="914400" rtl="0" eaLnBrk="1" fontAlgn="auto" latinLnBrk="0" hangingPunct="1">
+                        <a:lnSpc>
+                          <a:spcPct val="100000"/>
+                        </a:lnSpc>
+                        <a:spcBef>
+                          <a:spcPts val="0"/>
+                        </a:spcBef>
+                        <a:spcAft>
+                          <a:spcPts val="0"/>
+                        </a:spcAft>
+                        <a:buClr>
+                          <a:srgbClr val="000000"/>
+                        </a:buClr>
+                        <a:buSzTx/>
+                        <a:buFont typeface="Arial"/>
+                        <a:buNone/>
+                        <a:tabLst/>
+                        <a:defRPr/>
+                      </a:pPr>
+                      <a:r>
+                        <a:rPr lang="en-US" sz="1500" b="0" i="0" u="none" strike="noStrike" cap="none" dirty="0" smtClean="0">
+                          <a:solidFill>
+                            <a:schemeClr val="dk2"/>
+                          </a:solidFill>
+                          <a:latin typeface="Segoe UI" panose="020B0502040204020203" pitchFamily="34" charset="0"/>
+                          <a:ea typeface="Red Hat Text"/>
+                          <a:cs typeface="Segoe UI" panose="020B0502040204020203" pitchFamily="34" charset="0"/>
+                          <a:sym typeface="Red Hat Text"/>
+                        </a:rPr>
+                        <a:t>Storage</a:t>
+                      </a:r>
+                    </a:p>
+                  </a:txBody>
+                  <a:tcPr marL="121900" marR="121900" marT="91433" marB="91433" anchor="ctr"/>
+                </a:tc>
+                <a:tc>
+                  <a:txBody>
+                    <a:bodyPr/>
+                    <a:lstStyle/>
+                    <a:p>
+                      <a:pPr marL="0" marR="0" lvl="0" indent="0" algn="ctr" defTabSz="914400" rtl="0" eaLnBrk="1" fontAlgn="auto" latinLnBrk="0" hangingPunct="1">
+                        <a:lnSpc>
+                          <a:spcPct val="100000"/>
+                        </a:lnSpc>
+                        <a:spcBef>
+                          <a:spcPts val="0"/>
+                        </a:spcBef>
+                        <a:spcAft>
+                          <a:spcPts val="0"/>
+                        </a:spcAft>
+                        <a:buClr>
+                          <a:srgbClr val="000000"/>
+                        </a:buClr>
+                        <a:buSzTx/>
+                        <a:buFont typeface="Arial"/>
+                        <a:buNone/>
+                        <a:tabLst/>
+                        <a:defRPr/>
+                      </a:pPr>
+                      <a:r>
+                        <a:rPr lang="en-US" sz="1400" b="0" i="0" u="none" strike="noStrike" cap="none" dirty="0" smtClean="0">
+                          <a:solidFill>
+                            <a:schemeClr val="tx1"/>
+                          </a:solidFill>
+                          <a:latin typeface="Segoe UI" panose="020B0502040204020203" pitchFamily="34" charset="0"/>
+                          <a:ea typeface="Red Hat Text"/>
+                          <a:cs typeface="Segoe UI" panose="020B0502040204020203" pitchFamily="34" charset="0"/>
+                          <a:sym typeface="Red Hat Text"/>
+                        </a:rPr>
+                        <a:t>O( | V | + | E | )</a:t>
+                      </a:r>
+                    </a:p>
+                  </a:txBody>
+                  <a:tcPr marL="121900" marR="121900" marT="91433" marB="91433" anchor="ctr">
+                    <a:solidFill>
+                      <a:schemeClr val="bg1"/>
+                    </a:solidFill>
+                  </a:tcPr>
+                </a:tc>
+                <a:tc>
+                  <a:txBody>
+                    <a:bodyPr/>
+                    <a:lstStyle/>
+                    <a:p>
+                      <a:pPr marL="0" marR="0" lvl="0" indent="0" algn="ctr" defTabSz="914400" rtl="0" eaLnBrk="1" fontAlgn="auto" latinLnBrk="0" hangingPunct="1">
+                        <a:lnSpc>
+                          <a:spcPct val="100000"/>
+                        </a:lnSpc>
+                        <a:spcBef>
+                          <a:spcPts val="0"/>
+                        </a:spcBef>
+                        <a:spcAft>
+                          <a:spcPts val="0"/>
+                        </a:spcAft>
+                        <a:buClr>
+                          <a:srgbClr val="000000"/>
+                        </a:buClr>
+                        <a:buSzTx/>
+                        <a:buFont typeface="Arial"/>
+                        <a:buNone/>
+                        <a:tabLst/>
+                        <a:defRPr/>
+                      </a:pPr>
+                      <a:r>
+                        <a:rPr lang="en-US" sz="1400" b="0" i="0" u="none" strike="noStrike" cap="none" dirty="0" smtClean="0">
+                          <a:solidFill>
+                            <a:schemeClr val="tx1"/>
+                          </a:solidFill>
+                          <a:latin typeface="Segoe UI" panose="020B0502040204020203" pitchFamily="34" charset="0"/>
+                          <a:ea typeface="Red Hat Text"/>
+                          <a:cs typeface="Segoe UI" panose="020B0502040204020203" pitchFamily="34" charset="0"/>
+                          <a:sym typeface="Red Hat Text"/>
+                        </a:rPr>
+                        <a:t>O( | V^2 | )</a:t>
+                      </a:r>
+                    </a:p>
+                  </a:txBody>
+                  <a:tcPr marL="121900" marR="121900" marT="91433" marB="91433" anchor="ctr">
+                    <a:solidFill>
+                      <a:schemeClr val="bg1"/>
+                    </a:solidFill>
+                  </a:tcPr>
+                </a:tc>
+                <a:extLst>
+                  <a:ext uri="{0D108BD9-81ED-4DB2-BD59-A6C34878D82A}">
+                    <a16:rowId xmlns:a16="http://schemas.microsoft.com/office/drawing/2014/main" val="4121232644"/>
+                  </a:ext>
+                </a:extLst>
+              </a:tr>
+            </a:tbl>
+          </a:graphicData>
+        </a:graphic>
+      </p:graphicFrame>
+      <p:graphicFrame>
+        <p:nvGraphicFramePr>
+          <p:cNvPr id="7" name="Table 6"/>
+          <p:cNvGraphicFramePr>
+            <a:graphicFrameLocks noGrp="1"/>
+          </p:cNvGraphicFramePr>
+          <p:nvPr>
+            <p:extLst>
+              <p:ext uri="{D42A27DB-BD31-4B8C-83A1-F6EECF244321}">
+                <p14:modId xmlns:p14="http://schemas.microsoft.com/office/powerpoint/2010/main" val="890248590"/>
+              </p:ext>
+            </p:extLst>
+          </p:nvPr>
+        </p:nvGraphicFramePr>
+        <p:xfrm>
+          <a:off x="6425998" y="2291495"/>
+          <a:ext cx="5039170" cy="2359818"/>
+        </p:xfrm>
+        <a:graphic>
+          <a:graphicData uri="http://schemas.openxmlformats.org/drawingml/2006/table">
+            <a:tbl>
+              <a:tblPr>
+                <a:tableStyleId>{775DCB02-9BB8-47FD-8907-85C794F793BA}</a:tableStyleId>
+              </a:tblPr>
+              <a:tblGrid>
+                <a:gridCol w="2519585">
+                  <a:extLst>
+                    <a:ext uri="{9D8B030D-6E8A-4147-A177-3AD203B41FA5}">
+                      <a16:colId xmlns:a16="http://schemas.microsoft.com/office/drawing/2014/main" val="64851094"/>
+                    </a:ext>
+                  </a:extLst>
+                </a:gridCol>
+                <a:gridCol w="2519585">
+                  <a:extLst>
+                    <a:ext uri="{9D8B030D-6E8A-4147-A177-3AD203B41FA5}">
+                      <a16:colId xmlns:a16="http://schemas.microsoft.com/office/drawing/2014/main" val="1353966151"/>
+                    </a:ext>
+                  </a:extLst>
+                </a:gridCol>
+              </a:tblGrid>
+              <a:tr h="539843">
+                <a:tc>
+                  <a:txBody>
+                    <a:bodyPr/>
+                    <a:lstStyle/>
+                    <a:p>
+                      <a:pPr marL="0" marR="0" lvl="0" indent="0" algn="ctr" rtl="0" eaLnBrk="1" hangingPunct="1">
+                        <a:lnSpc>
+                          <a:spcPct val="100000"/>
+                        </a:lnSpc>
+                        <a:spcBef>
+                          <a:spcPts val="0"/>
+                        </a:spcBef>
+                        <a:spcAft>
+                          <a:spcPts val="0"/>
+                        </a:spcAft>
+                        <a:buClr>
+                          <a:srgbClr val="000000"/>
+                        </a:buClr>
+                        <a:buFont typeface="Arial"/>
+                        <a:buNone/>
+                      </a:pPr>
+                      <a:r>
+                        <a:rPr lang="en-US" sz="1500" b="0" i="0" u="none" strike="noStrike" cap="none" dirty="0" smtClean="0">
+                          <a:solidFill>
+                            <a:schemeClr val="dk2"/>
+                          </a:solidFill>
+                          <a:latin typeface="Segoe UI" panose="020B0502040204020203" pitchFamily="34" charset="0"/>
+                          <a:ea typeface="Red Hat Text"/>
+                          <a:cs typeface="Segoe UI" panose="020B0502040204020203" pitchFamily="34" charset="0"/>
+                          <a:sym typeface="Red Hat Text"/>
+                        </a:rPr>
+                        <a:t>List</a:t>
+                      </a:r>
+                      <a:endParaRPr sz="1500" b="0" i="0" u="none" strike="noStrike" cap="none" dirty="0">
+                        <a:solidFill>
+                          <a:schemeClr val="dk2"/>
+                        </a:solidFill>
+                        <a:latin typeface="Segoe UI" panose="020B0502040204020203" pitchFamily="34" charset="0"/>
+                        <a:ea typeface="Red Hat Text"/>
+                        <a:cs typeface="Segoe UI" panose="020B0502040204020203" pitchFamily="34" charset="0"/>
+                        <a:sym typeface="Red Hat Text"/>
+                      </a:endParaRPr>
+                    </a:p>
+                  </a:txBody>
+                  <a:tcPr marL="121900" marR="121900" marT="91433" marB="91433" anchor="ctr"/>
+                </a:tc>
+                <a:tc>
+                  <a:txBody>
+                    <a:bodyPr/>
+                    <a:lstStyle/>
+                    <a:p>
+                      <a:pPr marL="0" marR="0" lvl="0" indent="0" algn="ctr" rtl="0" eaLnBrk="1" hangingPunct="1">
+                        <a:lnSpc>
+                          <a:spcPct val="100000"/>
+                        </a:lnSpc>
+                        <a:spcBef>
+                          <a:spcPts val="0"/>
+                        </a:spcBef>
+                        <a:spcAft>
+                          <a:spcPts val="0"/>
+                        </a:spcAft>
+                        <a:buClr>
+                          <a:srgbClr val="000000"/>
+                        </a:buClr>
+                        <a:buFont typeface="Arial"/>
+                        <a:buNone/>
+                      </a:pPr>
+                      <a:r>
+                        <a:rPr lang="en-US" sz="1500" b="0" i="0" u="none" strike="noStrike" cap="none" dirty="0" smtClean="0">
+                          <a:solidFill>
+                            <a:schemeClr val="dk2"/>
+                          </a:solidFill>
+                          <a:latin typeface="Segoe UI" panose="020B0502040204020203" pitchFamily="34" charset="0"/>
+                          <a:ea typeface="Red Hat Text"/>
+                          <a:cs typeface="Segoe UI" panose="020B0502040204020203" pitchFamily="34" charset="0"/>
+                          <a:sym typeface="Red Hat Text"/>
+                        </a:rPr>
+                        <a:t>Matric</a:t>
+                      </a:r>
+                      <a:endParaRPr sz="1500" b="0" i="0" u="none" strike="noStrike" cap="none" dirty="0">
+                        <a:solidFill>
+                          <a:schemeClr val="dk2"/>
+                        </a:solidFill>
+                        <a:latin typeface="Segoe UI" panose="020B0502040204020203" pitchFamily="34" charset="0"/>
+                        <a:ea typeface="Red Hat Text"/>
+                        <a:cs typeface="Segoe UI" panose="020B0502040204020203" pitchFamily="34" charset="0"/>
+                        <a:sym typeface="Red Hat Text"/>
+                      </a:endParaRPr>
+                    </a:p>
+                  </a:txBody>
+                  <a:tcPr marL="121900" marR="121900" marT="91433" marB="91433" anchor="ctr"/>
+                </a:tc>
+                <a:extLst>
+                  <a:ext uri="{0D108BD9-81ED-4DB2-BD59-A6C34878D82A}">
+                    <a16:rowId xmlns:a16="http://schemas.microsoft.com/office/drawing/2014/main" val="1308435311"/>
+                  </a:ext>
+                </a:extLst>
+              </a:tr>
+              <a:tr h="539843">
+                <a:tc>
+                  <a:txBody>
+                    <a:bodyPr/>
+                    <a:lstStyle/>
+                    <a:p>
+                      <a:pPr marL="0" marR="0" lvl="0" indent="0" algn="ctr" rtl="0" eaLnBrk="1" hangingPunct="1">
+                        <a:lnSpc>
+                          <a:spcPct val="100000"/>
+                        </a:lnSpc>
+                        <a:spcBef>
+                          <a:spcPts val="0"/>
+                        </a:spcBef>
+                        <a:spcAft>
+                          <a:spcPts val="0"/>
+                        </a:spcAft>
+                        <a:buClr>
+                          <a:srgbClr val="000000"/>
+                        </a:buClr>
+                        <a:buFont typeface="Arial"/>
+                        <a:buNone/>
+                      </a:pPr>
+                      <a:r>
+                        <a:rPr lang="en-US" sz="1500" b="0" i="0" u="none" strike="noStrike" cap="none" dirty="0" smtClean="0">
+                          <a:solidFill>
+                            <a:schemeClr val="bg1"/>
+                          </a:solidFill>
+                          <a:latin typeface="Segoe UI" panose="020B0502040204020203" pitchFamily="34" charset="0"/>
+                          <a:ea typeface="Red Hat Text"/>
+                          <a:cs typeface="Segoe UI" panose="020B0502040204020203" pitchFamily="34" charset="0"/>
+                          <a:sym typeface="Red Hat Text"/>
+                        </a:rPr>
+                        <a:t>Can take up less space</a:t>
+                      </a:r>
+                      <a:endParaRPr sz="1500" b="0" i="0" u="none" strike="noStrike" cap="none" dirty="0">
+                        <a:solidFill>
+                          <a:schemeClr val="bg1"/>
+                        </a:solidFill>
+                        <a:latin typeface="Segoe UI" panose="020B0502040204020203" pitchFamily="34" charset="0"/>
+                        <a:ea typeface="Red Hat Text"/>
+                        <a:cs typeface="Segoe UI" panose="020B0502040204020203" pitchFamily="34" charset="0"/>
+                        <a:sym typeface="Red Hat Text"/>
+                      </a:endParaRPr>
+                    </a:p>
+                  </a:txBody>
+                  <a:tcPr marL="121900" marR="121900" marT="91433" marB="91433" anchor="ctr">
+                    <a:solidFill>
+                      <a:schemeClr val="accent3">
+                        <a:lumMod val="75000"/>
+                      </a:schemeClr>
+                    </a:solidFill>
+                  </a:tcPr>
+                </a:tc>
+                <a:tc>
+                  <a:txBody>
+                    <a:bodyPr/>
+                    <a:lstStyle/>
+                    <a:p>
+                      <a:pPr marL="0" marR="0" lvl="0" indent="0" algn="ctr" rtl="0" eaLnBrk="1" hangingPunct="1">
+                        <a:lnSpc>
+                          <a:spcPct val="100000"/>
+                        </a:lnSpc>
+                        <a:spcBef>
+                          <a:spcPts val="0"/>
+                        </a:spcBef>
+                        <a:spcAft>
+                          <a:spcPts val="0"/>
+                        </a:spcAft>
+                        <a:buClr>
+                          <a:srgbClr val="000000"/>
+                        </a:buClr>
+                        <a:buFont typeface="Arial"/>
+                        <a:buNone/>
+                      </a:pPr>
+                      <a:r>
+                        <a:rPr lang="en-US" sz="1500" b="0" i="0" u="none" strike="noStrike" cap="none" dirty="0" smtClean="0">
+                          <a:solidFill>
+                            <a:schemeClr val="bg1"/>
+                          </a:solidFill>
+                          <a:latin typeface="Segoe UI" panose="020B0502040204020203" pitchFamily="34" charset="0"/>
+                          <a:ea typeface="Red Hat Text"/>
+                          <a:cs typeface="Segoe UI" panose="020B0502040204020203" pitchFamily="34" charset="0"/>
+                          <a:sym typeface="Red Hat Text"/>
+                        </a:rPr>
+                        <a:t>Takes up more space</a:t>
+                      </a:r>
+                      <a:endParaRPr sz="1500" b="0" i="0" u="none" strike="noStrike" cap="none" dirty="0">
+                        <a:solidFill>
+                          <a:schemeClr val="bg1"/>
+                        </a:solidFill>
+                        <a:latin typeface="Segoe UI" panose="020B0502040204020203" pitchFamily="34" charset="0"/>
+                        <a:ea typeface="Red Hat Text"/>
+                        <a:cs typeface="Segoe UI" panose="020B0502040204020203" pitchFamily="34" charset="0"/>
+                        <a:sym typeface="Red Hat Text"/>
+                      </a:endParaRPr>
+                    </a:p>
+                  </a:txBody>
+                  <a:tcPr marL="121900" marR="121900" marT="91433" marB="91433" anchor="ctr">
+                    <a:solidFill>
+                      <a:schemeClr val="accent6">
+                        <a:lumMod val="60000"/>
+                        <a:lumOff val="40000"/>
+                      </a:schemeClr>
+                    </a:solidFill>
+                  </a:tcPr>
+                </a:tc>
+                <a:extLst>
+                  <a:ext uri="{0D108BD9-81ED-4DB2-BD59-A6C34878D82A}">
+                    <a16:rowId xmlns:a16="http://schemas.microsoft.com/office/drawing/2014/main" val="6178432"/>
+                  </a:ext>
+                </a:extLst>
+              </a:tr>
+              <a:tr h="539843">
+                <a:tc>
+                  <a:txBody>
+                    <a:bodyPr/>
+                    <a:lstStyle/>
+                    <a:p>
+                      <a:pPr marL="0" marR="0" lvl="0" indent="0" algn="ctr" rtl="0" eaLnBrk="1" hangingPunct="1">
+                        <a:lnSpc>
+                          <a:spcPct val="100000"/>
+                        </a:lnSpc>
+                        <a:spcBef>
+                          <a:spcPts val="0"/>
+                        </a:spcBef>
+                        <a:spcAft>
+                          <a:spcPts val="0"/>
+                        </a:spcAft>
+                        <a:buClr>
+                          <a:srgbClr val="000000"/>
+                        </a:buClr>
+                        <a:buFont typeface="Arial"/>
+                        <a:buNone/>
+                      </a:pPr>
+                      <a:r>
+                        <a:rPr lang="en-US" sz="1500" b="0" i="0" u="none" strike="noStrike" cap="none" dirty="0" smtClean="0">
+                          <a:solidFill>
+                            <a:schemeClr val="bg1"/>
+                          </a:solidFill>
+                          <a:latin typeface="Segoe UI" panose="020B0502040204020203" pitchFamily="34" charset="0"/>
+                          <a:ea typeface="Red Hat Text"/>
+                          <a:cs typeface="Segoe UI" panose="020B0502040204020203" pitchFamily="34" charset="0"/>
+                          <a:sym typeface="Red Hat Text"/>
+                        </a:rPr>
+                        <a:t>Faster to iterate over edges</a:t>
+                      </a:r>
+                      <a:endParaRPr sz="1500" b="0" i="0" u="none" strike="noStrike" cap="none" dirty="0">
+                        <a:solidFill>
+                          <a:schemeClr val="bg1"/>
+                        </a:solidFill>
+                        <a:latin typeface="Segoe UI" panose="020B0502040204020203" pitchFamily="34" charset="0"/>
+                        <a:ea typeface="Red Hat Text"/>
+                        <a:cs typeface="Segoe UI" panose="020B0502040204020203" pitchFamily="34" charset="0"/>
+                        <a:sym typeface="Red Hat Text"/>
+                      </a:endParaRPr>
+                    </a:p>
+                  </a:txBody>
+                  <a:tcPr marL="121900" marR="121900" marT="91433" marB="91433" anchor="ctr">
+                    <a:solidFill>
+                      <a:schemeClr val="accent3">
+                        <a:lumMod val="75000"/>
+                      </a:schemeClr>
+                    </a:solidFill>
+                  </a:tcPr>
+                </a:tc>
+                <a:tc>
+                  <a:txBody>
+                    <a:bodyPr/>
+                    <a:lstStyle/>
+                    <a:p>
+                      <a:pPr marL="0" marR="0" lvl="0" indent="0" algn="ctr" defTabSz="914400" rtl="0" eaLnBrk="1" fontAlgn="auto" latinLnBrk="0" hangingPunct="1">
+                        <a:lnSpc>
+                          <a:spcPct val="100000"/>
+                        </a:lnSpc>
+                        <a:spcBef>
+                          <a:spcPts val="0"/>
+                        </a:spcBef>
+                        <a:spcAft>
+                          <a:spcPts val="0"/>
+                        </a:spcAft>
+                        <a:buClr>
+                          <a:srgbClr val="000000"/>
+                        </a:buClr>
+                        <a:buSzTx/>
+                        <a:buFont typeface="Arial"/>
+                        <a:buNone/>
+                        <a:tabLst/>
+                        <a:defRPr/>
+                      </a:pPr>
+                      <a:r>
+                        <a:rPr lang="en-US" sz="1500" b="0" i="0" u="none" strike="noStrike" cap="none" dirty="0" smtClean="0">
+                          <a:solidFill>
+                            <a:schemeClr val="bg1"/>
+                          </a:solidFill>
+                          <a:latin typeface="Segoe UI" panose="020B0502040204020203" pitchFamily="34" charset="0"/>
+                          <a:ea typeface="Red Hat Text"/>
+                          <a:cs typeface="Segoe UI" panose="020B0502040204020203" pitchFamily="34" charset="0"/>
+                          <a:sym typeface="Red Hat Text"/>
+                        </a:rPr>
+                        <a:t>Slow to iterate over al edges</a:t>
+                      </a:r>
+                      <a:endParaRPr lang="en-US" sz="1500" b="0" i="0" u="none" strike="noStrike" cap="none" dirty="0" smtClean="0">
+                        <a:solidFill>
+                          <a:schemeClr val="bg1"/>
+                        </a:solidFill>
+                        <a:latin typeface="Segoe UI" panose="020B0502040204020203" pitchFamily="34" charset="0"/>
+                        <a:ea typeface="Red Hat Text"/>
+                        <a:cs typeface="Segoe UI" panose="020B0502040204020203" pitchFamily="34" charset="0"/>
+                        <a:sym typeface="Red Hat Text"/>
+                      </a:endParaRPr>
+                    </a:p>
+                  </a:txBody>
+                  <a:tcPr marL="121900" marR="121900" marT="91433" marB="91433" anchor="ctr">
+                    <a:solidFill>
+                      <a:schemeClr val="accent6">
+                        <a:lumMod val="60000"/>
+                        <a:lumOff val="40000"/>
+                      </a:schemeClr>
+                    </a:solidFill>
+                  </a:tcPr>
+                </a:tc>
+                <a:extLst>
+                  <a:ext uri="{0D108BD9-81ED-4DB2-BD59-A6C34878D82A}">
+                    <a16:rowId xmlns:a16="http://schemas.microsoft.com/office/drawing/2014/main" val="1420133012"/>
+                  </a:ext>
+                </a:extLst>
+              </a:tr>
+              <a:tr h="539843">
+                <a:tc>
+                  <a:txBody>
+                    <a:bodyPr/>
+                    <a:lstStyle/>
+                    <a:p>
+                      <a:pPr marL="0" marR="0" lvl="0" indent="0" algn="ctr" rtl="0" eaLnBrk="1" hangingPunct="1">
+                        <a:lnSpc>
+                          <a:spcPct val="100000"/>
+                        </a:lnSpc>
+                        <a:spcBef>
+                          <a:spcPts val="0"/>
+                        </a:spcBef>
+                        <a:spcAft>
+                          <a:spcPts val="0"/>
+                        </a:spcAft>
+                        <a:buClr>
+                          <a:srgbClr val="000000"/>
+                        </a:buClr>
+                        <a:buFont typeface="Arial"/>
+                        <a:buNone/>
+                      </a:pPr>
+                      <a:r>
+                        <a:rPr lang="en-US" sz="1500" b="0" i="0" u="none" strike="noStrike" cap="none" dirty="0" smtClean="0">
+                          <a:solidFill>
+                            <a:schemeClr val="bg1"/>
+                          </a:solidFill>
+                          <a:latin typeface="Segoe UI" panose="020B0502040204020203" pitchFamily="34" charset="0"/>
+                          <a:ea typeface="Red Hat Text"/>
+                          <a:cs typeface="Segoe UI" panose="020B0502040204020203" pitchFamily="34" charset="0"/>
+                          <a:sym typeface="Red Hat Text"/>
+                        </a:rPr>
+                        <a:t>Slow to lookup specific edge</a:t>
+                      </a:r>
+                      <a:endParaRPr sz="1500" b="0" i="0" u="none" strike="noStrike" cap="none" dirty="0">
+                        <a:solidFill>
+                          <a:schemeClr val="bg1"/>
+                        </a:solidFill>
+                        <a:latin typeface="Segoe UI" panose="020B0502040204020203" pitchFamily="34" charset="0"/>
+                        <a:ea typeface="Red Hat Text"/>
+                        <a:cs typeface="Segoe UI" panose="020B0502040204020203" pitchFamily="34" charset="0"/>
+                        <a:sym typeface="Red Hat Text"/>
+                      </a:endParaRPr>
+                    </a:p>
+                  </a:txBody>
+                  <a:tcPr marL="121900" marR="121900" marT="91433" marB="91433" anchor="ctr">
+                    <a:solidFill>
+                      <a:schemeClr val="accent6">
+                        <a:lumMod val="60000"/>
+                        <a:lumOff val="40000"/>
+                      </a:schemeClr>
+                    </a:solidFill>
+                  </a:tcPr>
+                </a:tc>
+                <a:tc>
+                  <a:txBody>
+                    <a:bodyPr/>
+                    <a:lstStyle/>
+                    <a:p>
+                      <a:pPr marL="0" marR="0" lvl="0" indent="0" algn="ctr" defTabSz="914400" rtl="0" eaLnBrk="1" fontAlgn="auto" latinLnBrk="0" hangingPunct="1">
+                        <a:lnSpc>
+                          <a:spcPct val="100000"/>
+                        </a:lnSpc>
+                        <a:spcBef>
+                          <a:spcPts val="0"/>
+                        </a:spcBef>
+                        <a:spcAft>
+                          <a:spcPts val="0"/>
+                        </a:spcAft>
+                        <a:buClr>
+                          <a:srgbClr val="000000"/>
+                        </a:buClr>
+                        <a:buSzTx/>
+                        <a:buFont typeface="Arial"/>
+                        <a:buNone/>
+                        <a:tabLst/>
+                        <a:defRPr/>
+                      </a:pPr>
+                      <a:r>
+                        <a:rPr lang="en-US" sz="1500" b="0" i="0" u="none" strike="noStrike" cap="none" dirty="0" smtClean="0">
+                          <a:solidFill>
+                            <a:schemeClr val="bg1"/>
+                          </a:solidFill>
+                          <a:latin typeface="Segoe UI" panose="020B0502040204020203" pitchFamily="34" charset="0"/>
+                          <a:ea typeface="Red Hat Text"/>
+                          <a:cs typeface="Segoe UI" panose="020B0502040204020203" pitchFamily="34" charset="0"/>
+                          <a:sym typeface="Red Hat Text"/>
+                        </a:rPr>
+                        <a:t>Fast to lookup specific edge</a:t>
+                      </a:r>
+                      <a:endParaRPr lang="en-US" sz="1500" b="0" i="0" u="none" strike="noStrike" cap="none" dirty="0" smtClean="0">
+                        <a:solidFill>
+                          <a:schemeClr val="bg1"/>
+                        </a:solidFill>
+                        <a:latin typeface="Segoe UI" panose="020B0502040204020203" pitchFamily="34" charset="0"/>
+                        <a:ea typeface="Red Hat Text"/>
+                        <a:cs typeface="Segoe UI" panose="020B0502040204020203" pitchFamily="34" charset="0"/>
+                        <a:sym typeface="Red Hat Text"/>
+                      </a:endParaRPr>
+                    </a:p>
+                  </a:txBody>
+                  <a:tcPr marL="121900" marR="121900" marT="91433" marB="91433" anchor="ctr">
+                    <a:solidFill>
+                      <a:schemeClr val="accent3">
+                        <a:lumMod val="75000"/>
+                      </a:schemeClr>
+                    </a:solidFill>
+                  </a:tcPr>
+                </a:tc>
+                <a:extLst>
+                  <a:ext uri="{0D108BD9-81ED-4DB2-BD59-A6C34878D82A}">
+                    <a16:rowId xmlns:a16="http://schemas.microsoft.com/office/drawing/2014/main" val="742927673"/>
+                  </a:ext>
+                </a:extLst>
+              </a:tr>
+            </a:tbl>
+          </a:graphicData>
+        </a:graphic>
+      </p:graphicFrame>
     </p:spTree>
     <p:extLst>
       <p:ext uri="{BB962C8B-B14F-4D97-AF65-F5344CB8AC3E}">
@@ -22126,7 +23837,12 @@
             <p:ph type="title"/>
           </p:nvPr>
         </p:nvSpPr>
-        <p:spPr/>
+        <p:spPr>
+          <a:xfrm>
+            <a:off x="0" y="0"/>
+            <a:ext cx="9610000" cy="844400"/>
+          </a:xfrm>
+        </p:spPr>
         <p:txBody>
           <a:bodyPr/>
           <a:lstStyle/>
@@ -22147,7 +23863,7 @@
       </p:sp>
       <p:sp>
         <p:nvSpPr>
-          <p:cNvPr id="3" name="Content Placeholder 2"/>
+          <p:cNvPr id="4" name="Content Placeholder 3"/>
           <p:cNvSpPr>
             <a:spLocks noGrp="1"/>
           </p:cNvSpPr>
@@ -22155,58 +23871,398 @@
             <p:ph idx="1"/>
           </p:nvPr>
         </p:nvSpPr>
-        <p:spPr/>
+        <p:spPr>
+          <a:xfrm>
+            <a:off x="0" y="844400"/>
+            <a:ext cx="9610000" cy="5890508"/>
+          </a:xfrm>
+        </p:spPr>
         <p:txBody>
           <a:bodyPr/>
           <a:lstStyle/>
           <a:p>
-            <a:r>
-              <a:rPr lang="ru-RU" dirty="0">
-                <a:latin typeface="Segoe UI" panose="020B0502040204020203" pitchFamily="34" charset="0"/>
-                <a:cs typeface="Segoe UI" panose="020B0502040204020203" pitchFamily="34" charset="0"/>
-              </a:rPr>
-              <a:t>Задача о семи </a:t>
-            </a:r>
-            <a:r>
-              <a:rPr lang="ru-RU" dirty="0" smtClean="0">
-                <a:latin typeface="Segoe UI" panose="020B0502040204020203" pitchFamily="34" charset="0"/>
-                <a:cs typeface="Segoe UI" panose="020B0502040204020203" pitchFamily="34" charset="0"/>
-              </a:rPr>
-              <a:t>мостах</a:t>
-            </a:r>
-            <a:endParaRPr lang="en-US" dirty="0" smtClean="0">
+            <a:pPr marL="76200" indent="0">
+              <a:buNone/>
+            </a:pPr>
+            <a:r>
+              <a:rPr lang="en-US" sz="1200" dirty="0" smtClean="0">
+                <a:latin typeface="Segoe UI" panose="020B0502040204020203" pitchFamily="34" charset="0"/>
+                <a:cs typeface="Segoe UI" panose="020B0502040204020203" pitchFamily="34" charset="0"/>
+              </a:rPr>
+              <a:t>We do implementation of adjacency list – because in real-world tends to lend itself to sparser and larger graphs</a:t>
+            </a:r>
+          </a:p>
+          <a:p>
+            <a:pPr marL="76200" indent="0">
+              <a:buNone/>
+            </a:pPr>
+            <a:endParaRPr lang="en-US" sz="1200" dirty="0">
               <a:latin typeface="Segoe UI" panose="020B0502040204020203" pitchFamily="34" charset="0"/>
               <a:cs typeface="Segoe UI" panose="020B0502040204020203" pitchFamily="34" charset="0"/>
             </a:endParaRPr>
           </a:p>
           <a:p>
-            <a:endParaRPr lang="en-US" dirty="0">
+            <a:pPr marL="76200" indent="0">
+              <a:buNone/>
+            </a:pPr>
+            <a:r>
+              <a:rPr lang="en-US" sz="1200" dirty="0" smtClean="0">
+                <a:latin typeface="Segoe UI" panose="020B0502040204020203" pitchFamily="34" charset="0"/>
+                <a:cs typeface="Segoe UI" panose="020B0502040204020203" pitchFamily="34" charset="0"/>
+              </a:rPr>
+              <a:t>Class Graph {</a:t>
+            </a:r>
+          </a:p>
+          <a:p>
+            <a:pPr marL="76200" indent="0">
+              <a:buNone/>
+            </a:pPr>
+            <a:r>
+              <a:rPr lang="en-US" sz="1200" dirty="0" smtClean="0">
+                <a:latin typeface="Segoe UI" panose="020B0502040204020203" pitchFamily="34" charset="0"/>
+                <a:cs typeface="Segoe UI" panose="020B0502040204020203" pitchFamily="34" charset="0"/>
+              </a:rPr>
+              <a:t>	constructor() {</a:t>
+            </a:r>
+          </a:p>
+          <a:p>
+            <a:pPr marL="76200" indent="0">
+              <a:buNone/>
+            </a:pPr>
+            <a:r>
+              <a:rPr lang="en-US" sz="1200" dirty="0">
+                <a:latin typeface="Segoe UI" panose="020B0502040204020203" pitchFamily="34" charset="0"/>
+                <a:cs typeface="Segoe UI" panose="020B0502040204020203" pitchFamily="34" charset="0"/>
+              </a:rPr>
+              <a:t>	</a:t>
+            </a:r>
+            <a:r>
+              <a:rPr lang="en-US" sz="1200" dirty="0" smtClean="0">
+                <a:latin typeface="Segoe UI" panose="020B0502040204020203" pitchFamily="34" charset="0"/>
+                <a:cs typeface="Segoe UI" panose="020B0502040204020203" pitchFamily="34" charset="0"/>
+              </a:rPr>
+              <a:t>	this.adjacencyList = {}</a:t>
+            </a:r>
+          </a:p>
+          <a:p>
+            <a:pPr marL="76200" indent="0">
+              <a:buNone/>
+            </a:pPr>
+            <a:r>
+              <a:rPr lang="en-US" sz="1200" dirty="0">
+                <a:latin typeface="Segoe UI" panose="020B0502040204020203" pitchFamily="34" charset="0"/>
+                <a:cs typeface="Segoe UI" panose="020B0502040204020203" pitchFamily="34" charset="0"/>
+              </a:rPr>
+              <a:t>	</a:t>
+            </a:r>
+            <a:r>
+              <a:rPr lang="en-US" sz="1200" dirty="0" smtClean="0">
+                <a:latin typeface="Segoe UI" panose="020B0502040204020203" pitchFamily="34" charset="0"/>
+                <a:cs typeface="Segoe UI" panose="020B0502040204020203" pitchFamily="34" charset="0"/>
+              </a:rPr>
+              <a:t>}</a:t>
+            </a:r>
+            <a:endParaRPr lang="en-US" sz="1200" dirty="0">
               <a:latin typeface="Segoe UI" panose="020B0502040204020203" pitchFamily="34" charset="0"/>
               <a:cs typeface="Segoe UI" panose="020B0502040204020203" pitchFamily="34" charset="0"/>
             </a:endParaRPr>
           </a:p>
           <a:p>
-            <a:r>
-              <a:rPr lang="en-US" dirty="0" smtClean="0">
-                <a:latin typeface="Segoe UI" panose="020B0502040204020203" pitchFamily="34" charset="0"/>
-                <a:cs typeface="Segoe UI" panose="020B0502040204020203" pitchFamily="34" charset="0"/>
-              </a:rPr>
-              <a:t>Dracula for </a:t>
-            </a:r>
-            <a:r>
-              <a:rPr lang="en-US" smtClean="0">
-                <a:latin typeface="Segoe UI" panose="020B0502040204020203" pitchFamily="34" charset="0"/>
-                <a:cs typeface="Segoe UI" panose="020B0502040204020203" pitchFamily="34" charset="0"/>
-              </a:rPr>
-              <a:t>graph visualization</a:t>
-            </a:r>
-            <a:endParaRPr lang="ru-RU" dirty="0">
+            <a:pPr marL="76200" indent="0">
+              <a:buNone/>
+            </a:pPr>
+            <a:r>
+              <a:rPr lang="en-US" sz="1200" dirty="0" smtClean="0">
+                <a:latin typeface="Segoe UI" panose="020B0502040204020203" pitchFamily="34" charset="0"/>
+                <a:cs typeface="Segoe UI" panose="020B0502040204020203" pitchFamily="34" charset="0"/>
+              </a:rPr>
+              <a:t>}</a:t>
+            </a:r>
+          </a:p>
+          <a:p>
+            <a:pPr marL="76200" indent="0">
+              <a:buNone/>
+            </a:pPr>
+            <a:endParaRPr lang="en-US" sz="1200" dirty="0">
               <a:latin typeface="Segoe UI" panose="020B0502040204020203" pitchFamily="34" charset="0"/>
               <a:cs typeface="Segoe UI" panose="020B0502040204020203" pitchFamily="34" charset="0"/>
             </a:endParaRPr>
           </a:p>
           <a:p>
-            <a:endParaRPr lang="en-US" dirty="0">
+            <a:pPr marL="76200" indent="0">
+              <a:buNone/>
+            </a:pPr>
+            <a:r>
+              <a:rPr lang="en-US" sz="1200" dirty="0" smtClean="0">
+                <a:latin typeface="Segoe UI" panose="020B0502040204020203" pitchFamily="34" charset="0"/>
+                <a:cs typeface="Segoe UI" panose="020B0502040204020203" pitchFamily="34" charset="0"/>
+              </a:rPr>
+              <a:t>Adding a vertex</a:t>
+            </a:r>
+          </a:p>
+          <a:p>
+            <a:pPr marL="419100" indent="-342900">
+              <a:buFont typeface="+mj-lt"/>
+              <a:buAutoNum type="arabicPeriod"/>
+            </a:pPr>
+            <a:r>
+              <a:rPr lang="en-US" sz="1200" dirty="0" smtClean="0">
+                <a:latin typeface="Segoe UI" panose="020B0502040204020203" pitchFamily="34" charset="0"/>
+                <a:cs typeface="Segoe UI" panose="020B0502040204020203" pitchFamily="34" charset="0"/>
+              </a:rPr>
+              <a:t>Write a method called addVertex, witch accepts a name of a vertex</a:t>
+            </a:r>
+          </a:p>
+          <a:p>
+            <a:pPr marL="419100" indent="-342900">
+              <a:buFont typeface="+mj-lt"/>
+              <a:buAutoNum type="arabicPeriod"/>
+            </a:pPr>
+            <a:r>
+              <a:rPr lang="en-US" sz="1200" dirty="0" smtClean="0">
+                <a:latin typeface="Segoe UI" panose="020B0502040204020203" pitchFamily="34" charset="0"/>
+                <a:cs typeface="Segoe UI" panose="020B0502040204020203" pitchFamily="34" charset="0"/>
+              </a:rPr>
+              <a:t>It should add a key to the adjacency list with the name of the vertex and set its value to be an empty array</a:t>
+            </a:r>
+          </a:p>
+          <a:p>
+            <a:pPr marL="76200" indent="0">
+              <a:buNone/>
+            </a:pPr>
+            <a:r>
+              <a:rPr lang="en-US" sz="1200" dirty="0" smtClean="0">
+                <a:latin typeface="Segoe UI" panose="020B0502040204020203" pitchFamily="34" charset="0"/>
+                <a:cs typeface="Segoe UI" panose="020B0502040204020203" pitchFamily="34" charset="0"/>
+              </a:rPr>
+              <a:t>Add a edge</a:t>
+            </a:r>
+          </a:p>
+          <a:p>
+            <a:pPr marL="419100" indent="-342900">
+              <a:buFont typeface="+mj-lt"/>
+              <a:buAutoNum type="arabicPeriod"/>
+            </a:pPr>
+            <a:r>
+              <a:rPr lang="en-US" sz="1200" dirty="0" smtClean="0">
+                <a:latin typeface="Segoe UI" panose="020B0502040204020203" pitchFamily="34" charset="0"/>
+                <a:cs typeface="Segoe UI" panose="020B0502040204020203" pitchFamily="34" charset="0"/>
+              </a:rPr>
+              <a:t>Write a method called addEdge, witch accept two vertices(v1, v2)</a:t>
+            </a:r>
+          </a:p>
+          <a:p>
+            <a:pPr marL="419100" indent="-342900">
+              <a:buFont typeface="+mj-lt"/>
+              <a:buAutoNum type="arabicPeriod"/>
+            </a:pPr>
+            <a:r>
+              <a:rPr lang="en-US" sz="1200" dirty="0" smtClean="0">
+                <a:latin typeface="Segoe UI" panose="020B0502040204020203" pitchFamily="34" charset="0"/>
+                <a:cs typeface="Segoe UI" panose="020B0502040204020203" pitchFamily="34" charset="0"/>
+              </a:rPr>
+              <a:t>Find in the </a:t>
+            </a:r>
+            <a:r>
+              <a:rPr lang="en-US" sz="1200" dirty="0">
+                <a:latin typeface="Segoe UI" panose="020B0502040204020203" pitchFamily="34" charset="0"/>
+                <a:cs typeface="Segoe UI" panose="020B0502040204020203" pitchFamily="34" charset="0"/>
+              </a:rPr>
+              <a:t>adjacency list </a:t>
+            </a:r>
+            <a:r>
+              <a:rPr lang="en-US" sz="1200" dirty="0" smtClean="0">
+                <a:latin typeface="Segoe UI" panose="020B0502040204020203" pitchFamily="34" charset="0"/>
+                <a:cs typeface="Segoe UI" panose="020B0502040204020203" pitchFamily="34" charset="0"/>
+              </a:rPr>
+              <a:t>v1 | v2, and push v2 | v1 to v1 | v2</a:t>
+            </a:r>
+          </a:p>
+          <a:p>
+            <a:pPr marL="419100" indent="-342900">
+              <a:buFont typeface="+mj-lt"/>
+              <a:buAutoNum type="arabicPeriod"/>
+            </a:pPr>
+            <a:r>
+              <a:rPr lang="en-US" sz="1200" dirty="0" smtClean="0">
+                <a:latin typeface="Segoe UI" panose="020B0502040204020203" pitchFamily="34" charset="0"/>
+                <a:cs typeface="Segoe UI" panose="020B0502040204020203" pitchFamily="34" charset="0"/>
+              </a:rPr>
+              <a:t>Handle errors / invalid vertices / duplicates</a:t>
+            </a:r>
+          </a:p>
+          <a:p>
+            <a:pPr marL="76200" indent="0">
+              <a:buNone/>
+            </a:pPr>
+            <a:r>
+              <a:rPr lang="en-US" sz="1200" dirty="0" smtClean="0">
+                <a:latin typeface="Segoe UI" panose="020B0502040204020203" pitchFamily="34" charset="0"/>
+                <a:cs typeface="Segoe UI" panose="020B0502040204020203" pitchFamily="34" charset="0"/>
+              </a:rPr>
+              <a:t>Removing an edge</a:t>
+            </a:r>
+          </a:p>
+          <a:p>
+            <a:pPr marL="419100" indent="-342900">
+              <a:buFont typeface="+mj-lt"/>
+              <a:buAutoNum type="arabicPeriod"/>
+            </a:pPr>
+            <a:r>
+              <a:rPr lang="en-US" sz="1200" dirty="0">
+                <a:latin typeface="Segoe UI" panose="020B0502040204020203" pitchFamily="34" charset="0"/>
+                <a:cs typeface="Segoe UI" panose="020B0502040204020203" pitchFamily="34" charset="0"/>
+              </a:rPr>
+              <a:t>Write a method called </a:t>
+            </a:r>
+            <a:r>
+              <a:rPr lang="en-US" sz="1200" dirty="0" smtClean="0">
+                <a:latin typeface="Segoe UI" panose="020B0502040204020203" pitchFamily="34" charset="0"/>
+                <a:cs typeface="Segoe UI" panose="020B0502040204020203" pitchFamily="34" charset="0"/>
+              </a:rPr>
+              <a:t>removeEdge</a:t>
+            </a:r>
+            <a:r>
+              <a:rPr lang="en-US" sz="1200" dirty="0">
+                <a:latin typeface="Segoe UI" panose="020B0502040204020203" pitchFamily="34" charset="0"/>
+                <a:cs typeface="Segoe UI" panose="020B0502040204020203" pitchFamily="34" charset="0"/>
+              </a:rPr>
+              <a:t>, witch accept two vertices(v1, v2)</a:t>
+            </a:r>
+          </a:p>
+          <a:p>
+            <a:pPr marL="419100" indent="-342900">
+              <a:buFont typeface="+mj-lt"/>
+              <a:buAutoNum type="arabicPeriod"/>
+            </a:pPr>
+            <a:r>
+              <a:rPr lang="en-US" sz="1200" dirty="0" smtClean="0">
+                <a:latin typeface="Segoe UI" panose="020B0502040204020203" pitchFamily="34" charset="0"/>
+                <a:cs typeface="Segoe UI" panose="020B0502040204020203" pitchFamily="34" charset="0"/>
+              </a:rPr>
+              <a:t>Reassign key of v1 | v2 to be an array that does not contain v2 | v1</a:t>
+            </a:r>
+          </a:p>
+          <a:p>
+            <a:pPr marL="419100" indent="-342900">
+              <a:buFont typeface="+mj-lt"/>
+              <a:buAutoNum type="arabicPeriod"/>
+            </a:pPr>
+            <a:r>
+              <a:rPr lang="en-US" sz="1200" dirty="0">
+                <a:latin typeface="Segoe UI" panose="020B0502040204020203" pitchFamily="34" charset="0"/>
+                <a:cs typeface="Segoe UI" panose="020B0502040204020203" pitchFamily="34" charset="0"/>
+              </a:rPr>
+              <a:t>Handle errors / invalid vertices</a:t>
+            </a:r>
+            <a:endParaRPr lang="en-US" sz="1200" dirty="0" smtClean="0">
+              <a:latin typeface="Segoe UI" panose="020B0502040204020203" pitchFamily="34" charset="0"/>
+              <a:cs typeface="Segoe UI" panose="020B0502040204020203" pitchFamily="34" charset="0"/>
+            </a:endParaRPr>
+          </a:p>
+          <a:p>
+            <a:pPr marL="76200" indent="0">
+              <a:buNone/>
+            </a:pPr>
+            <a:r>
+              <a:rPr lang="en-US" sz="1200" dirty="0" smtClean="0">
+                <a:latin typeface="Segoe UI" panose="020B0502040204020203" pitchFamily="34" charset="0"/>
+                <a:cs typeface="Segoe UI" panose="020B0502040204020203" pitchFamily="34" charset="0"/>
+              </a:rPr>
+              <a:t>Remove </a:t>
+            </a:r>
+            <a:r>
+              <a:rPr lang="en-US" sz="1200" smtClean="0">
+                <a:latin typeface="Segoe UI" panose="020B0502040204020203" pitchFamily="34" charset="0"/>
+                <a:cs typeface="Segoe UI" panose="020B0502040204020203" pitchFamily="34" charset="0"/>
+              </a:rPr>
+              <a:t>an vertex</a:t>
+            </a:r>
+            <a:endParaRPr lang="en-US" sz="1200" dirty="0" smtClean="0">
+              <a:latin typeface="Segoe UI" panose="020B0502040204020203" pitchFamily="34" charset="0"/>
+              <a:cs typeface="Segoe UI" panose="020B0502040204020203" pitchFamily="34" charset="0"/>
+            </a:endParaRPr>
+          </a:p>
+          <a:p>
+            <a:pPr marL="419100" indent="-342900">
+              <a:buFont typeface="+mj-lt"/>
+              <a:buAutoNum type="arabicPeriod"/>
+            </a:pPr>
+            <a:r>
+              <a:rPr lang="en-US" sz="1200" dirty="0">
+                <a:latin typeface="Segoe UI" panose="020B0502040204020203" pitchFamily="34" charset="0"/>
+                <a:cs typeface="Segoe UI" panose="020B0502040204020203" pitchFamily="34" charset="0"/>
+              </a:rPr>
+              <a:t>Write a method called </a:t>
+            </a:r>
+            <a:r>
+              <a:rPr lang="en-US" sz="1200" dirty="0" smtClean="0">
+                <a:latin typeface="Segoe UI" panose="020B0502040204020203" pitchFamily="34" charset="0"/>
+                <a:cs typeface="Segoe UI" panose="020B0502040204020203" pitchFamily="34" charset="0"/>
+              </a:rPr>
+              <a:t>removeVertex</a:t>
+            </a:r>
+            <a:r>
+              <a:rPr lang="en-US" sz="1200" dirty="0">
+                <a:latin typeface="Segoe UI" panose="020B0502040204020203" pitchFamily="34" charset="0"/>
+                <a:cs typeface="Segoe UI" panose="020B0502040204020203" pitchFamily="34" charset="0"/>
+              </a:rPr>
+              <a:t>, witch accepts a name of a vertex</a:t>
+            </a:r>
+          </a:p>
+          <a:p>
+            <a:pPr marL="419100" indent="-342900">
+              <a:buFont typeface="+mj-lt"/>
+              <a:buAutoNum type="arabicPeriod"/>
+            </a:pPr>
+            <a:r>
+              <a:rPr lang="en-US" sz="1200" dirty="0" smtClean="0">
+                <a:latin typeface="Segoe UI" panose="020B0502040204020203" pitchFamily="34" charset="0"/>
+                <a:cs typeface="Segoe UI" panose="020B0502040204020203" pitchFamily="34" charset="0"/>
+              </a:rPr>
+              <a:t>Loop as long as there are any other vertices in the adjacency list for that vertex</a:t>
+            </a:r>
+          </a:p>
+          <a:p>
+            <a:pPr marL="419100" indent="-342900">
+              <a:buFont typeface="+mj-lt"/>
+              <a:buAutoNum type="arabicPeriod"/>
+            </a:pPr>
+            <a:r>
+              <a:rPr lang="en-US" sz="1200" dirty="0" smtClean="0">
+                <a:latin typeface="Segoe UI" panose="020B0502040204020203" pitchFamily="34" charset="0"/>
+                <a:cs typeface="Segoe UI" panose="020B0502040204020203" pitchFamily="34" charset="0"/>
+              </a:rPr>
+              <a:t>Inside of the loop, call our remove edge function with the vertex we are removing and any values in the adjacency list for that vertex</a:t>
+            </a:r>
+          </a:p>
+          <a:p>
+            <a:pPr marL="419100" indent="-342900">
+              <a:buFont typeface="+mj-lt"/>
+              <a:buAutoNum type="arabicPeriod"/>
+            </a:pPr>
+            <a:r>
+              <a:rPr lang="en-US" sz="1200" dirty="0" smtClean="0">
+                <a:latin typeface="Segoe UI" panose="020B0502040204020203" pitchFamily="34" charset="0"/>
+                <a:cs typeface="Segoe UI" panose="020B0502040204020203" pitchFamily="34" charset="0"/>
+              </a:rPr>
+              <a:t>Delete the key in </a:t>
+            </a:r>
+            <a:r>
+              <a:rPr lang="en-US" sz="1200" dirty="0">
+                <a:latin typeface="Segoe UI" panose="020B0502040204020203" pitchFamily="34" charset="0"/>
+                <a:cs typeface="Segoe UI" panose="020B0502040204020203" pitchFamily="34" charset="0"/>
+              </a:rPr>
+              <a:t>adjacency list </a:t>
+            </a:r>
+            <a:r>
+              <a:rPr lang="en-US" sz="1200" dirty="0" smtClean="0">
+                <a:latin typeface="Segoe UI" panose="020B0502040204020203" pitchFamily="34" charset="0"/>
+                <a:cs typeface="Segoe UI" panose="020B0502040204020203" pitchFamily="34" charset="0"/>
+              </a:rPr>
+              <a:t> for that vertex(optional)</a:t>
+            </a:r>
+            <a:endParaRPr lang="en-US" sz="1200" dirty="0">
               <a:latin typeface="Segoe UI" panose="020B0502040204020203" pitchFamily="34" charset="0"/>
               <a:cs typeface="Segoe UI" panose="020B0502040204020203" pitchFamily="34" charset="0"/>
             </a:endParaRPr>
@@ -24011,6 +26067,131 @@
 </file>
 
 <file path=ppt/slides/slide30.xml><?xml version="1.0" encoding="utf-8"?>
+<p:sld xmlns:a="http://schemas.openxmlformats.org/drawingml/2006/main" xmlns:r="http://schemas.openxmlformats.org/officeDocument/2006/relationships" xmlns:p="http://schemas.openxmlformats.org/presentationml/2006/main">
+  <p:cSld>
+    <p:spTree>
+      <p:nvGrpSpPr>
+        <p:cNvPr id="1" name=""/>
+        <p:cNvGrpSpPr/>
+        <p:nvPr/>
+      </p:nvGrpSpPr>
+      <p:grpSpPr>
+        <a:xfrm>
+          <a:off x="0" y="0"/>
+          <a:ext cx="0" cy="0"/>
+          <a:chOff x="0" y="0"/>
+          <a:chExt cx="0" cy="0"/>
+        </a:xfrm>
+      </p:grpSpPr>
+      <p:sp>
+        <p:nvSpPr>
+          <p:cNvPr id="2" name="Title 1"/>
+          <p:cNvSpPr>
+            <a:spLocks noGrp="1"/>
+          </p:cNvSpPr>
+          <p:nvPr>
+            <p:ph type="title"/>
+          </p:nvPr>
+        </p:nvSpPr>
+        <p:spPr>
+          <a:xfrm>
+            <a:off x="0" y="0"/>
+            <a:ext cx="9610000" cy="844400"/>
+          </a:xfrm>
+        </p:spPr>
+        <p:txBody>
+          <a:bodyPr/>
+          <a:lstStyle/>
+          <a:p>
+            <a:r>
+              <a:rPr lang="en-US" b="1" dirty="0">
+                <a:latin typeface="Segoe UI" panose="020B0502040204020203" pitchFamily="34" charset="0"/>
+                <a:cs typeface="Segoe UI" panose="020B0502040204020203" pitchFamily="34" charset="0"/>
+              </a:rPr>
+              <a:t>Graphs</a:t>
+            </a:r>
+            <a:endParaRPr lang="en-US" dirty="0">
+              <a:latin typeface="Segoe UI" panose="020B0502040204020203" pitchFamily="34" charset="0"/>
+              <a:cs typeface="Segoe UI" panose="020B0502040204020203" pitchFamily="34" charset="0"/>
+            </a:endParaRPr>
+          </a:p>
+        </p:txBody>
+      </p:sp>
+      <p:sp>
+        <p:nvSpPr>
+          <p:cNvPr id="3" name="Content Placeholder 2"/>
+          <p:cNvSpPr>
+            <a:spLocks noGrp="1"/>
+          </p:cNvSpPr>
+          <p:nvPr>
+            <p:ph idx="1"/>
+          </p:nvPr>
+        </p:nvSpPr>
+        <p:spPr/>
+        <p:txBody>
+          <a:bodyPr/>
+          <a:lstStyle/>
+          <a:p>
+            <a:r>
+              <a:rPr lang="ru-RU" dirty="0">
+                <a:latin typeface="Segoe UI" panose="020B0502040204020203" pitchFamily="34" charset="0"/>
+                <a:cs typeface="Segoe UI" panose="020B0502040204020203" pitchFamily="34" charset="0"/>
+              </a:rPr>
+              <a:t>Задача о семи </a:t>
+            </a:r>
+            <a:r>
+              <a:rPr lang="ru-RU" dirty="0" smtClean="0">
+                <a:latin typeface="Segoe UI" panose="020B0502040204020203" pitchFamily="34" charset="0"/>
+                <a:cs typeface="Segoe UI" panose="020B0502040204020203" pitchFamily="34" charset="0"/>
+              </a:rPr>
+              <a:t>мостах</a:t>
+            </a:r>
+            <a:endParaRPr lang="en-US" dirty="0" smtClean="0">
+              <a:latin typeface="Segoe UI" panose="020B0502040204020203" pitchFamily="34" charset="0"/>
+              <a:cs typeface="Segoe UI" panose="020B0502040204020203" pitchFamily="34" charset="0"/>
+            </a:endParaRPr>
+          </a:p>
+          <a:p>
+            <a:endParaRPr lang="en-US" dirty="0">
+              <a:latin typeface="Segoe UI" panose="020B0502040204020203" pitchFamily="34" charset="0"/>
+              <a:cs typeface="Segoe UI" panose="020B0502040204020203" pitchFamily="34" charset="0"/>
+            </a:endParaRPr>
+          </a:p>
+          <a:p>
+            <a:r>
+              <a:rPr lang="en-US" dirty="0" smtClean="0">
+                <a:latin typeface="Segoe UI" panose="020B0502040204020203" pitchFamily="34" charset="0"/>
+                <a:cs typeface="Segoe UI" panose="020B0502040204020203" pitchFamily="34" charset="0"/>
+              </a:rPr>
+              <a:t>Dracula for graph visualization</a:t>
+            </a:r>
+            <a:endParaRPr lang="ru-RU" dirty="0">
+              <a:latin typeface="Segoe UI" panose="020B0502040204020203" pitchFamily="34" charset="0"/>
+              <a:cs typeface="Segoe UI" panose="020B0502040204020203" pitchFamily="34" charset="0"/>
+            </a:endParaRPr>
+          </a:p>
+          <a:p>
+            <a:endParaRPr lang="en-US" dirty="0">
+              <a:latin typeface="Segoe UI" panose="020B0502040204020203" pitchFamily="34" charset="0"/>
+              <a:cs typeface="Segoe UI" panose="020B0502040204020203" pitchFamily="34" charset="0"/>
+            </a:endParaRPr>
+          </a:p>
+        </p:txBody>
+      </p:sp>
+    </p:spTree>
+    <p:extLst>
+      <p:ext uri="{BB962C8B-B14F-4D97-AF65-F5344CB8AC3E}">
+        <p14:creationId xmlns:p14="http://schemas.microsoft.com/office/powerpoint/2010/main" val="3682538881"/>
+      </p:ext>
+    </p:extLst>
+  </p:cSld>
+  <p:clrMapOvr>
+    <a:masterClrMapping/>
+  </p:clrMapOvr>
+</p:sld>
+</file>
+
+<file path=ppt/slides/slide31.xml><?xml version="1.0" encoding="utf-8"?>
 <p:sld xmlns:a="http://schemas.openxmlformats.org/drawingml/2006/main" xmlns:r="http://schemas.openxmlformats.org/officeDocument/2006/relationships" xmlns:p="http://schemas.openxmlformats.org/presentationml/2006/main">
   <p:cSld>
     <p:spTree>

</xml_diff>